<commit_message>
Synchronisierung Datenflussgraph u Code
</commit_message>
<xml_diff>
--- a/Datenflussgraph_GGT.pptx
+++ b/Datenflussgraph_GGT.pptx
@@ -2987,7 +2987,7 @@
         </p:nvSpPr>
         <p:spPr>
           <a:xfrm>
-            <a:off x="0" y="431143"/>
+            <a:off x="-23283" y="907393"/>
             <a:ext cx="10760392" cy="45719"/>
           </a:xfrm>
           <a:prstGeom prst="rect">
@@ -3036,8 +3036,8 @@
         </p:nvSpPr>
         <p:spPr>
           <a:xfrm rot="5400000" flipV="1">
-            <a:off x="-3004381" y="4693074"/>
-            <a:ext cx="9431867" cy="45719"/>
+            <a:off x="-3266746" y="4930242"/>
+            <a:ext cx="9908117" cy="47633"/>
           </a:xfrm>
           <a:prstGeom prst="rect">
             <a:avLst/>
@@ -3085,7 +3085,7 @@
         </p:nvSpPr>
         <p:spPr>
           <a:xfrm>
-            <a:off x="1682220" y="19474"/>
+            <a:off x="1658937" y="495724"/>
             <a:ext cx="1087702" cy="369332"/>
           </a:xfrm>
           <a:prstGeom prst="rect">
@@ -3120,7 +3120,7 @@
         </p:nvSpPr>
         <p:spPr>
           <a:xfrm>
-            <a:off x="2586169" y="19474"/>
+            <a:off x="2562886" y="495724"/>
             <a:ext cx="1087702" cy="369332"/>
           </a:xfrm>
           <a:prstGeom prst="rect">
@@ -3155,7 +3155,7 @@
         </p:nvSpPr>
         <p:spPr>
           <a:xfrm>
-            <a:off x="3499299" y="29542"/>
+            <a:off x="3476016" y="505792"/>
             <a:ext cx="1509051" cy="369332"/>
           </a:xfrm>
           <a:prstGeom prst="rect">
@@ -3171,7 +3171,7 @@
           <a:p>
             <a:r>
               <a:rPr lang="de-DE" dirty="0" err="1"/>
-              <a:t>Erg_Modulo</a:t>
+              <a:t>erg_modulo</a:t>
             </a:r>
             <a:endParaRPr lang="de-DE" dirty="0"/>
           </a:p>
@@ -3191,7 +3191,7 @@
         </p:nvSpPr>
         <p:spPr>
           <a:xfrm>
-            <a:off x="5008350" y="39610"/>
+            <a:off x="4985067" y="515860"/>
             <a:ext cx="1453198" cy="369332"/>
           </a:xfrm>
           <a:prstGeom prst="rect">
@@ -3207,7 +3207,7 @@
           <a:p>
             <a:r>
               <a:rPr lang="de-DE" dirty="0" err="1"/>
-              <a:t>Rest_zuvor</a:t>
+              <a:t>erg_zuvor</a:t>
             </a:r>
             <a:endParaRPr lang="de-DE" dirty="0"/>
           </a:p>
@@ -3227,8 +3227,8 @@
         </p:nvSpPr>
         <p:spPr>
           <a:xfrm>
-            <a:off x="6568227" y="50711"/>
-            <a:ext cx="1087702" cy="369332"/>
+            <a:off x="6437549" y="264480"/>
+            <a:ext cx="1292053" cy="646331"/>
           </a:xfrm>
           <a:prstGeom prst="rect">
             <a:avLst/>
@@ -3241,9 +3241,10 @@
           </a:bodyPr>
           <a:lstStyle/>
           <a:p>
+            <a:pPr algn="ctr"/>
             <a:r>
               <a:rPr lang="de-DE" dirty="0" err="1"/>
-              <a:t>Zw_groß</a:t>
+              <a:t>zwischen_groß</a:t>
             </a:r>
             <a:endParaRPr lang="de-DE" dirty="0"/>
           </a:p>
@@ -3263,8 +3264,8 @@
         </p:nvSpPr>
         <p:spPr>
           <a:xfrm>
-            <a:off x="7798537" y="61811"/>
-            <a:ext cx="1087702" cy="369332"/>
+            <a:off x="7673077" y="260181"/>
+            <a:ext cx="1292053" cy="646331"/>
           </a:xfrm>
           <a:prstGeom prst="rect">
             <a:avLst/>
@@ -3277,9 +3278,10 @@
           </a:bodyPr>
           <a:lstStyle/>
           <a:p>
+            <a:pPr algn="ctr"/>
             <a:r>
               <a:rPr lang="de-DE" dirty="0" err="1"/>
-              <a:t>Zw_klein</a:t>
+              <a:t>zwischen_klein</a:t>
             </a:r>
             <a:endParaRPr lang="de-DE" dirty="0"/>
           </a:p>
@@ -3301,7 +3303,7 @@
         </p:nvCxnSpPr>
         <p:spPr>
           <a:xfrm>
-            <a:off x="2032000" y="567267"/>
+            <a:off x="2008717" y="1043517"/>
             <a:ext cx="0" cy="8864600"/>
           </a:xfrm>
           <a:prstGeom prst="line">
@@ -3342,7 +3344,7 @@
         </p:nvCxnSpPr>
         <p:spPr>
           <a:xfrm>
-            <a:off x="2963333" y="567267"/>
+            <a:off x="2940050" y="1043517"/>
             <a:ext cx="0" cy="8864600"/>
           </a:xfrm>
           <a:prstGeom prst="line">
@@ -3383,7 +3385,7 @@
         </p:nvCxnSpPr>
         <p:spPr>
           <a:xfrm>
-            <a:off x="4174067" y="567267"/>
+            <a:off x="4150784" y="1043517"/>
             <a:ext cx="0" cy="8864600"/>
           </a:xfrm>
           <a:prstGeom prst="line">
@@ -3424,7 +3426,7 @@
         </p:nvCxnSpPr>
         <p:spPr>
           <a:xfrm>
-            <a:off x="5630333" y="567267"/>
+            <a:off x="5607050" y="1043517"/>
             <a:ext cx="0" cy="8864600"/>
           </a:xfrm>
           <a:prstGeom prst="line">
@@ -3465,7 +3467,7 @@
         </p:nvCxnSpPr>
         <p:spPr>
           <a:xfrm>
-            <a:off x="7112078" y="567267"/>
+            <a:off x="7088795" y="1043517"/>
             <a:ext cx="0" cy="8864600"/>
           </a:xfrm>
           <a:prstGeom prst="line">
@@ -3506,7 +3508,7 @@
         </p:nvCxnSpPr>
         <p:spPr>
           <a:xfrm>
-            <a:off x="8342388" y="567267"/>
+            <a:off x="8319105" y="1043517"/>
             <a:ext cx="0" cy="8864600"/>
           </a:xfrm>
           <a:prstGeom prst="line">
@@ -3545,8 +3547,8 @@
         </p:nvSpPr>
         <p:spPr>
           <a:xfrm>
-            <a:off x="86838" y="567267"/>
-            <a:ext cx="1468857" cy="340737"/>
+            <a:off x="11868" y="1131912"/>
+            <a:ext cx="1634612" cy="340737"/>
           </a:xfrm>
           <a:prstGeom prst="rect">
             <a:avLst/>
@@ -3583,7 +3585,7 @@
                   <a:schemeClr val="tx1"/>
                 </a:solidFill>
               </a:rPr>
-              <a:t>Find_bigger</a:t>
+              <a:t>STATE_find_bigger</a:t>
             </a:r>
             <a:endParaRPr lang="de-DE" sz="1400" dirty="0">
               <a:solidFill>
@@ -3609,7 +3611,7 @@
         </p:nvCxnSpPr>
         <p:spPr>
           <a:xfrm>
-            <a:off x="2032000" y="804333"/>
+            <a:off x="2008717" y="1280583"/>
             <a:ext cx="7198586" cy="10273"/>
           </a:xfrm>
           <a:prstGeom prst="straightConnector1">
@@ -3650,7 +3652,7 @@
         </p:nvCxnSpPr>
         <p:spPr>
           <a:xfrm flipV="1">
-            <a:off x="2963333" y="965200"/>
+            <a:off x="2940050" y="1441450"/>
             <a:ext cx="6263217" cy="1806"/>
           </a:xfrm>
           <a:prstGeom prst="straightConnector1">
@@ -3689,7 +3691,7 @@
         </p:nvSpPr>
         <p:spPr>
           <a:xfrm>
-            <a:off x="9231420" y="653383"/>
+            <a:off x="9208137" y="1200493"/>
             <a:ext cx="1534750" cy="509241"/>
           </a:xfrm>
           <a:prstGeom prst="rect">
@@ -3724,7 +3726,7 @@
                   <a:schemeClr val="tx1"/>
                 </a:solidFill>
               </a:rPr>
-              <a:t>Give_back_bigger</a:t>
+              <a:t>give_back_bigger</a:t>
             </a:r>
             <a:endParaRPr lang="de-DE" sz="1400" dirty="0">
               <a:solidFill>
@@ -3748,7 +3750,7 @@
         </p:nvSpPr>
         <p:spPr>
           <a:xfrm>
-            <a:off x="2899254" y="906525"/>
+            <a:off x="2875971" y="1382775"/>
             <a:ext cx="118531" cy="120961"/>
           </a:xfrm>
           <a:prstGeom prst="ellipse">
@@ -3794,7 +3796,7 @@
         </p:nvSpPr>
         <p:spPr>
           <a:xfrm>
-            <a:off x="1973719" y="737635"/>
+            <a:off x="1950436" y="1213885"/>
             <a:ext cx="118531" cy="120961"/>
           </a:xfrm>
           <a:prstGeom prst="ellipse">
@@ -3836,14 +3838,15 @@
             </a:extLst>
           </p:cNvPr>
           <p:cNvCxnSpPr>
+            <a:cxnSpLocks/>
             <a:stCxn id="27" idx="2"/>
           </p:cNvCxnSpPr>
           <p:nvPr/>
         </p:nvCxnSpPr>
         <p:spPr>
           <a:xfrm>
-            <a:off x="9998795" y="1162624"/>
-            <a:ext cx="338" cy="319043"/>
+            <a:off x="9975512" y="1709734"/>
+            <a:ext cx="0" cy="409942"/>
           </a:xfrm>
           <a:prstGeom prst="straightConnector1">
             <a:avLst/>
@@ -3867,12 +3870,53 @@
           </a:fontRef>
         </p:style>
       </p:cxnSp>
-      <p:sp>
-        <p:nvSpPr>
-          <p:cNvPr id="35" name="Rechteck 34">
-            <a:extLst>
-              <a:ext uri="{FF2B5EF4-FFF2-40B4-BE49-F238E27FC236}">
-                <a16:creationId xmlns:a16="http://schemas.microsoft.com/office/drawing/2014/main" id="{9BA5B1ED-05E4-4D07-8F6D-9D10F5C57E8F}"/>
+      <p:cxnSp>
+        <p:nvCxnSpPr>
+          <p:cNvPr id="37" name="Gerade Verbindung mit Pfeil 36">
+            <a:extLst>
+              <a:ext uri="{FF2B5EF4-FFF2-40B4-BE49-F238E27FC236}">
+                <a16:creationId xmlns:a16="http://schemas.microsoft.com/office/drawing/2014/main" id="{8B0D4581-0375-E2BF-8A0F-C31A0EAC3D02}"/>
+              </a:ext>
+            </a:extLst>
+          </p:cNvPr>
+          <p:cNvCxnSpPr>
+            <a:cxnSpLocks/>
+          </p:cNvCxnSpPr>
+          <p:nvPr/>
+        </p:nvCxnSpPr>
+        <p:spPr>
+          <a:xfrm flipH="1" flipV="1">
+            <a:off x="7088795" y="2356623"/>
+            <a:ext cx="2160797" cy="1"/>
+          </a:xfrm>
+          <a:prstGeom prst="straightConnector1">
+            <a:avLst/>
+          </a:prstGeom>
+          <a:ln>
+            <a:tailEnd type="triangle"/>
+          </a:ln>
+        </p:spPr>
+        <p:style>
+          <a:lnRef idx="2">
+            <a:schemeClr val="accent1"/>
+          </a:lnRef>
+          <a:fillRef idx="0">
+            <a:schemeClr val="accent1"/>
+          </a:fillRef>
+          <a:effectRef idx="1">
+            <a:schemeClr val="accent1"/>
+          </a:effectRef>
+          <a:fontRef idx="minor">
+            <a:schemeClr val="tx1"/>
+          </a:fontRef>
+        </p:style>
+      </p:cxnSp>
+      <p:sp>
+        <p:nvSpPr>
+          <p:cNvPr id="38" name="Rechteck 37">
+            <a:extLst>
+              <a:ext uri="{FF2B5EF4-FFF2-40B4-BE49-F238E27FC236}">
+                <a16:creationId xmlns:a16="http://schemas.microsoft.com/office/drawing/2014/main" id="{A76B6E3D-C572-8277-599C-4468D1D6D8FD}"/>
               </a:ext>
             </a:extLst>
           </p:cNvPr>
@@ -3881,13 +3925,16 @@
         </p:nvSpPr>
         <p:spPr>
           <a:xfrm>
-            <a:off x="9272875" y="1472579"/>
-            <a:ext cx="1534750" cy="509241"/>
+            <a:off x="-73202" y="1975057"/>
+            <a:ext cx="1742372" cy="340737"/>
           </a:xfrm>
           <a:prstGeom prst="rect">
             <a:avLst/>
           </a:prstGeom>
           <a:noFill/>
+          <a:ln>
+            <a:noFill/>
+          </a:ln>
         </p:spPr>
         <p:style>
           <a:lnRef idx="2">
@@ -3911,14 +3958,14 @@
           <a:p>
             <a:pPr algn="ctr"/>
             <a:r>
-              <a:rPr lang="de-DE" dirty="0" err="1">
+              <a:rPr lang="de-DE" sz="1400" dirty="0" err="1">
                 <a:solidFill>
                   <a:schemeClr val="tx1"/>
                 </a:solidFill>
               </a:rPr>
-              <a:t>Write_back</a:t>
-            </a:r>
-            <a:endParaRPr lang="de-DE" dirty="0">
+              <a:t>STATE_find_smaller</a:t>
+            </a:r>
+            <a:endParaRPr lang="de-DE" sz="1400" dirty="0">
               <a:solidFill>
                 <a:schemeClr val="tx1"/>
               </a:solidFill>
@@ -3926,53 +3973,12 @@
           </a:p>
         </p:txBody>
       </p:sp>
-      <p:cxnSp>
-        <p:nvCxnSpPr>
-          <p:cNvPr id="37" name="Gerade Verbindung mit Pfeil 36">
-            <a:extLst>
-              <a:ext uri="{FF2B5EF4-FFF2-40B4-BE49-F238E27FC236}">
-                <a16:creationId xmlns:a16="http://schemas.microsoft.com/office/drawing/2014/main" id="{8B0D4581-0375-E2BF-8A0F-C31A0EAC3D02}"/>
-              </a:ext>
-            </a:extLst>
-          </p:cNvPr>
-          <p:cNvCxnSpPr>
-            <a:stCxn id="35" idx="1"/>
-          </p:cNvCxnSpPr>
-          <p:nvPr/>
-        </p:nvCxnSpPr>
-        <p:spPr>
-          <a:xfrm flipH="1" flipV="1">
-            <a:off x="7112078" y="1727199"/>
-            <a:ext cx="2160797" cy="1"/>
-          </a:xfrm>
-          <a:prstGeom prst="straightConnector1">
-            <a:avLst/>
-          </a:prstGeom>
-          <a:ln>
-            <a:tailEnd type="triangle"/>
-          </a:ln>
-        </p:spPr>
-        <p:style>
-          <a:lnRef idx="2">
-            <a:schemeClr val="accent1"/>
-          </a:lnRef>
-          <a:fillRef idx="0">
-            <a:schemeClr val="accent1"/>
-          </a:fillRef>
-          <a:effectRef idx="1">
-            <a:schemeClr val="accent1"/>
-          </a:effectRef>
-          <a:fontRef idx="minor">
-            <a:schemeClr val="tx1"/>
-          </a:fontRef>
-        </p:style>
-      </p:cxnSp>
-      <p:sp>
-        <p:nvSpPr>
-          <p:cNvPr id="38" name="Rechteck 37">
-            <a:extLst>
-              <a:ext uri="{FF2B5EF4-FFF2-40B4-BE49-F238E27FC236}">
-                <a16:creationId xmlns:a16="http://schemas.microsoft.com/office/drawing/2014/main" id="{A76B6E3D-C572-8277-599C-4468D1D6D8FD}"/>
+      <p:sp>
+        <p:nvSpPr>
+          <p:cNvPr id="39" name="Rechteck 38">
+            <a:extLst>
+              <a:ext uri="{FF2B5EF4-FFF2-40B4-BE49-F238E27FC236}">
+                <a16:creationId xmlns:a16="http://schemas.microsoft.com/office/drawing/2014/main" id="{D164826A-AF6E-9BDF-202A-0095C470D721}"/>
               </a:ext>
             </a:extLst>
           </p:cNvPr>
@@ -3981,16 +3987,13 @@
         </p:nvSpPr>
         <p:spPr>
           <a:xfrm>
-            <a:off x="69392" y="2502821"/>
-            <a:ext cx="1468857" cy="340737"/>
+            <a:off x="9249549" y="2989105"/>
+            <a:ext cx="1565109" cy="509241"/>
           </a:xfrm>
           <a:prstGeom prst="rect">
             <a:avLst/>
           </a:prstGeom>
           <a:noFill/>
-          <a:ln>
-            <a:noFill/>
-          </a:ln>
         </p:spPr>
         <p:style>
           <a:lnRef idx="2">
@@ -4014,14 +4017,14 @@
           <a:p>
             <a:pPr algn="ctr"/>
             <a:r>
-              <a:rPr lang="de-DE" sz="1400" dirty="0" err="1">
+              <a:rPr lang="de-DE" sz="1200" dirty="0" err="1">
                 <a:solidFill>
                   <a:schemeClr val="tx1"/>
                 </a:solidFill>
               </a:rPr>
-              <a:t>Find_smaller</a:t>
-            </a:r>
-            <a:endParaRPr lang="de-DE" sz="1400" dirty="0">
+              <a:t>give_back_smaller</a:t>
+            </a:r>
+            <a:endParaRPr lang="de-DE" sz="1200" dirty="0">
               <a:solidFill>
                 <a:schemeClr val="tx1"/>
               </a:solidFill>
@@ -4029,12 +4032,53 @@
           </a:p>
         </p:txBody>
       </p:sp>
-      <p:sp>
-        <p:nvSpPr>
-          <p:cNvPr id="39" name="Rechteck 38">
-            <a:extLst>
-              <a:ext uri="{FF2B5EF4-FFF2-40B4-BE49-F238E27FC236}">
-                <a16:creationId xmlns:a16="http://schemas.microsoft.com/office/drawing/2014/main" id="{D164826A-AF6E-9BDF-202A-0095C470D721}"/>
+      <p:cxnSp>
+        <p:nvCxnSpPr>
+          <p:cNvPr id="40" name="Gerade Verbindung mit Pfeil 39">
+            <a:extLst>
+              <a:ext uri="{FF2B5EF4-FFF2-40B4-BE49-F238E27FC236}">
+                <a16:creationId xmlns:a16="http://schemas.microsoft.com/office/drawing/2014/main" id="{F3CFF002-B776-E148-AFCE-4EE1452C0B53}"/>
+              </a:ext>
+            </a:extLst>
+          </p:cNvPr>
+          <p:cNvCxnSpPr>
+            <a:cxnSpLocks/>
+          </p:cNvCxnSpPr>
+          <p:nvPr/>
+        </p:nvCxnSpPr>
+        <p:spPr>
+          <a:xfrm>
+            <a:off x="2026634" y="3061780"/>
+            <a:ext cx="7198586" cy="10273"/>
+          </a:xfrm>
+          <a:prstGeom prst="straightConnector1">
+            <a:avLst/>
+          </a:prstGeom>
+          <a:ln>
+            <a:tailEnd type="triangle"/>
+          </a:ln>
+        </p:spPr>
+        <p:style>
+          <a:lnRef idx="2">
+            <a:schemeClr val="accent1"/>
+          </a:lnRef>
+          <a:fillRef idx="0">
+            <a:schemeClr val="accent1"/>
+          </a:fillRef>
+          <a:effectRef idx="1">
+            <a:schemeClr val="accent1"/>
+          </a:effectRef>
+          <a:fontRef idx="minor">
+            <a:schemeClr val="tx1"/>
+          </a:fontRef>
+        </p:style>
+      </p:cxnSp>
+      <p:sp>
+        <p:nvSpPr>
+          <p:cNvPr id="41" name="Ellipse 40">
+            <a:extLst>
+              <a:ext uri="{FF2B5EF4-FFF2-40B4-BE49-F238E27FC236}">
+                <a16:creationId xmlns:a16="http://schemas.microsoft.com/office/drawing/2014/main" id="{AD04C736-55C4-B1B8-C71B-A60F27626E3E}"/>
               </a:ext>
             </a:extLst>
           </p:cNvPr>
@@ -4043,13 +4087,12 @@
         </p:nvSpPr>
         <p:spPr>
           <a:xfrm>
-            <a:off x="9272874" y="2431239"/>
-            <a:ext cx="1565109" cy="509241"/>
-          </a:xfrm>
-          <a:prstGeom prst="rect">
-            <a:avLst/>
-          </a:prstGeom>
-          <a:noFill/>
+            <a:off x="1968353" y="2995082"/>
+            <a:ext cx="118531" cy="120961"/>
+          </a:xfrm>
+          <a:prstGeom prst="ellipse">
+            <a:avLst/>
+          </a:prstGeom>
         </p:spPr>
         <p:style>
           <a:lnRef idx="2">
@@ -4072,28 +4115,16 @@
           <a:lstStyle/>
           <a:p>
             <a:pPr algn="ctr"/>
-            <a:r>
-              <a:rPr lang="de-DE" sz="1200" dirty="0" err="1">
-                <a:solidFill>
-                  <a:schemeClr val="tx1"/>
-                </a:solidFill>
-              </a:rPr>
-              <a:t>Give_back_smaller</a:t>
-            </a:r>
-            <a:endParaRPr lang="de-DE" sz="1200" dirty="0">
-              <a:solidFill>
-                <a:schemeClr val="tx1"/>
-              </a:solidFill>
-            </a:endParaRPr>
+            <a:endParaRPr lang="de-DE"/>
           </a:p>
         </p:txBody>
       </p:sp>
       <p:cxnSp>
         <p:nvCxnSpPr>
-          <p:cNvPr id="40" name="Gerade Verbindung mit Pfeil 39">
-            <a:extLst>
-              <a:ext uri="{FF2B5EF4-FFF2-40B4-BE49-F238E27FC236}">
-                <a16:creationId xmlns:a16="http://schemas.microsoft.com/office/drawing/2014/main" id="{F3CFF002-B776-E148-AFCE-4EE1452C0B53}"/>
+          <p:cNvPr id="42" name="Gerade Verbindung mit Pfeil 41">
+            <a:extLst>
+              <a:ext uri="{FF2B5EF4-FFF2-40B4-BE49-F238E27FC236}">
+                <a16:creationId xmlns:a16="http://schemas.microsoft.com/office/drawing/2014/main" id="{DF4BE63C-523B-ECA5-660E-227B4305F8EA}"/>
               </a:ext>
             </a:extLst>
           </p:cNvPr>
@@ -4104,8 +4135,8 @@
         </p:nvCxnSpPr>
         <p:spPr>
           <a:xfrm>
-            <a:off x="2049917" y="2585530"/>
-            <a:ext cx="7198586" cy="10273"/>
+            <a:off x="2938218" y="3244583"/>
+            <a:ext cx="6309499" cy="25667"/>
           </a:xfrm>
           <a:prstGeom prst="straightConnector1">
             <a:avLst/>
@@ -4131,10 +4162,10 @@
       </p:cxnSp>
       <p:sp>
         <p:nvSpPr>
-          <p:cNvPr id="41" name="Ellipse 40">
-            <a:extLst>
-              <a:ext uri="{FF2B5EF4-FFF2-40B4-BE49-F238E27FC236}">
-                <a16:creationId xmlns:a16="http://schemas.microsoft.com/office/drawing/2014/main" id="{AD04C736-55C4-B1B8-C71B-A60F27626E3E}"/>
+          <p:cNvPr id="43" name="Ellipse 42">
+            <a:extLst>
+              <a:ext uri="{FF2B5EF4-FFF2-40B4-BE49-F238E27FC236}">
+                <a16:creationId xmlns:a16="http://schemas.microsoft.com/office/drawing/2014/main" id="{40268450-7D8B-37C7-EB0B-8EC93AA2D36C}"/>
               </a:ext>
             </a:extLst>
           </p:cNvPr>
@@ -4143,7 +4174,7 @@
         </p:nvSpPr>
         <p:spPr>
           <a:xfrm>
-            <a:off x="1991636" y="2518832"/>
+            <a:off x="2879937" y="3177885"/>
             <a:ext cx="118531" cy="120961"/>
           </a:xfrm>
           <a:prstGeom prst="ellipse">
@@ -4175,53 +4206,12 @@
           </a:p>
         </p:txBody>
       </p:sp>
-      <p:cxnSp>
-        <p:nvCxnSpPr>
-          <p:cNvPr id="42" name="Gerade Verbindung mit Pfeil 41">
-            <a:extLst>
-              <a:ext uri="{FF2B5EF4-FFF2-40B4-BE49-F238E27FC236}">
-                <a16:creationId xmlns:a16="http://schemas.microsoft.com/office/drawing/2014/main" id="{DF4BE63C-523B-ECA5-660E-227B4305F8EA}"/>
-              </a:ext>
-            </a:extLst>
-          </p:cNvPr>
-          <p:cNvCxnSpPr>
-            <a:cxnSpLocks/>
-          </p:cNvCxnSpPr>
-          <p:nvPr/>
-        </p:nvCxnSpPr>
-        <p:spPr>
-          <a:xfrm>
-            <a:off x="2961501" y="2768333"/>
-            <a:ext cx="6309499" cy="25667"/>
-          </a:xfrm>
-          <a:prstGeom prst="straightConnector1">
-            <a:avLst/>
-          </a:prstGeom>
-          <a:ln>
-            <a:tailEnd type="triangle"/>
-          </a:ln>
-        </p:spPr>
-        <p:style>
-          <a:lnRef idx="2">
-            <a:schemeClr val="accent1"/>
-          </a:lnRef>
-          <a:fillRef idx="0">
-            <a:schemeClr val="accent1"/>
-          </a:fillRef>
-          <a:effectRef idx="1">
-            <a:schemeClr val="accent1"/>
-          </a:effectRef>
-          <a:fontRef idx="minor">
-            <a:schemeClr val="tx1"/>
-          </a:fontRef>
-        </p:style>
-      </p:cxnSp>
-      <p:sp>
-        <p:nvSpPr>
-          <p:cNvPr id="43" name="Ellipse 42">
-            <a:extLst>
-              <a:ext uri="{FF2B5EF4-FFF2-40B4-BE49-F238E27FC236}">
-                <a16:creationId xmlns:a16="http://schemas.microsoft.com/office/drawing/2014/main" id="{40268450-7D8B-37C7-EB0B-8EC93AA2D36C}"/>
+      <p:sp>
+        <p:nvSpPr>
+          <p:cNvPr id="46" name="Rechteck 45">
+            <a:extLst>
+              <a:ext uri="{FF2B5EF4-FFF2-40B4-BE49-F238E27FC236}">
+                <a16:creationId xmlns:a16="http://schemas.microsoft.com/office/drawing/2014/main" id="{A060577E-B532-1697-452C-252B08BCD2DC}"/>
               </a:ext>
             </a:extLst>
           </p:cNvPr>
@@ -4230,12 +4220,13 @@
         </p:nvSpPr>
         <p:spPr>
           <a:xfrm>
-            <a:off x="2903220" y="2701635"/>
-            <a:ext cx="118531" cy="120961"/>
-          </a:xfrm>
-          <a:prstGeom prst="ellipse">
-            <a:avLst/>
-          </a:prstGeom>
+            <a:off x="9247717" y="3753557"/>
+            <a:ext cx="1534750" cy="509241"/>
+          </a:xfrm>
+          <a:prstGeom prst="rect">
+            <a:avLst/>
+          </a:prstGeom>
+          <a:noFill/>
         </p:spPr>
         <p:style>
           <a:lnRef idx="2">
@@ -4258,60 +4249,13 @@
           <a:lstStyle/>
           <a:p>
             <a:pPr algn="ctr"/>
-            <a:endParaRPr lang="de-DE"/>
-          </a:p>
-        </p:txBody>
-      </p:sp>
-      <p:sp>
-        <p:nvSpPr>
-          <p:cNvPr id="46" name="Rechteck 45">
-            <a:extLst>
-              <a:ext uri="{FF2B5EF4-FFF2-40B4-BE49-F238E27FC236}">
-                <a16:creationId xmlns:a16="http://schemas.microsoft.com/office/drawing/2014/main" id="{A060577E-B532-1697-452C-252B08BCD2DC}"/>
-              </a:ext>
-            </a:extLst>
-          </p:cNvPr>
-          <p:cNvSpPr/>
-          <p:nvPr/>
-        </p:nvSpPr>
-        <p:spPr>
-          <a:xfrm>
-            <a:off x="9271000" y="3277307"/>
-            <a:ext cx="1534750" cy="509241"/>
-          </a:xfrm>
-          <a:prstGeom prst="rect">
-            <a:avLst/>
-          </a:prstGeom>
-          <a:noFill/>
-        </p:spPr>
-        <p:style>
-          <a:lnRef idx="2">
-            <a:schemeClr val="accent1">
-              <a:shade val="15000"/>
-            </a:schemeClr>
-          </a:lnRef>
-          <a:fillRef idx="1">
-            <a:schemeClr val="accent1"/>
-          </a:fillRef>
-          <a:effectRef idx="0">
-            <a:schemeClr val="accent1"/>
-          </a:effectRef>
-          <a:fontRef idx="minor">
-            <a:schemeClr val="lt1"/>
-          </a:fontRef>
-        </p:style>
-        <p:txBody>
-          <a:bodyPr rtlCol="0" anchor="ctr"/>
-          <a:lstStyle/>
-          <a:p>
-            <a:pPr algn="ctr"/>
-            <a:r>
-              <a:rPr lang="de-DE" dirty="0" err="1">
+            <a:r>
+              <a:rPr lang="de-DE" sz="1400" dirty="0" err="1">
                 <a:solidFill>
                   <a:schemeClr val="tx1"/>
                 </a:solidFill>
               </a:rPr>
-              <a:t>Write_back</a:t>
+              <a:t>write</a:t>
             </a:r>
             <a:endParaRPr lang="de-DE" dirty="0">
               <a:solidFill>
@@ -4330,13 +4274,15 @@
               </a:ext>
             </a:extLst>
           </p:cNvPr>
-          <p:cNvCxnSpPr/>
+          <p:cNvCxnSpPr>
+            <a:cxnSpLocks/>
+          </p:cNvCxnSpPr>
           <p:nvPr/>
         </p:nvCxnSpPr>
         <p:spPr>
           <a:xfrm>
-            <a:off x="9998795" y="2973664"/>
-            <a:ext cx="338" cy="319043"/>
+            <a:off x="9975512" y="3496442"/>
+            <a:ext cx="338" cy="255933"/>
           </a:xfrm>
           <a:prstGeom prst="straightConnector1">
             <a:avLst/>
@@ -4376,7 +4322,7 @@
         </p:nvCxnSpPr>
         <p:spPr>
           <a:xfrm flipH="1">
-            <a:off x="8342388" y="3534742"/>
+            <a:off x="8319105" y="4010992"/>
             <a:ext cx="930487" cy="0"/>
           </a:xfrm>
           <a:prstGeom prst="straightConnector1">
@@ -4415,8 +4361,8 @@
         </p:nvSpPr>
         <p:spPr>
           <a:xfrm>
-            <a:off x="67262" y="3346882"/>
-            <a:ext cx="1468857" cy="465667"/>
+            <a:off x="5659" y="3736245"/>
+            <a:ext cx="1598571" cy="465667"/>
           </a:xfrm>
           <a:prstGeom prst="rect">
             <a:avLst/>
@@ -4453,7 +4399,7 @@
                   <a:schemeClr val="tx1"/>
                 </a:solidFill>
               </a:rPr>
-              <a:t>Write_both</a:t>
+              <a:t>STATE_write_both</a:t>
             </a:r>
             <a:endParaRPr lang="de-DE" sz="1400" dirty="0">
               <a:solidFill>
@@ -4479,7 +4425,7 @@
         </p:nvCxnSpPr>
         <p:spPr>
           <a:xfrm flipH="1">
-            <a:off x="2049917" y="4296742"/>
+            <a:off x="2026634" y="4772992"/>
             <a:ext cx="5062161" cy="0"/>
           </a:xfrm>
           <a:prstGeom prst="straightConnector1">
@@ -4518,7 +4464,7 @@
         </p:nvSpPr>
         <p:spPr>
           <a:xfrm>
-            <a:off x="7052189" y="4226074"/>
+            <a:off x="7028906" y="4702324"/>
             <a:ext cx="118531" cy="120961"/>
           </a:xfrm>
           <a:prstGeom prst="ellipse">
@@ -4566,7 +4512,7 @@
         </p:nvCxnSpPr>
         <p:spPr>
           <a:xfrm flipH="1">
-            <a:off x="2958519" y="4466674"/>
+            <a:off x="2935236" y="4942924"/>
             <a:ext cx="5383869" cy="0"/>
           </a:xfrm>
           <a:prstGeom prst="straightConnector1">
@@ -4605,7 +4551,7 @@
         </p:nvSpPr>
         <p:spPr>
           <a:xfrm>
-            <a:off x="8283122" y="4406193"/>
+            <a:off x="8259839" y="4882443"/>
             <a:ext cx="118531" cy="120961"/>
           </a:xfrm>
           <a:prstGeom prst="ellipse">
@@ -4639,10 +4585,10 @@
       </p:sp>
       <p:sp>
         <p:nvSpPr>
-          <p:cNvPr id="59" name="Rechteck 58">
-            <a:extLst>
-              <a:ext uri="{FF2B5EF4-FFF2-40B4-BE49-F238E27FC236}">
-                <a16:creationId xmlns:a16="http://schemas.microsoft.com/office/drawing/2014/main" id="{A60AB9B3-8EF2-0EDF-A8A6-BB9D3F48E5CE}"/>
+          <p:cNvPr id="60" name="Rechteck 59">
+            <a:extLst>
+              <a:ext uri="{FF2B5EF4-FFF2-40B4-BE49-F238E27FC236}">
+                <a16:creationId xmlns:a16="http://schemas.microsoft.com/office/drawing/2014/main" id="{A9AD6250-293A-0DA3-F615-89B98A5B6BD8}"/>
               </a:ext>
             </a:extLst>
           </p:cNvPr>
@@ -4651,12 +4597,13 @@
         </p:nvSpPr>
         <p:spPr>
           <a:xfrm>
-            <a:off x="0" y="4045526"/>
-            <a:ext cx="10760392" cy="45719"/>
+            <a:off x="43979" y="5741615"/>
+            <a:ext cx="1468857" cy="465667"/>
           </a:xfrm>
           <a:prstGeom prst="rect">
             <a:avLst/>
           </a:prstGeom>
+          <a:noFill/>
           <a:ln>
             <a:noFill/>
           </a:ln>
@@ -4682,16 +4629,28 @@
           <a:lstStyle/>
           <a:p>
             <a:pPr algn="ctr"/>
-            <a:endParaRPr lang="de-DE"/>
-          </a:p>
-        </p:txBody>
-      </p:sp>
-      <p:sp>
-        <p:nvSpPr>
-          <p:cNvPr id="60" name="Rechteck 59">
-            <a:extLst>
-              <a:ext uri="{FF2B5EF4-FFF2-40B4-BE49-F238E27FC236}">
-                <a16:creationId xmlns:a16="http://schemas.microsoft.com/office/drawing/2014/main" id="{A9AD6250-293A-0DA3-F615-89B98A5B6BD8}"/>
+            <a:r>
+              <a:rPr lang="de-DE" sz="1400" dirty="0" err="1">
+                <a:solidFill>
+                  <a:schemeClr val="tx1"/>
+                </a:solidFill>
+              </a:rPr>
+              <a:t>STATE_calc</a:t>
+            </a:r>
+            <a:endParaRPr lang="de-DE" sz="1400" dirty="0">
+              <a:solidFill>
+                <a:schemeClr val="tx1"/>
+              </a:solidFill>
+            </a:endParaRPr>
+          </a:p>
+        </p:txBody>
+      </p:sp>
+      <p:sp>
+        <p:nvSpPr>
+          <p:cNvPr id="61" name="Rechteck 60">
+            <a:extLst>
+              <a:ext uri="{FF2B5EF4-FFF2-40B4-BE49-F238E27FC236}">
+                <a16:creationId xmlns:a16="http://schemas.microsoft.com/office/drawing/2014/main" id="{CBC863EC-018F-E9F4-5BD3-7654655E98AB}"/>
               </a:ext>
             </a:extLst>
           </p:cNvPr>
@@ -4700,16 +4659,13 @@
         </p:nvSpPr>
         <p:spPr>
           <a:xfrm>
-            <a:off x="67262" y="5265365"/>
-            <a:ext cx="1468857" cy="465667"/>
+            <a:off x="9208137" y="5822452"/>
+            <a:ext cx="1534750" cy="509241"/>
           </a:xfrm>
           <a:prstGeom prst="rect">
             <a:avLst/>
           </a:prstGeom>
           <a:noFill/>
-          <a:ln>
-            <a:noFill/>
-          </a:ln>
         </p:spPr>
         <p:style>
           <a:lnRef idx="2">
@@ -4733,66 +4689,7 @@
           <a:p>
             <a:pPr algn="ctr"/>
             <a:r>
-              <a:rPr lang="de-DE" sz="1400" dirty="0" err="1">
-                <a:solidFill>
-                  <a:schemeClr val="tx1"/>
-                </a:solidFill>
-              </a:rPr>
-              <a:t>calc</a:t>
-            </a:r>
-            <a:endParaRPr lang="de-DE" sz="1400" dirty="0">
-              <a:solidFill>
-                <a:schemeClr val="tx1"/>
-              </a:solidFill>
-            </a:endParaRPr>
-          </a:p>
-        </p:txBody>
-      </p:sp>
-      <p:sp>
-        <p:nvSpPr>
-          <p:cNvPr id="61" name="Rechteck 60">
-            <a:extLst>
-              <a:ext uri="{FF2B5EF4-FFF2-40B4-BE49-F238E27FC236}">
-                <a16:creationId xmlns:a16="http://schemas.microsoft.com/office/drawing/2014/main" id="{CBC863EC-018F-E9F4-5BD3-7654655E98AB}"/>
-              </a:ext>
-            </a:extLst>
-          </p:cNvPr>
-          <p:cNvSpPr/>
-          <p:nvPr/>
-        </p:nvSpPr>
-        <p:spPr>
-          <a:xfrm>
-            <a:off x="9231420" y="5292913"/>
-            <a:ext cx="1534750" cy="509241"/>
-          </a:xfrm>
-          <a:prstGeom prst="rect">
-            <a:avLst/>
-          </a:prstGeom>
-          <a:noFill/>
-        </p:spPr>
-        <p:style>
-          <a:lnRef idx="2">
-            <a:schemeClr val="accent1">
-              <a:shade val="15000"/>
-            </a:schemeClr>
-          </a:lnRef>
-          <a:fillRef idx="1">
-            <a:schemeClr val="accent1"/>
-          </a:fillRef>
-          <a:effectRef idx="0">
-            <a:schemeClr val="accent1"/>
-          </a:effectRef>
-          <a:fontRef idx="minor">
-            <a:schemeClr val="lt1"/>
-          </a:fontRef>
-        </p:style>
-        <p:txBody>
-          <a:bodyPr rtlCol="0" anchor="ctr"/>
-          <a:lstStyle/>
-          <a:p>
-            <a:pPr algn="ctr"/>
-            <a:r>
-              <a:rPr lang="de-DE" dirty="0">
+              <a:rPr lang="de-DE" sz="1400" dirty="0">
                 <a:solidFill>
                   <a:schemeClr val="tx1"/>
                 </a:solidFill>
@@ -4818,7 +4715,7 @@
         </p:nvCxnSpPr>
         <p:spPr>
           <a:xfrm>
-            <a:off x="2031999" y="5460993"/>
+            <a:off x="2008716" y="5937243"/>
             <a:ext cx="7198586" cy="10273"/>
           </a:xfrm>
           <a:prstGeom prst="straightConnector1">
@@ -4859,7 +4756,7 @@
         </p:nvCxnSpPr>
         <p:spPr>
           <a:xfrm flipV="1">
-            <a:off x="2963332" y="5621860"/>
+            <a:off x="2940049" y="6098110"/>
             <a:ext cx="6263217" cy="1806"/>
           </a:xfrm>
           <a:prstGeom prst="straightConnector1">
@@ -4898,7 +4795,7 @@
         </p:nvSpPr>
         <p:spPr>
           <a:xfrm>
-            <a:off x="2899253" y="5563185"/>
+            <a:off x="2875970" y="6039435"/>
             <a:ext cx="118531" cy="120961"/>
           </a:xfrm>
           <a:prstGeom prst="ellipse">
@@ -4944,7 +4841,7 @@
         </p:nvSpPr>
         <p:spPr>
           <a:xfrm>
-            <a:off x="1973718" y="5394295"/>
+            <a:off x="1950435" y="5870545"/>
             <a:ext cx="118531" cy="120961"/>
           </a:xfrm>
           <a:prstGeom prst="ellipse">
@@ -4985,13 +4882,15 @@
               </a:ext>
             </a:extLst>
           </p:cNvPr>
-          <p:cNvCxnSpPr/>
+          <p:cNvCxnSpPr>
+            <a:cxnSpLocks/>
+          </p:cNvCxnSpPr>
           <p:nvPr/>
         </p:nvCxnSpPr>
         <p:spPr>
           <a:xfrm>
-            <a:off x="9998795" y="5830770"/>
-            <a:ext cx="338" cy="319043"/>
+            <a:off x="9975850" y="6351716"/>
+            <a:ext cx="0" cy="274347"/>
           </a:xfrm>
           <a:prstGeom prst="straightConnector1">
             <a:avLst/>
@@ -5015,12 +4914,53 @@
           </a:fontRef>
         </p:style>
       </p:cxnSp>
-      <p:sp>
-        <p:nvSpPr>
-          <p:cNvPr id="68" name="Rechteck 67">
-            <a:extLst>
-              <a:ext uri="{FF2B5EF4-FFF2-40B4-BE49-F238E27FC236}">
-                <a16:creationId xmlns:a16="http://schemas.microsoft.com/office/drawing/2014/main" id="{B80250FB-85E4-57D8-E75A-B526F55AF8A7}"/>
+      <p:cxnSp>
+        <p:nvCxnSpPr>
+          <p:cNvPr id="69" name="Gerade Verbindung mit Pfeil 68">
+            <a:extLst>
+              <a:ext uri="{FF2B5EF4-FFF2-40B4-BE49-F238E27FC236}">
+                <a16:creationId xmlns:a16="http://schemas.microsoft.com/office/drawing/2014/main" id="{CCE68221-9F16-3269-BE4B-E4C4F3B1D17B}"/>
+              </a:ext>
+            </a:extLst>
+          </p:cNvPr>
+          <p:cNvCxnSpPr>
+            <a:cxnSpLocks/>
+          </p:cNvCxnSpPr>
+          <p:nvPr/>
+        </p:nvCxnSpPr>
+        <p:spPr>
+          <a:xfrm flipH="1">
+            <a:off x="4150784" y="6880684"/>
+            <a:ext cx="5038919" cy="0"/>
+          </a:xfrm>
+          <a:prstGeom prst="straightConnector1">
+            <a:avLst/>
+          </a:prstGeom>
+          <a:ln>
+            <a:tailEnd type="triangle"/>
+          </a:ln>
+        </p:spPr>
+        <p:style>
+          <a:lnRef idx="2">
+            <a:schemeClr val="accent1"/>
+          </a:lnRef>
+          <a:fillRef idx="0">
+            <a:schemeClr val="accent1"/>
+          </a:fillRef>
+          <a:effectRef idx="1">
+            <a:schemeClr val="accent1"/>
+          </a:effectRef>
+          <a:fontRef idx="minor">
+            <a:schemeClr val="tx1"/>
+          </a:fontRef>
+        </p:style>
+      </p:cxnSp>
+      <p:sp>
+        <p:nvSpPr>
+          <p:cNvPr id="71" name="Rechteck 70">
+            <a:extLst>
+              <a:ext uri="{FF2B5EF4-FFF2-40B4-BE49-F238E27FC236}">
+                <a16:creationId xmlns:a16="http://schemas.microsoft.com/office/drawing/2014/main" id="{51156D3F-6523-F492-3225-A21924BB80E2}"/>
               </a:ext>
             </a:extLst>
           </p:cNvPr>
@@ -5029,13 +4969,16 @@
         </p:nvSpPr>
         <p:spPr>
           <a:xfrm>
-            <a:off x="9231420" y="6149813"/>
-            <a:ext cx="1534750" cy="509241"/>
+            <a:off x="52401" y="7437467"/>
+            <a:ext cx="1468857" cy="465667"/>
           </a:xfrm>
           <a:prstGeom prst="rect">
             <a:avLst/>
           </a:prstGeom>
           <a:noFill/>
+          <a:ln>
+            <a:noFill/>
+          </a:ln>
         </p:spPr>
         <p:style>
           <a:lnRef idx="2">
@@ -5059,14 +5002,14 @@
           <a:p>
             <a:pPr algn="ctr"/>
             <a:r>
-              <a:rPr lang="de-DE" dirty="0" err="1">
+              <a:rPr lang="de-DE" sz="1400" dirty="0" err="1">
                 <a:solidFill>
                   <a:schemeClr val="tx1"/>
                 </a:solidFill>
               </a:rPr>
-              <a:t>Write_back</a:t>
-            </a:r>
-            <a:endParaRPr lang="de-DE" dirty="0">
+              <a:t>STATE_check_if_zero</a:t>
+            </a:r>
+            <a:endParaRPr lang="de-DE" sz="1400" dirty="0">
               <a:solidFill>
                 <a:schemeClr val="tx1"/>
               </a:solidFill>
@@ -5074,53 +5017,12 @@
           </a:p>
         </p:txBody>
       </p:sp>
-      <p:cxnSp>
-        <p:nvCxnSpPr>
-          <p:cNvPr id="69" name="Gerade Verbindung mit Pfeil 68">
-            <a:extLst>
-              <a:ext uri="{FF2B5EF4-FFF2-40B4-BE49-F238E27FC236}">
-                <a16:creationId xmlns:a16="http://schemas.microsoft.com/office/drawing/2014/main" id="{CCE68221-9F16-3269-BE4B-E4C4F3B1D17B}"/>
-              </a:ext>
-            </a:extLst>
-          </p:cNvPr>
-          <p:cNvCxnSpPr>
-            <a:cxnSpLocks/>
-          </p:cNvCxnSpPr>
-          <p:nvPr/>
-        </p:nvCxnSpPr>
-        <p:spPr>
-          <a:xfrm flipH="1">
-            <a:off x="4174067" y="6404434"/>
-            <a:ext cx="5038919" cy="0"/>
-          </a:xfrm>
-          <a:prstGeom prst="straightConnector1">
-            <a:avLst/>
-          </a:prstGeom>
-          <a:ln>
-            <a:tailEnd type="triangle"/>
-          </a:ln>
-        </p:spPr>
-        <p:style>
-          <a:lnRef idx="2">
-            <a:schemeClr val="accent1"/>
-          </a:lnRef>
-          <a:fillRef idx="0">
-            <a:schemeClr val="accent1"/>
-          </a:fillRef>
-          <a:effectRef idx="1">
-            <a:schemeClr val="accent1"/>
-          </a:effectRef>
-          <a:fontRef idx="minor">
-            <a:schemeClr val="tx1"/>
-          </a:fontRef>
-        </p:style>
-      </p:cxnSp>
-      <p:sp>
-        <p:nvSpPr>
-          <p:cNvPr id="71" name="Rechteck 70">
-            <a:extLst>
-              <a:ext uri="{FF2B5EF4-FFF2-40B4-BE49-F238E27FC236}">
-                <a16:creationId xmlns:a16="http://schemas.microsoft.com/office/drawing/2014/main" id="{51156D3F-6523-F492-3225-A21924BB80E2}"/>
+      <p:sp>
+        <p:nvSpPr>
+          <p:cNvPr id="77" name="Rechteck 76">
+            <a:extLst>
+              <a:ext uri="{FF2B5EF4-FFF2-40B4-BE49-F238E27FC236}">
+                <a16:creationId xmlns:a16="http://schemas.microsoft.com/office/drawing/2014/main" id="{7720C4B6-261F-D08A-F95A-1E7D332A0763}"/>
               </a:ext>
             </a:extLst>
           </p:cNvPr>
@@ -5129,8 +5031,8 @@
         </p:nvSpPr>
         <p:spPr>
           <a:xfrm>
-            <a:off x="75684" y="6897114"/>
-            <a:ext cx="1468857" cy="465667"/>
+            <a:off x="-12022" y="8130516"/>
+            <a:ext cx="1616252" cy="465667"/>
           </a:xfrm>
           <a:prstGeom prst="rect">
             <a:avLst/>
@@ -5162,27 +5064,63 @@
           <a:p>
             <a:pPr algn="ctr"/>
             <a:r>
-              <a:rPr lang="de-DE" sz="1400" dirty="0" err="1">
+              <a:rPr lang="de-DE" sz="1400" dirty="0">
                 <a:solidFill>
                   <a:schemeClr val="tx1"/>
                 </a:solidFill>
               </a:rPr>
-              <a:t>Check_if_zero</a:t>
-            </a:r>
-            <a:endParaRPr lang="de-DE" sz="1400" dirty="0">
-              <a:solidFill>
-                <a:schemeClr val="tx1"/>
-              </a:solidFill>
-            </a:endParaRPr>
-          </a:p>
-        </p:txBody>
-      </p:sp>
-      <p:sp>
-        <p:nvSpPr>
-          <p:cNvPr id="72" name="Rechteck 71">
-            <a:extLst>
-              <a:ext uri="{FF2B5EF4-FFF2-40B4-BE49-F238E27FC236}">
-                <a16:creationId xmlns:a16="http://schemas.microsoft.com/office/drawing/2014/main" id="{00026B7E-FECB-FC38-553F-CAE1AB510F7A}"/>
+              <a:t>STATE_write_Zahl2</a:t>
+            </a:r>
+          </a:p>
+        </p:txBody>
+      </p:sp>
+      <p:cxnSp>
+        <p:nvCxnSpPr>
+          <p:cNvPr id="78" name="Gerade Verbindung mit Pfeil 77">
+            <a:extLst>
+              <a:ext uri="{FF2B5EF4-FFF2-40B4-BE49-F238E27FC236}">
+                <a16:creationId xmlns:a16="http://schemas.microsoft.com/office/drawing/2014/main" id="{A073A909-78F1-B555-4A99-643ACFE6E1BB}"/>
+              </a:ext>
+            </a:extLst>
+          </p:cNvPr>
+          <p:cNvCxnSpPr>
+            <a:cxnSpLocks/>
+          </p:cNvCxnSpPr>
+          <p:nvPr/>
+        </p:nvCxnSpPr>
+        <p:spPr>
+          <a:xfrm flipH="1">
+            <a:off x="2008716" y="8467248"/>
+            <a:ext cx="926519" cy="0"/>
+          </a:xfrm>
+          <a:prstGeom prst="straightConnector1">
+            <a:avLst/>
+          </a:prstGeom>
+          <a:ln>
+            <a:tailEnd type="triangle"/>
+          </a:ln>
+        </p:spPr>
+        <p:style>
+          <a:lnRef idx="2">
+            <a:schemeClr val="accent1"/>
+          </a:lnRef>
+          <a:fillRef idx="0">
+            <a:schemeClr val="accent1"/>
+          </a:fillRef>
+          <a:effectRef idx="1">
+            <a:schemeClr val="accent1"/>
+          </a:effectRef>
+          <a:fontRef idx="minor">
+            <a:schemeClr val="tx1"/>
+          </a:fontRef>
+        </p:style>
+      </p:cxnSp>
+      <p:sp>
+        <p:nvSpPr>
+          <p:cNvPr id="80" name="Ellipse 79">
+            <a:extLst>
+              <a:ext uri="{FF2B5EF4-FFF2-40B4-BE49-F238E27FC236}">
+                <a16:creationId xmlns:a16="http://schemas.microsoft.com/office/drawing/2014/main" id="{3B61CD05-1307-3AE5-0E17-C11640C60163}"/>
               </a:ext>
             </a:extLst>
           </p:cNvPr>
@@ -5191,13 +5129,12 @@
         </p:nvSpPr>
         <p:spPr>
           <a:xfrm>
-            <a:off x="9225642" y="6978097"/>
-            <a:ext cx="1534750" cy="509241"/>
-          </a:xfrm>
-          <a:prstGeom prst="rect">
-            <a:avLst/>
-          </a:prstGeom>
-          <a:noFill/>
+            <a:off x="2874985" y="8406767"/>
+            <a:ext cx="118531" cy="120961"/>
+          </a:xfrm>
+          <a:prstGeom prst="ellipse">
+            <a:avLst/>
+          </a:prstGeom>
         </p:spPr>
         <p:style>
           <a:lnRef idx="2">
@@ -5220,28 +5157,16 @@
           <a:lstStyle/>
           <a:p>
             <a:pPr algn="ctr"/>
-            <a:r>
-              <a:rPr lang="de-DE" sz="1600" dirty="0" err="1">
-                <a:solidFill>
-                  <a:schemeClr val="tx1"/>
-                </a:solidFill>
-              </a:rPr>
-              <a:t>Check_if_zero</a:t>
-            </a:r>
-            <a:endParaRPr lang="de-DE" sz="1600" dirty="0">
-              <a:solidFill>
-                <a:schemeClr val="tx1"/>
-              </a:solidFill>
-            </a:endParaRPr>
+            <a:endParaRPr lang="de-DE"/>
           </a:p>
         </p:txBody>
       </p:sp>
       <p:cxnSp>
         <p:nvCxnSpPr>
-          <p:cNvPr id="73" name="Gerade Verbindung mit Pfeil 72">
-            <a:extLst>
-              <a:ext uri="{FF2B5EF4-FFF2-40B4-BE49-F238E27FC236}">
-                <a16:creationId xmlns:a16="http://schemas.microsoft.com/office/drawing/2014/main" id="{47F0E547-70D5-FB69-636B-9A0D0254D7DC}"/>
+          <p:cNvPr id="81" name="Gerade Verbindung mit Pfeil 80">
+            <a:extLst>
+              <a:ext uri="{FF2B5EF4-FFF2-40B4-BE49-F238E27FC236}">
+                <a16:creationId xmlns:a16="http://schemas.microsoft.com/office/drawing/2014/main" id="{ED4E16C3-9025-45D7-7157-56F62E3E9DAC}"/>
               </a:ext>
             </a:extLst>
           </p:cNvPr>
@@ -5251,9 +5176,9 @@
           <p:nvPr/>
         </p:nvCxnSpPr>
         <p:spPr>
-          <a:xfrm>
-            <a:off x="4174067" y="7232717"/>
-            <a:ext cx="5051575" cy="0"/>
+          <a:xfrm flipH="1">
+            <a:off x="2935235" y="9230930"/>
+            <a:ext cx="1214802" cy="0"/>
           </a:xfrm>
           <a:prstGeom prst="straightConnector1">
             <a:avLst/>
@@ -5279,10 +5204,10 @@
       </p:cxnSp>
       <p:sp>
         <p:nvSpPr>
-          <p:cNvPr id="76" name="Ellipse 75">
-            <a:extLst>
-              <a:ext uri="{FF2B5EF4-FFF2-40B4-BE49-F238E27FC236}">
-                <a16:creationId xmlns:a16="http://schemas.microsoft.com/office/drawing/2014/main" id="{392CF051-C84E-C795-7AB6-5D3951C157C1}"/>
+          <p:cNvPr id="82" name="Ellipse 81">
+            <a:extLst>
+              <a:ext uri="{FF2B5EF4-FFF2-40B4-BE49-F238E27FC236}">
+                <a16:creationId xmlns:a16="http://schemas.microsoft.com/office/drawing/2014/main" id="{10C555A1-BB95-2126-D308-800B2444EC07}"/>
               </a:ext>
             </a:extLst>
           </p:cNvPr>
@@ -5291,7 +5216,7 @@
         </p:nvSpPr>
         <p:spPr>
           <a:xfrm>
-            <a:off x="4113070" y="7172236"/>
+            <a:off x="4089787" y="9170449"/>
             <a:ext cx="118531" cy="120961"/>
           </a:xfrm>
           <a:prstGeom prst="ellipse">
@@ -5323,12 +5248,53 @@
           </a:p>
         </p:txBody>
       </p:sp>
-      <p:sp>
-        <p:nvSpPr>
-          <p:cNvPr id="77" name="Rechteck 76">
-            <a:extLst>
-              <a:ext uri="{FF2B5EF4-FFF2-40B4-BE49-F238E27FC236}">
-                <a16:creationId xmlns:a16="http://schemas.microsoft.com/office/drawing/2014/main" id="{7720C4B6-261F-D08A-F95A-1E7D332A0763}"/>
+      <p:cxnSp>
+        <p:nvCxnSpPr>
+          <p:cNvPr id="84" name="Gerade Verbindung mit Pfeil 83">
+            <a:extLst>
+              <a:ext uri="{FF2B5EF4-FFF2-40B4-BE49-F238E27FC236}">
+                <a16:creationId xmlns:a16="http://schemas.microsoft.com/office/drawing/2014/main" id="{A7D20993-27D7-A9CD-8F00-4855C590AC5E}"/>
+              </a:ext>
+            </a:extLst>
+          </p:cNvPr>
+          <p:cNvCxnSpPr>
+            <a:cxnSpLocks/>
+          </p:cNvCxnSpPr>
+          <p:nvPr/>
+        </p:nvCxnSpPr>
+        <p:spPr>
+          <a:xfrm>
+            <a:off x="4173645" y="9509812"/>
+            <a:ext cx="1433405" cy="0"/>
+          </a:xfrm>
+          <a:prstGeom prst="straightConnector1">
+            <a:avLst/>
+          </a:prstGeom>
+          <a:ln>
+            <a:tailEnd type="triangle"/>
+          </a:ln>
+        </p:spPr>
+        <p:style>
+          <a:lnRef idx="2">
+            <a:schemeClr val="accent1"/>
+          </a:lnRef>
+          <a:fillRef idx="0">
+            <a:schemeClr val="accent1"/>
+          </a:fillRef>
+          <a:effectRef idx="1">
+            <a:schemeClr val="accent1"/>
+          </a:effectRef>
+          <a:fontRef idx="minor">
+            <a:schemeClr val="tx1"/>
+          </a:fontRef>
+        </p:style>
+      </p:cxnSp>
+      <p:sp>
+        <p:nvSpPr>
+          <p:cNvPr id="85" name="Ellipse 84">
+            <a:extLst>
+              <a:ext uri="{FF2B5EF4-FFF2-40B4-BE49-F238E27FC236}">
+                <a16:creationId xmlns:a16="http://schemas.microsoft.com/office/drawing/2014/main" id="{999A40F5-CAEF-DFB5-13D0-33A6B36DE61C}"/>
               </a:ext>
             </a:extLst>
           </p:cNvPr>
@@ -5337,16 +5303,12 @@
         </p:nvSpPr>
         <p:spPr>
           <a:xfrm>
-            <a:off x="97476" y="7691546"/>
-            <a:ext cx="1468857" cy="465667"/>
-          </a:xfrm>
-          <a:prstGeom prst="rect">
-            <a:avLst/>
-          </a:prstGeom>
-          <a:noFill/>
-          <a:ln>
-            <a:noFill/>
-          </a:ln>
+            <a:off x="4112648" y="9449331"/>
+            <a:ext cx="118531" cy="120961"/>
+          </a:xfrm>
+          <a:prstGeom prst="ellipse">
+            <a:avLst/>
+          </a:prstGeom>
         </p:spPr>
         <p:style>
           <a:lnRef idx="2">
@@ -5369,78 +5331,424 @@
           <a:lstStyle/>
           <a:p>
             <a:pPr algn="ctr"/>
-            <a:r>
-              <a:rPr lang="de-DE" sz="1400" dirty="0">
-                <a:solidFill>
-                  <a:schemeClr val="tx1"/>
-                </a:solidFill>
-              </a:rPr>
-              <a:t>Write_Zahl2</a:t>
-            </a:r>
-          </a:p>
-        </p:txBody>
-      </p:sp>
-      <p:cxnSp>
-        <p:nvCxnSpPr>
-          <p:cNvPr id="78" name="Gerade Verbindung mit Pfeil 77">
-            <a:extLst>
-              <a:ext uri="{FF2B5EF4-FFF2-40B4-BE49-F238E27FC236}">
-                <a16:creationId xmlns:a16="http://schemas.microsoft.com/office/drawing/2014/main" id="{A073A909-78F1-B555-4A99-643ACFE6E1BB}"/>
-              </a:ext>
-            </a:extLst>
-          </p:cNvPr>
-          <p:cNvCxnSpPr>
-            <a:cxnSpLocks/>
-          </p:cNvCxnSpPr>
-          <p:nvPr/>
-        </p:nvCxnSpPr>
-        <p:spPr>
-          <a:xfrm flipH="1">
-            <a:off x="2031999" y="7990998"/>
-            <a:ext cx="926519" cy="0"/>
-          </a:xfrm>
-          <a:prstGeom prst="straightConnector1">
-            <a:avLst/>
-          </a:prstGeom>
+            <a:endParaRPr lang="de-DE"/>
+          </a:p>
+        </p:txBody>
+      </p:sp>
+      <p:sp>
+        <p:nvSpPr>
+          <p:cNvPr id="2" name="Textfeld 1">
+            <a:extLst>
+              <a:ext uri="{FF2B5EF4-FFF2-40B4-BE49-F238E27FC236}">
+                <a16:creationId xmlns:a16="http://schemas.microsoft.com/office/drawing/2014/main" id="{2D9047BC-DD66-3BD3-C6D8-641FC7787DE4}"/>
+              </a:ext>
+            </a:extLst>
+          </p:cNvPr>
+          <p:cNvSpPr txBox="1"/>
+          <p:nvPr/>
+        </p:nvSpPr>
+        <p:spPr>
+          <a:xfrm>
+            <a:off x="5711666" y="1069415"/>
+            <a:ext cx="1516269" cy="276999"/>
+          </a:xfrm>
+          <a:prstGeom prst="rect">
+            <a:avLst/>
+          </a:prstGeom>
+          <a:noFill/>
+        </p:spPr>
+        <p:txBody>
+          <a:bodyPr wrap="square" rtlCol="0">
+            <a:spAutoFit/>
+          </a:bodyPr>
+          <a:lstStyle/>
+          <a:p>
+            <a:r>
+              <a:rPr lang="de-DE" sz="1200" dirty="0"/>
+              <a:t>Zahl1_to_alu_a</a:t>
+            </a:r>
+          </a:p>
+        </p:txBody>
+      </p:sp>
+      <p:sp>
+        <p:nvSpPr>
+          <p:cNvPr id="3" name="Textfeld 2">
+            <a:extLst>
+              <a:ext uri="{FF2B5EF4-FFF2-40B4-BE49-F238E27FC236}">
+                <a16:creationId xmlns:a16="http://schemas.microsoft.com/office/drawing/2014/main" id="{23EE528B-8F72-E92F-2306-B8FD5A20B1BB}"/>
+              </a:ext>
+            </a:extLst>
+          </p:cNvPr>
+          <p:cNvSpPr txBox="1"/>
+          <p:nvPr/>
+        </p:nvSpPr>
+        <p:spPr>
+          <a:xfrm>
+            <a:off x="5711666" y="2829168"/>
+            <a:ext cx="1516269" cy="276999"/>
+          </a:xfrm>
+          <a:prstGeom prst="rect">
+            <a:avLst/>
+          </a:prstGeom>
+          <a:noFill/>
+        </p:spPr>
+        <p:txBody>
+          <a:bodyPr wrap="square" rtlCol="0">
+            <a:spAutoFit/>
+          </a:bodyPr>
+          <a:lstStyle/>
+          <a:p>
+            <a:r>
+              <a:rPr lang="de-DE" sz="1200" dirty="0"/>
+              <a:t>Zahl1_to_alu_a</a:t>
+            </a:r>
+          </a:p>
+        </p:txBody>
+      </p:sp>
+      <p:sp>
+        <p:nvSpPr>
+          <p:cNvPr id="12" name="Textfeld 11">
+            <a:extLst>
+              <a:ext uri="{FF2B5EF4-FFF2-40B4-BE49-F238E27FC236}">
+                <a16:creationId xmlns:a16="http://schemas.microsoft.com/office/drawing/2014/main" id="{2AA94794-B13F-5AF8-8684-569A8810D3D5}"/>
+              </a:ext>
+            </a:extLst>
+          </p:cNvPr>
+          <p:cNvSpPr txBox="1"/>
+          <p:nvPr/>
+        </p:nvSpPr>
+        <p:spPr>
+          <a:xfrm>
+            <a:off x="5711665" y="5712850"/>
+            <a:ext cx="1516269" cy="276999"/>
+          </a:xfrm>
+          <a:prstGeom prst="rect">
+            <a:avLst/>
+          </a:prstGeom>
+          <a:noFill/>
+        </p:spPr>
+        <p:txBody>
+          <a:bodyPr wrap="square" rtlCol="0">
+            <a:spAutoFit/>
+          </a:bodyPr>
+          <a:lstStyle/>
+          <a:p>
+            <a:r>
+              <a:rPr lang="de-DE" sz="1200" dirty="0"/>
+              <a:t>Zahl1_to_alu_a</a:t>
+            </a:r>
+          </a:p>
+        </p:txBody>
+      </p:sp>
+      <p:sp>
+        <p:nvSpPr>
+          <p:cNvPr id="14" name="Textfeld 13">
+            <a:extLst>
+              <a:ext uri="{FF2B5EF4-FFF2-40B4-BE49-F238E27FC236}">
+                <a16:creationId xmlns:a16="http://schemas.microsoft.com/office/drawing/2014/main" id="{0B53E165-BA94-07B4-A60B-985313A396D4}"/>
+              </a:ext>
+            </a:extLst>
+          </p:cNvPr>
+          <p:cNvSpPr txBox="1"/>
+          <p:nvPr/>
+        </p:nvSpPr>
+        <p:spPr>
+          <a:xfrm>
+            <a:off x="5711665" y="1443143"/>
+            <a:ext cx="1516269" cy="276999"/>
+          </a:xfrm>
+          <a:prstGeom prst="rect">
+            <a:avLst/>
+          </a:prstGeom>
+          <a:noFill/>
+        </p:spPr>
+        <p:txBody>
+          <a:bodyPr wrap="square" rtlCol="0">
+            <a:spAutoFit/>
+          </a:bodyPr>
+          <a:lstStyle/>
+          <a:p>
+            <a:r>
+              <a:rPr lang="de-DE" sz="1200" dirty="0"/>
+              <a:t>Zahl2_to_alu_b</a:t>
+            </a:r>
+          </a:p>
+        </p:txBody>
+      </p:sp>
+      <p:sp>
+        <p:nvSpPr>
+          <p:cNvPr id="21" name="Textfeld 20">
+            <a:extLst>
+              <a:ext uri="{FF2B5EF4-FFF2-40B4-BE49-F238E27FC236}">
+                <a16:creationId xmlns:a16="http://schemas.microsoft.com/office/drawing/2014/main" id="{A0170DF2-C3CE-ECD7-4290-34B4EEA5B160}"/>
+              </a:ext>
+            </a:extLst>
+          </p:cNvPr>
+          <p:cNvSpPr txBox="1"/>
+          <p:nvPr/>
+        </p:nvSpPr>
+        <p:spPr>
+          <a:xfrm>
+            <a:off x="5711665" y="3245923"/>
+            <a:ext cx="1516269" cy="276999"/>
+          </a:xfrm>
+          <a:prstGeom prst="rect">
+            <a:avLst/>
+          </a:prstGeom>
+          <a:noFill/>
+        </p:spPr>
+        <p:txBody>
+          <a:bodyPr wrap="square" rtlCol="0">
+            <a:spAutoFit/>
+          </a:bodyPr>
+          <a:lstStyle/>
+          <a:p>
+            <a:r>
+              <a:rPr lang="de-DE" sz="1200" dirty="0"/>
+              <a:t>Zahl2_to_alu_b</a:t>
+            </a:r>
+          </a:p>
+        </p:txBody>
+      </p:sp>
+      <p:sp>
+        <p:nvSpPr>
+          <p:cNvPr id="22" name="Textfeld 21">
+            <a:extLst>
+              <a:ext uri="{FF2B5EF4-FFF2-40B4-BE49-F238E27FC236}">
+                <a16:creationId xmlns:a16="http://schemas.microsoft.com/office/drawing/2014/main" id="{A7BC4504-DF41-7092-4D14-2FE4058FCC5A}"/>
+              </a:ext>
+            </a:extLst>
+          </p:cNvPr>
+          <p:cNvSpPr txBox="1"/>
+          <p:nvPr/>
+        </p:nvSpPr>
+        <p:spPr>
+          <a:xfrm>
+            <a:off x="5711664" y="6083240"/>
+            <a:ext cx="1516269" cy="276999"/>
+          </a:xfrm>
+          <a:prstGeom prst="rect">
+            <a:avLst/>
+          </a:prstGeom>
+          <a:noFill/>
+        </p:spPr>
+        <p:txBody>
+          <a:bodyPr wrap="square" rtlCol="0">
+            <a:spAutoFit/>
+          </a:bodyPr>
+          <a:lstStyle/>
+          <a:p>
+            <a:r>
+              <a:rPr lang="de-DE" sz="1200" dirty="0"/>
+              <a:t>Zahl2_to_alu_b</a:t>
+            </a:r>
+          </a:p>
+        </p:txBody>
+      </p:sp>
+      <p:sp>
+        <p:nvSpPr>
+          <p:cNvPr id="25" name="Textfeld 24">
+            <a:extLst>
+              <a:ext uri="{FF2B5EF4-FFF2-40B4-BE49-F238E27FC236}">
+                <a16:creationId xmlns:a16="http://schemas.microsoft.com/office/drawing/2014/main" id="{CDF051D4-97E4-0C78-772A-8F329FCA45D2}"/>
+              </a:ext>
+            </a:extLst>
+          </p:cNvPr>
+          <p:cNvSpPr txBox="1"/>
+          <p:nvPr/>
+        </p:nvSpPr>
+        <p:spPr>
+          <a:xfrm>
+            <a:off x="4610183" y="9503204"/>
+            <a:ext cx="1806033" cy="276999"/>
+          </a:xfrm>
+          <a:prstGeom prst="rect">
+            <a:avLst/>
+          </a:prstGeom>
+          <a:noFill/>
+        </p:spPr>
+        <p:txBody>
+          <a:bodyPr wrap="square" rtlCol="0">
+            <a:spAutoFit/>
+          </a:bodyPr>
+          <a:lstStyle/>
+          <a:p>
+            <a:r>
+              <a:rPr lang="de-DE" sz="1200" dirty="0" err="1"/>
+              <a:t>wren_to_new_numbers</a:t>
+            </a:r>
+            <a:endParaRPr lang="de-DE" sz="1200" dirty="0"/>
+          </a:p>
+        </p:txBody>
+      </p:sp>
+      <p:sp>
+        <p:nvSpPr>
+          <p:cNvPr id="26" name="Textfeld 25">
+            <a:extLst>
+              <a:ext uri="{FF2B5EF4-FFF2-40B4-BE49-F238E27FC236}">
+                <a16:creationId xmlns:a16="http://schemas.microsoft.com/office/drawing/2014/main" id="{AD22ED96-0F31-A9B7-9E08-5F1DDAC79C64}"/>
+              </a:ext>
+            </a:extLst>
+          </p:cNvPr>
+          <p:cNvSpPr txBox="1"/>
+          <p:nvPr/>
+        </p:nvSpPr>
+        <p:spPr>
+          <a:xfrm>
+            <a:off x="5570875" y="6842052"/>
+            <a:ext cx="1516269" cy="276999"/>
+          </a:xfrm>
+          <a:prstGeom prst="rect">
+            <a:avLst/>
+          </a:prstGeom>
+          <a:noFill/>
+        </p:spPr>
+        <p:txBody>
+          <a:bodyPr wrap="square" rtlCol="0">
+            <a:spAutoFit/>
+          </a:bodyPr>
+          <a:lstStyle/>
+          <a:p>
+            <a:r>
+              <a:rPr lang="de-DE" sz="1200" dirty="0" err="1"/>
+              <a:t>wren_erg_modulo</a:t>
+            </a:r>
+            <a:endParaRPr lang="de-DE" sz="1200" dirty="0"/>
+          </a:p>
+        </p:txBody>
+      </p:sp>
+      <p:sp>
+        <p:nvSpPr>
+          <p:cNvPr id="28" name="Textfeld 27">
+            <a:extLst>
+              <a:ext uri="{FF2B5EF4-FFF2-40B4-BE49-F238E27FC236}">
+                <a16:creationId xmlns:a16="http://schemas.microsoft.com/office/drawing/2014/main" id="{2CADE0CA-0AB2-5667-1BDD-F2CD538590B2}"/>
+              </a:ext>
+            </a:extLst>
+          </p:cNvPr>
+          <p:cNvSpPr txBox="1"/>
+          <p:nvPr/>
+        </p:nvSpPr>
+        <p:spPr>
+          <a:xfrm>
+            <a:off x="4132212" y="5159771"/>
+            <a:ext cx="1516269" cy="276999"/>
+          </a:xfrm>
+          <a:prstGeom prst="rect">
+            <a:avLst/>
+          </a:prstGeom>
+          <a:noFill/>
+        </p:spPr>
+        <p:txBody>
+          <a:bodyPr wrap="square" rtlCol="0">
+            <a:spAutoFit/>
+          </a:bodyPr>
+          <a:lstStyle/>
+          <a:p>
+            <a:r>
+              <a:rPr lang="de-DE" sz="1200" dirty="0" err="1"/>
+              <a:t>wren_zw_in_Zahlen</a:t>
+            </a:r>
+            <a:endParaRPr lang="de-DE" sz="1200" dirty="0"/>
+          </a:p>
+        </p:txBody>
+      </p:sp>
+      <p:sp>
+        <p:nvSpPr>
+          <p:cNvPr id="29" name="Textfeld 28">
+            <a:extLst>
+              <a:ext uri="{FF2B5EF4-FFF2-40B4-BE49-F238E27FC236}">
+                <a16:creationId xmlns:a16="http://schemas.microsoft.com/office/drawing/2014/main" id="{03F51187-88EA-B002-A28A-2747AEB0C853}"/>
+              </a:ext>
+            </a:extLst>
+          </p:cNvPr>
+          <p:cNvSpPr txBox="1"/>
+          <p:nvPr/>
+        </p:nvSpPr>
+        <p:spPr>
+          <a:xfrm>
+            <a:off x="7890747" y="2119676"/>
+            <a:ext cx="1516269" cy="276999"/>
+          </a:xfrm>
+          <a:prstGeom prst="rect">
+            <a:avLst/>
+          </a:prstGeom>
+          <a:noFill/>
+        </p:spPr>
+        <p:txBody>
+          <a:bodyPr wrap="square" rtlCol="0">
+            <a:spAutoFit/>
+          </a:bodyPr>
+          <a:lstStyle/>
+          <a:p>
+            <a:r>
+              <a:rPr lang="de-DE" sz="1200" dirty="0" err="1"/>
+              <a:t>wren_zw_groß</a:t>
+            </a:r>
+            <a:endParaRPr lang="de-DE" sz="1200" dirty="0"/>
+          </a:p>
+        </p:txBody>
+      </p:sp>
+      <p:sp>
+        <p:nvSpPr>
+          <p:cNvPr id="32" name="Textfeld 31">
+            <a:extLst>
+              <a:ext uri="{FF2B5EF4-FFF2-40B4-BE49-F238E27FC236}">
+                <a16:creationId xmlns:a16="http://schemas.microsoft.com/office/drawing/2014/main" id="{08285A18-5A51-56BA-D113-0C1553F76CA0}"/>
+              </a:ext>
+            </a:extLst>
+          </p:cNvPr>
+          <p:cNvSpPr txBox="1"/>
+          <p:nvPr/>
+        </p:nvSpPr>
+        <p:spPr>
+          <a:xfrm>
+            <a:off x="7890747" y="3769846"/>
+            <a:ext cx="1516269" cy="276999"/>
+          </a:xfrm>
+          <a:prstGeom prst="rect">
+            <a:avLst/>
+          </a:prstGeom>
+          <a:noFill/>
+        </p:spPr>
+        <p:txBody>
+          <a:bodyPr wrap="square" rtlCol="0">
+            <a:spAutoFit/>
+          </a:bodyPr>
+          <a:lstStyle/>
+          <a:p>
+            <a:r>
+              <a:rPr lang="de-DE" sz="1200" dirty="0" err="1"/>
+              <a:t>wren_zw_klein</a:t>
+            </a:r>
+            <a:endParaRPr lang="de-DE" sz="1200" dirty="0"/>
+          </a:p>
+        </p:txBody>
+      </p:sp>
+      <p:sp>
+        <p:nvSpPr>
+          <p:cNvPr id="36" name="Rechteck 35">
+            <a:extLst>
+              <a:ext uri="{FF2B5EF4-FFF2-40B4-BE49-F238E27FC236}">
+                <a16:creationId xmlns:a16="http://schemas.microsoft.com/office/drawing/2014/main" id="{8B5094C8-3EFE-5615-36EA-F577554D804E}"/>
+              </a:ext>
+            </a:extLst>
+          </p:cNvPr>
+          <p:cNvSpPr/>
+          <p:nvPr/>
+        </p:nvSpPr>
+        <p:spPr>
+          <a:xfrm>
+            <a:off x="52401" y="6621336"/>
+            <a:ext cx="1468857" cy="465667"/>
+          </a:xfrm>
+          <a:prstGeom prst="rect">
+            <a:avLst/>
+          </a:prstGeom>
+          <a:noFill/>
           <a:ln>
-            <a:tailEnd type="triangle"/>
+            <a:noFill/>
           </a:ln>
-        </p:spPr>
-        <p:style>
-          <a:lnRef idx="2">
-            <a:schemeClr val="accent1"/>
-          </a:lnRef>
-          <a:fillRef idx="0">
-            <a:schemeClr val="accent1"/>
-          </a:fillRef>
-          <a:effectRef idx="1">
-            <a:schemeClr val="accent1"/>
-          </a:effectRef>
-          <a:fontRef idx="minor">
-            <a:schemeClr val="tx1"/>
-          </a:fontRef>
-        </p:style>
-      </p:cxnSp>
-      <p:sp>
-        <p:nvSpPr>
-          <p:cNvPr id="80" name="Ellipse 79">
-            <a:extLst>
-              <a:ext uri="{FF2B5EF4-FFF2-40B4-BE49-F238E27FC236}">
-                <a16:creationId xmlns:a16="http://schemas.microsoft.com/office/drawing/2014/main" id="{3B61CD05-1307-3AE5-0E17-C11640C60163}"/>
-              </a:ext>
-            </a:extLst>
-          </p:cNvPr>
-          <p:cNvSpPr/>
-          <p:nvPr/>
-        </p:nvSpPr>
-        <p:spPr>
-          <a:xfrm>
-            <a:off x="2898268" y="7930517"/>
-            <a:ext cx="118531" cy="120961"/>
-          </a:xfrm>
-          <a:prstGeom prst="ellipse">
-            <a:avLst/>
-          </a:prstGeom>
         </p:spPr>
         <p:style>
           <a:lnRef idx="2">
@@ -5463,71 +5771,291 @@
           <a:lstStyle/>
           <a:p>
             <a:pPr algn="ctr"/>
-            <a:endParaRPr lang="de-DE"/>
-          </a:p>
-        </p:txBody>
-      </p:sp>
-      <p:cxnSp>
-        <p:nvCxnSpPr>
-          <p:cNvPr id="81" name="Gerade Verbindung mit Pfeil 80">
-            <a:extLst>
-              <a:ext uri="{FF2B5EF4-FFF2-40B4-BE49-F238E27FC236}">
-                <a16:creationId xmlns:a16="http://schemas.microsoft.com/office/drawing/2014/main" id="{ED4E16C3-9025-45D7-7157-56F62E3E9DAC}"/>
-              </a:ext>
-            </a:extLst>
-          </p:cNvPr>
-          <p:cNvCxnSpPr>
-            <a:cxnSpLocks/>
-          </p:cNvCxnSpPr>
-          <p:nvPr/>
-        </p:nvCxnSpPr>
-        <p:spPr>
-          <a:xfrm flipH="1">
-            <a:off x="2958518" y="8754680"/>
-            <a:ext cx="1214802" cy="0"/>
-          </a:xfrm>
-          <a:prstGeom prst="straightConnector1">
-            <a:avLst/>
-          </a:prstGeom>
+            <a:r>
+              <a:rPr lang="de-DE" sz="1400" dirty="0" err="1">
+                <a:solidFill>
+                  <a:schemeClr val="tx1"/>
+                </a:solidFill>
+              </a:rPr>
+              <a:t>STATE_write_erg</a:t>
+            </a:r>
+            <a:endParaRPr lang="de-DE" sz="1400" dirty="0">
+              <a:solidFill>
+                <a:schemeClr val="tx1"/>
+              </a:solidFill>
+            </a:endParaRPr>
+          </a:p>
+        </p:txBody>
+      </p:sp>
+      <p:sp>
+        <p:nvSpPr>
+          <p:cNvPr id="44" name="Textfeld 43">
+            <a:extLst>
+              <a:ext uri="{FF2B5EF4-FFF2-40B4-BE49-F238E27FC236}">
+                <a16:creationId xmlns:a16="http://schemas.microsoft.com/office/drawing/2014/main" id="{26D344C2-E3E8-A9E9-D49D-90B24FBB01D5}"/>
+              </a:ext>
+            </a:extLst>
+          </p:cNvPr>
+          <p:cNvSpPr txBox="1"/>
+          <p:nvPr/>
+        </p:nvSpPr>
+        <p:spPr>
+          <a:xfrm>
+            <a:off x="1225418" y="1395121"/>
+            <a:ext cx="335377" cy="369332"/>
+          </a:xfrm>
+          <a:prstGeom prst="rect">
+            <a:avLst/>
+          </a:prstGeom>
+          <a:noFill/>
+        </p:spPr>
+        <p:txBody>
+          <a:bodyPr wrap="square" rtlCol="0">
+            <a:spAutoFit/>
+          </a:bodyPr>
+          <a:lstStyle/>
+          <a:p>
+            <a:r>
+              <a:rPr lang="de-DE" dirty="0"/>
+              <a:t>0</a:t>
+            </a:r>
+          </a:p>
+        </p:txBody>
+      </p:sp>
+      <p:sp>
+        <p:nvSpPr>
+          <p:cNvPr id="45" name="Textfeld 44">
+            <a:extLst>
+              <a:ext uri="{FF2B5EF4-FFF2-40B4-BE49-F238E27FC236}">
+                <a16:creationId xmlns:a16="http://schemas.microsoft.com/office/drawing/2014/main" id="{AA85E662-9897-D292-5A68-70E4A8A86E89}"/>
+              </a:ext>
+            </a:extLst>
+          </p:cNvPr>
+          <p:cNvSpPr txBox="1"/>
+          <p:nvPr/>
+        </p:nvSpPr>
+        <p:spPr>
+          <a:xfrm>
+            <a:off x="1225418" y="2384996"/>
+            <a:ext cx="335377" cy="369332"/>
+          </a:xfrm>
+          <a:prstGeom prst="rect">
+            <a:avLst/>
+          </a:prstGeom>
+          <a:noFill/>
+        </p:spPr>
+        <p:txBody>
+          <a:bodyPr wrap="square" rtlCol="0">
+            <a:spAutoFit/>
+          </a:bodyPr>
+          <a:lstStyle/>
+          <a:p>
+            <a:r>
+              <a:rPr lang="de-DE" dirty="0"/>
+              <a:t>1</a:t>
+            </a:r>
+          </a:p>
+        </p:txBody>
+      </p:sp>
+      <p:sp>
+        <p:nvSpPr>
+          <p:cNvPr id="49" name="Textfeld 48">
+            <a:extLst>
+              <a:ext uri="{FF2B5EF4-FFF2-40B4-BE49-F238E27FC236}">
+                <a16:creationId xmlns:a16="http://schemas.microsoft.com/office/drawing/2014/main" id="{15389084-F60B-B0F6-8C0C-651C73C6DFF0}"/>
+              </a:ext>
+            </a:extLst>
+          </p:cNvPr>
+          <p:cNvSpPr txBox="1"/>
+          <p:nvPr/>
+        </p:nvSpPr>
+        <p:spPr>
+          <a:xfrm>
+            <a:off x="1225418" y="4075613"/>
+            <a:ext cx="335377" cy="369332"/>
+          </a:xfrm>
+          <a:prstGeom prst="rect">
+            <a:avLst/>
+          </a:prstGeom>
+          <a:noFill/>
+        </p:spPr>
+        <p:txBody>
+          <a:bodyPr wrap="square" rtlCol="0">
+            <a:spAutoFit/>
+          </a:bodyPr>
+          <a:lstStyle/>
+          <a:p>
+            <a:r>
+              <a:rPr lang="de-DE" dirty="0"/>
+              <a:t>2</a:t>
+            </a:r>
+          </a:p>
+        </p:txBody>
+      </p:sp>
+      <p:sp>
+        <p:nvSpPr>
+          <p:cNvPr id="50" name="Textfeld 49">
+            <a:extLst>
+              <a:ext uri="{FF2B5EF4-FFF2-40B4-BE49-F238E27FC236}">
+                <a16:creationId xmlns:a16="http://schemas.microsoft.com/office/drawing/2014/main" id="{C61E35CE-F0F7-6FEB-A190-CECB064AA993}"/>
+              </a:ext>
+            </a:extLst>
+          </p:cNvPr>
+          <p:cNvSpPr txBox="1"/>
+          <p:nvPr/>
+        </p:nvSpPr>
+        <p:spPr>
+          <a:xfrm>
+            <a:off x="1222090" y="5216023"/>
+            <a:ext cx="335377" cy="369332"/>
+          </a:xfrm>
+          <a:prstGeom prst="rect">
+            <a:avLst/>
+          </a:prstGeom>
+          <a:noFill/>
+        </p:spPr>
+        <p:txBody>
+          <a:bodyPr wrap="square" rtlCol="0">
+            <a:spAutoFit/>
+          </a:bodyPr>
+          <a:lstStyle/>
+          <a:p>
+            <a:r>
+              <a:rPr lang="de-DE" dirty="0"/>
+              <a:t>3</a:t>
+            </a:r>
+          </a:p>
+        </p:txBody>
+      </p:sp>
+      <p:sp>
+        <p:nvSpPr>
+          <p:cNvPr id="53" name="Textfeld 52">
+            <a:extLst>
+              <a:ext uri="{FF2B5EF4-FFF2-40B4-BE49-F238E27FC236}">
+                <a16:creationId xmlns:a16="http://schemas.microsoft.com/office/drawing/2014/main" id="{56B23DAA-EBCD-A9B3-2848-4F8217521A14}"/>
+              </a:ext>
+            </a:extLst>
+          </p:cNvPr>
+          <p:cNvSpPr txBox="1"/>
+          <p:nvPr/>
+        </p:nvSpPr>
+        <p:spPr>
+          <a:xfrm>
+            <a:off x="1249639" y="6051022"/>
+            <a:ext cx="335377" cy="369332"/>
+          </a:xfrm>
+          <a:prstGeom prst="rect">
+            <a:avLst/>
+          </a:prstGeom>
+          <a:noFill/>
+        </p:spPr>
+        <p:txBody>
+          <a:bodyPr wrap="square" rtlCol="0">
+            <a:spAutoFit/>
+          </a:bodyPr>
+          <a:lstStyle/>
+          <a:p>
+            <a:r>
+              <a:rPr lang="de-DE" dirty="0"/>
+              <a:t>4</a:t>
+            </a:r>
+          </a:p>
+        </p:txBody>
+      </p:sp>
+      <p:sp>
+        <p:nvSpPr>
+          <p:cNvPr id="56" name="Textfeld 55">
+            <a:extLst>
+              <a:ext uri="{FF2B5EF4-FFF2-40B4-BE49-F238E27FC236}">
+                <a16:creationId xmlns:a16="http://schemas.microsoft.com/office/drawing/2014/main" id="{A97B150D-35E9-39AC-E08F-A1806A216287}"/>
+              </a:ext>
+            </a:extLst>
+          </p:cNvPr>
+          <p:cNvSpPr txBox="1"/>
+          <p:nvPr/>
+        </p:nvSpPr>
+        <p:spPr>
+          <a:xfrm>
+            <a:off x="1225174" y="6952857"/>
+            <a:ext cx="335377" cy="369332"/>
+          </a:xfrm>
+          <a:prstGeom prst="rect">
+            <a:avLst/>
+          </a:prstGeom>
+          <a:noFill/>
+        </p:spPr>
+        <p:txBody>
+          <a:bodyPr wrap="square" rtlCol="0">
+            <a:spAutoFit/>
+          </a:bodyPr>
+          <a:lstStyle/>
+          <a:p>
+            <a:r>
+              <a:rPr lang="de-DE" dirty="0"/>
+              <a:t>5</a:t>
+            </a:r>
+          </a:p>
+        </p:txBody>
+      </p:sp>
+      <p:sp>
+        <p:nvSpPr>
+          <p:cNvPr id="58" name="Textfeld 57">
+            <a:extLst>
+              <a:ext uri="{FF2B5EF4-FFF2-40B4-BE49-F238E27FC236}">
+                <a16:creationId xmlns:a16="http://schemas.microsoft.com/office/drawing/2014/main" id="{C04751A9-BF1C-7255-A01D-73BA0CFA5DCE}"/>
+              </a:ext>
+            </a:extLst>
+          </p:cNvPr>
+          <p:cNvSpPr txBox="1"/>
+          <p:nvPr/>
+        </p:nvSpPr>
+        <p:spPr>
+          <a:xfrm>
+            <a:off x="1219962" y="7727022"/>
+            <a:ext cx="335377" cy="369332"/>
+          </a:xfrm>
+          <a:prstGeom prst="rect">
+            <a:avLst/>
+          </a:prstGeom>
+          <a:noFill/>
+        </p:spPr>
+        <p:txBody>
+          <a:bodyPr wrap="square" rtlCol="0">
+            <a:spAutoFit/>
+          </a:bodyPr>
+          <a:lstStyle/>
+          <a:p>
+            <a:r>
+              <a:rPr lang="de-DE" dirty="0"/>
+              <a:t>6</a:t>
+            </a:r>
+          </a:p>
+        </p:txBody>
+      </p:sp>
+      <p:sp>
+        <p:nvSpPr>
+          <p:cNvPr id="70" name="Rechteck 69">
+            <a:extLst>
+              <a:ext uri="{FF2B5EF4-FFF2-40B4-BE49-F238E27FC236}">
+                <a16:creationId xmlns:a16="http://schemas.microsoft.com/office/drawing/2014/main" id="{14E8E3F0-E000-01E8-987C-C4B302F21826}"/>
+              </a:ext>
+            </a:extLst>
+          </p:cNvPr>
+          <p:cNvSpPr/>
+          <p:nvPr/>
+        </p:nvSpPr>
+        <p:spPr>
+          <a:xfrm>
+            <a:off x="12179" y="4688887"/>
+            <a:ext cx="1520233" cy="465667"/>
+          </a:xfrm>
+          <a:prstGeom prst="rect">
+            <a:avLst/>
+          </a:prstGeom>
+          <a:noFill/>
           <a:ln>
-            <a:tailEnd type="triangle"/>
+            <a:noFill/>
           </a:ln>
-        </p:spPr>
-        <p:style>
-          <a:lnRef idx="2">
-            <a:schemeClr val="accent1"/>
-          </a:lnRef>
-          <a:fillRef idx="0">
-            <a:schemeClr val="accent1"/>
-          </a:fillRef>
-          <a:effectRef idx="1">
-            <a:schemeClr val="accent1"/>
-          </a:effectRef>
-          <a:fontRef idx="minor">
-            <a:schemeClr val="tx1"/>
-          </a:fontRef>
-        </p:style>
-      </p:cxnSp>
-      <p:sp>
-        <p:nvSpPr>
-          <p:cNvPr id="82" name="Ellipse 81">
-            <a:extLst>
-              <a:ext uri="{FF2B5EF4-FFF2-40B4-BE49-F238E27FC236}">
-                <a16:creationId xmlns:a16="http://schemas.microsoft.com/office/drawing/2014/main" id="{10C555A1-BB95-2126-D308-800B2444EC07}"/>
-              </a:ext>
-            </a:extLst>
-          </p:cNvPr>
-          <p:cNvSpPr/>
-          <p:nvPr/>
-        </p:nvSpPr>
-        <p:spPr>
-          <a:xfrm>
-            <a:off x="4113070" y="8694199"/>
-            <a:ext cx="118531" cy="120961"/>
-          </a:xfrm>
-          <a:prstGeom prst="ellipse">
-            <a:avLst/>
-          </a:prstGeom>
         </p:spPr>
         <p:style>
           <a:lnRef idx="2">
@@ -5550,71 +6078,80 @@
           <a:lstStyle/>
           <a:p>
             <a:pPr algn="ctr"/>
-            <a:endParaRPr lang="de-DE"/>
-          </a:p>
-        </p:txBody>
-      </p:sp>
-      <p:cxnSp>
-        <p:nvCxnSpPr>
-          <p:cNvPr id="84" name="Gerade Verbindung mit Pfeil 83">
-            <a:extLst>
-              <a:ext uri="{FF2B5EF4-FFF2-40B4-BE49-F238E27FC236}">
-                <a16:creationId xmlns:a16="http://schemas.microsoft.com/office/drawing/2014/main" id="{A7D20993-27D7-A9CD-8F00-4855C590AC5E}"/>
-              </a:ext>
-            </a:extLst>
-          </p:cNvPr>
-          <p:cNvCxnSpPr>
-            <a:cxnSpLocks/>
-          </p:cNvCxnSpPr>
-          <p:nvPr/>
-        </p:nvCxnSpPr>
-        <p:spPr>
-          <a:xfrm>
-            <a:off x="4196928" y="9033562"/>
-            <a:ext cx="1433405" cy="0"/>
-          </a:xfrm>
-          <a:prstGeom prst="straightConnector1">
+            <a:r>
+              <a:rPr lang="de-DE" sz="1400" dirty="0" err="1">
+                <a:solidFill>
+                  <a:schemeClr val="tx1"/>
+                </a:solidFill>
+              </a:rPr>
+              <a:t>STATE_write_zwi-schenspeicher</a:t>
+            </a:r>
+            <a:endParaRPr lang="de-DE" sz="1400" dirty="0">
+              <a:solidFill>
+                <a:schemeClr val="tx1"/>
+              </a:solidFill>
+            </a:endParaRPr>
+          </a:p>
+        </p:txBody>
+      </p:sp>
+      <p:sp>
+        <p:nvSpPr>
+          <p:cNvPr id="74" name="Textfeld 73">
+            <a:extLst>
+              <a:ext uri="{FF2B5EF4-FFF2-40B4-BE49-F238E27FC236}">
+                <a16:creationId xmlns:a16="http://schemas.microsoft.com/office/drawing/2014/main" id="{4E42E59A-2EFC-D959-743A-86E9D0017C71}"/>
+              </a:ext>
+            </a:extLst>
+          </p:cNvPr>
+          <p:cNvSpPr txBox="1"/>
+          <p:nvPr/>
+        </p:nvSpPr>
+        <p:spPr>
+          <a:xfrm>
+            <a:off x="1222090" y="8481076"/>
+            <a:ext cx="335377" cy="369332"/>
+          </a:xfrm>
+          <a:prstGeom prst="rect">
+            <a:avLst/>
+          </a:prstGeom>
+          <a:noFill/>
+        </p:spPr>
+        <p:txBody>
+          <a:bodyPr wrap="square" rtlCol="0">
+            <a:spAutoFit/>
+          </a:bodyPr>
+          <a:lstStyle/>
+          <a:p>
+            <a:r>
+              <a:rPr lang="de-DE" dirty="0"/>
+              <a:t>7</a:t>
+            </a:r>
+          </a:p>
+        </p:txBody>
+      </p:sp>
+      <p:sp>
+        <p:nvSpPr>
+          <p:cNvPr id="75" name="Rechteck 74">
+            <a:extLst>
+              <a:ext uri="{FF2B5EF4-FFF2-40B4-BE49-F238E27FC236}">
+                <a16:creationId xmlns:a16="http://schemas.microsoft.com/office/drawing/2014/main" id="{E4DDB8D4-6D68-63FA-00B4-83CCD55F6491}"/>
+              </a:ext>
+            </a:extLst>
+          </p:cNvPr>
+          <p:cNvSpPr/>
+          <p:nvPr/>
+        </p:nvSpPr>
+        <p:spPr>
+          <a:xfrm>
+            <a:off x="-23283" y="8898029"/>
+            <a:ext cx="10914003" cy="45719"/>
+          </a:xfrm>
+          <a:prstGeom prst="rect">
             <a:avLst/>
           </a:prstGeom>
           <a:ln>
-            <a:tailEnd type="triangle"/>
+            <a:noFill/>
           </a:ln>
-        </p:spPr>
-        <p:style>
-          <a:lnRef idx="2">
-            <a:schemeClr val="accent1"/>
-          </a:lnRef>
-          <a:fillRef idx="0">
-            <a:schemeClr val="accent1"/>
-          </a:fillRef>
-          <a:effectRef idx="1">
-            <a:schemeClr val="accent1"/>
-          </a:effectRef>
-          <a:fontRef idx="minor">
-            <a:schemeClr val="tx1"/>
-          </a:fontRef>
-        </p:style>
-      </p:cxnSp>
-      <p:sp>
-        <p:nvSpPr>
-          <p:cNvPr id="85" name="Ellipse 84">
-            <a:extLst>
-              <a:ext uri="{FF2B5EF4-FFF2-40B4-BE49-F238E27FC236}">
-                <a16:creationId xmlns:a16="http://schemas.microsoft.com/office/drawing/2014/main" id="{999A40F5-CAEF-DFB5-13D0-33A6B36DE61C}"/>
-              </a:ext>
-            </a:extLst>
-          </p:cNvPr>
-          <p:cNvSpPr/>
-          <p:nvPr/>
-        </p:nvSpPr>
-        <p:spPr>
-          <a:xfrm>
-            <a:off x="4135931" y="8973081"/>
-            <a:ext cx="118531" cy="120961"/>
-          </a:xfrm>
-          <a:prstGeom prst="ellipse">
-            <a:avLst/>
-          </a:prstGeom>
         </p:spPr>
         <p:style>
           <a:lnRef idx="2">
@@ -5643,10 +6180,10 @@
       </p:sp>
       <p:sp>
         <p:nvSpPr>
-          <p:cNvPr id="88" name="Rechteck 87">
-            <a:extLst>
-              <a:ext uri="{FF2B5EF4-FFF2-40B4-BE49-F238E27FC236}">
-                <a16:creationId xmlns:a16="http://schemas.microsoft.com/office/drawing/2014/main" id="{B016152A-95C4-82A2-A7B1-3297606770FB}"/>
+          <p:cNvPr id="79" name="Rechteck 78">
+            <a:extLst>
+              <a:ext uri="{FF2B5EF4-FFF2-40B4-BE49-F238E27FC236}">
+                <a16:creationId xmlns:a16="http://schemas.microsoft.com/office/drawing/2014/main" id="{394957BF-4FB3-B74C-44A3-ABD1EE13C356}"/>
               </a:ext>
             </a:extLst>
           </p:cNvPr>
@@ -5655,12 +6192,13 @@
         </p:nvSpPr>
         <p:spPr>
           <a:xfrm>
-            <a:off x="11974" y="1265063"/>
-            <a:ext cx="10760392" cy="45719"/>
+            <a:off x="83490" y="9058576"/>
+            <a:ext cx="1468857" cy="465667"/>
           </a:xfrm>
           <a:prstGeom prst="rect">
             <a:avLst/>
           </a:prstGeom>
+          <a:noFill/>
           <a:ln>
             <a:noFill/>
           </a:ln>
@@ -5686,16 +6224,94 @@
           <a:lstStyle/>
           <a:p>
             <a:pPr algn="ctr"/>
-            <a:endParaRPr lang="de-DE"/>
-          </a:p>
-        </p:txBody>
-      </p:sp>
-      <p:sp>
-        <p:nvSpPr>
-          <p:cNvPr id="90" name="Rechteck 89">
-            <a:extLst>
-              <a:ext uri="{FF2B5EF4-FFF2-40B4-BE49-F238E27FC236}">
-                <a16:creationId xmlns:a16="http://schemas.microsoft.com/office/drawing/2014/main" id="{B219DF79-4DE4-0F24-A66A-E66A346B5FE5}"/>
+            <a:r>
+              <a:rPr lang="de-DE" sz="1400" dirty="0">
+                <a:solidFill>
+                  <a:schemeClr val="tx1"/>
+                </a:solidFill>
+              </a:rPr>
+              <a:t>STATE_write_5</a:t>
+            </a:r>
+          </a:p>
+        </p:txBody>
+      </p:sp>
+      <p:sp>
+        <p:nvSpPr>
+          <p:cNvPr id="83" name="Textfeld 82">
+            <a:extLst>
+              <a:ext uri="{FF2B5EF4-FFF2-40B4-BE49-F238E27FC236}">
+                <a16:creationId xmlns:a16="http://schemas.microsoft.com/office/drawing/2014/main" id="{9422D1B2-9E28-F6D8-4FB8-E7A5D9555B3B}"/>
+              </a:ext>
+            </a:extLst>
+          </p:cNvPr>
+          <p:cNvSpPr txBox="1"/>
+          <p:nvPr/>
+        </p:nvSpPr>
+        <p:spPr>
+          <a:xfrm>
+            <a:off x="2483862" y="8123630"/>
+            <a:ext cx="1516269" cy="276999"/>
+          </a:xfrm>
+          <a:prstGeom prst="rect">
+            <a:avLst/>
+          </a:prstGeom>
+          <a:noFill/>
+        </p:spPr>
+        <p:txBody>
+          <a:bodyPr wrap="square" rtlCol="0">
+            <a:spAutoFit/>
+          </a:bodyPr>
+          <a:lstStyle/>
+          <a:p>
+            <a:r>
+              <a:rPr lang="de-DE" sz="1200" dirty="0" err="1"/>
+              <a:t>wren_Zahl</a:t>
+            </a:r>
+            <a:endParaRPr lang="de-DE" sz="1200" dirty="0"/>
+          </a:p>
+        </p:txBody>
+      </p:sp>
+      <p:sp>
+        <p:nvSpPr>
+          <p:cNvPr id="86" name="Textfeld 85">
+            <a:extLst>
+              <a:ext uri="{FF2B5EF4-FFF2-40B4-BE49-F238E27FC236}">
+                <a16:creationId xmlns:a16="http://schemas.microsoft.com/office/drawing/2014/main" id="{F3BCC373-D340-63AF-CD27-FE58B89798AB}"/>
+              </a:ext>
+            </a:extLst>
+          </p:cNvPr>
+          <p:cNvSpPr txBox="1"/>
+          <p:nvPr/>
+        </p:nvSpPr>
+        <p:spPr>
+          <a:xfrm>
+            <a:off x="1221205" y="9365394"/>
+            <a:ext cx="335377" cy="369332"/>
+          </a:xfrm>
+          <a:prstGeom prst="rect">
+            <a:avLst/>
+          </a:prstGeom>
+          <a:noFill/>
+        </p:spPr>
+        <p:txBody>
+          <a:bodyPr wrap="square" rtlCol="0">
+            <a:spAutoFit/>
+          </a:bodyPr>
+          <a:lstStyle/>
+          <a:p>
+            <a:r>
+              <a:rPr lang="de-DE" dirty="0"/>
+              <a:t>8</a:t>
+            </a:r>
+          </a:p>
+        </p:txBody>
+      </p:sp>
+      <p:sp>
+        <p:nvSpPr>
+          <p:cNvPr id="87" name="Ellipse 86">
+            <a:extLst>
+              <a:ext uri="{FF2B5EF4-FFF2-40B4-BE49-F238E27FC236}">
+                <a16:creationId xmlns:a16="http://schemas.microsoft.com/office/drawing/2014/main" id="{1FB0B673-961B-A24C-BECE-5EA6505CFCB2}"/>
               </a:ext>
             </a:extLst>
           </p:cNvPr>
@@ -5704,15 +6320,12 @@
         </p:nvSpPr>
         <p:spPr>
           <a:xfrm>
-            <a:off x="67262" y="3110414"/>
-            <a:ext cx="10760392" cy="45719"/>
-          </a:xfrm>
-          <a:prstGeom prst="rect">
-            <a:avLst/>
-          </a:prstGeom>
-          <a:ln>
-            <a:noFill/>
-          </a:ln>
+            <a:off x="8259839" y="5131407"/>
+            <a:ext cx="118531" cy="120961"/>
+          </a:xfrm>
+          <a:prstGeom prst="ellipse">
+            <a:avLst/>
+          </a:prstGeom>
         </p:spPr>
         <p:style>
           <a:lnRef idx="2">
@@ -5739,12 +6352,53 @@
           </a:p>
         </p:txBody>
       </p:sp>
-      <p:sp>
-        <p:nvSpPr>
-          <p:cNvPr id="92" name="Rechteck 91">
-            <a:extLst>
-              <a:ext uri="{FF2B5EF4-FFF2-40B4-BE49-F238E27FC236}">
-                <a16:creationId xmlns:a16="http://schemas.microsoft.com/office/drawing/2014/main" id="{6296918F-BF43-3212-76D3-980852CDEE2C}"/>
+      <p:cxnSp>
+        <p:nvCxnSpPr>
+          <p:cNvPr id="89" name="Gerade Verbindung mit Pfeil 88">
+            <a:extLst>
+              <a:ext uri="{FF2B5EF4-FFF2-40B4-BE49-F238E27FC236}">
+                <a16:creationId xmlns:a16="http://schemas.microsoft.com/office/drawing/2014/main" id="{E7B742CF-840F-A47E-FEAE-2BF2A586BECB}"/>
+              </a:ext>
+            </a:extLst>
+          </p:cNvPr>
+          <p:cNvCxnSpPr>
+            <a:cxnSpLocks/>
+          </p:cNvCxnSpPr>
+          <p:nvPr/>
+        </p:nvCxnSpPr>
+        <p:spPr>
+          <a:xfrm flipH="1">
+            <a:off x="5607050" y="5192183"/>
+            <a:ext cx="2712054" cy="0"/>
+          </a:xfrm>
+          <a:prstGeom prst="straightConnector1">
+            <a:avLst/>
+          </a:prstGeom>
+          <a:ln>
+            <a:tailEnd type="triangle"/>
+          </a:ln>
+        </p:spPr>
+        <p:style>
+          <a:lnRef idx="2">
+            <a:schemeClr val="accent1"/>
+          </a:lnRef>
+          <a:fillRef idx="0">
+            <a:schemeClr val="accent1"/>
+          </a:fillRef>
+          <a:effectRef idx="1">
+            <a:schemeClr val="accent1"/>
+          </a:effectRef>
+          <a:fontRef idx="minor">
+            <a:schemeClr val="tx1"/>
+          </a:fontRef>
+        </p:style>
+      </p:cxnSp>
+      <p:sp>
+        <p:nvSpPr>
+          <p:cNvPr id="91" name="Rechteck 90">
+            <a:extLst>
+              <a:ext uri="{FF2B5EF4-FFF2-40B4-BE49-F238E27FC236}">
+                <a16:creationId xmlns:a16="http://schemas.microsoft.com/office/drawing/2014/main" id="{4F877D0C-2FA6-EC63-7220-BB0FBA10A2B2}"/>
               </a:ext>
             </a:extLst>
           </p:cNvPr>
@@ -5753,15 +6407,13 @@
         </p:nvSpPr>
         <p:spPr>
           <a:xfrm>
-            <a:off x="11974" y="5926219"/>
-            <a:ext cx="10760392" cy="45719"/>
+            <a:off x="9264770" y="2129507"/>
+            <a:ext cx="1534750" cy="509241"/>
           </a:xfrm>
           <a:prstGeom prst="rect">
             <a:avLst/>
           </a:prstGeom>
-          <a:ln>
-            <a:noFill/>
-          </a:ln>
+          <a:noFill/>
         </p:spPr>
         <p:style>
           <a:lnRef idx="2">
@@ -5784,16 +6436,64 @@
           <a:lstStyle/>
           <a:p>
             <a:pPr algn="ctr"/>
-            <a:endParaRPr lang="de-DE"/>
-          </a:p>
-        </p:txBody>
-      </p:sp>
-      <p:sp>
-        <p:nvSpPr>
-          <p:cNvPr id="93" name="Rechteck 92">
-            <a:extLst>
-              <a:ext uri="{FF2B5EF4-FFF2-40B4-BE49-F238E27FC236}">
-                <a16:creationId xmlns:a16="http://schemas.microsoft.com/office/drawing/2014/main" id="{48DB46EB-0157-014B-3FE3-3E029DD02B97}"/>
+            <a:r>
+              <a:rPr lang="de-DE" sz="1400" dirty="0" err="1">
+                <a:solidFill>
+                  <a:schemeClr val="tx1"/>
+                </a:solidFill>
+              </a:rPr>
+              <a:t>write</a:t>
+            </a:r>
+            <a:endParaRPr lang="de-DE" dirty="0">
+              <a:solidFill>
+                <a:schemeClr val="tx1"/>
+              </a:solidFill>
+            </a:endParaRPr>
+          </a:p>
+        </p:txBody>
+      </p:sp>
+      <p:sp>
+        <p:nvSpPr>
+          <p:cNvPr id="94" name="Textfeld 93">
+            <a:extLst>
+              <a:ext uri="{FF2B5EF4-FFF2-40B4-BE49-F238E27FC236}">
+                <a16:creationId xmlns:a16="http://schemas.microsoft.com/office/drawing/2014/main" id="{8AB2C634-C2FC-872F-C190-872850B7CB27}"/>
+              </a:ext>
+            </a:extLst>
+          </p:cNvPr>
+          <p:cNvSpPr txBox="1"/>
+          <p:nvPr/>
+        </p:nvSpPr>
+        <p:spPr>
+          <a:xfrm>
+            <a:off x="9102972" y="970814"/>
+            <a:ext cx="1701399" cy="276999"/>
+          </a:xfrm>
+          <a:prstGeom prst="rect">
+            <a:avLst/>
+          </a:prstGeom>
+          <a:noFill/>
+        </p:spPr>
+        <p:txBody>
+          <a:bodyPr wrap="square" rtlCol="0">
+            <a:spAutoFit/>
+          </a:bodyPr>
+          <a:lstStyle/>
+          <a:p>
+            <a:r>
+              <a:rPr lang="de-DE" sz="1200" dirty="0" err="1"/>
+              <a:t>ALU_give_back_bigger</a:t>
+            </a:r>
+            <a:endParaRPr lang="de-DE" sz="1200" dirty="0"/>
+          </a:p>
+        </p:txBody>
+      </p:sp>
+      <p:sp>
+        <p:nvSpPr>
+          <p:cNvPr id="95" name="Rechteck 94">
+            <a:extLst>
+              <a:ext uri="{FF2B5EF4-FFF2-40B4-BE49-F238E27FC236}">
+                <a16:creationId xmlns:a16="http://schemas.microsoft.com/office/drawing/2014/main" id="{31CEC284-5DCC-609C-4398-FE9D4C82FAFF}"/>
               </a:ext>
             </a:extLst>
           </p:cNvPr>
@@ -5802,8 +6502,8 @@
         </p:nvSpPr>
         <p:spPr>
           <a:xfrm>
-            <a:off x="-6290" y="6800220"/>
-            <a:ext cx="10760392" cy="45719"/>
+            <a:off x="-11309" y="1810594"/>
+            <a:ext cx="10914003" cy="45719"/>
           </a:xfrm>
           <a:prstGeom prst="rect">
             <a:avLst/>
@@ -5839,10 +6539,10 @@
       </p:sp>
       <p:sp>
         <p:nvSpPr>
-          <p:cNvPr id="2" name="Textfeld 1">
-            <a:extLst>
-              <a:ext uri="{FF2B5EF4-FFF2-40B4-BE49-F238E27FC236}">
-                <a16:creationId xmlns:a16="http://schemas.microsoft.com/office/drawing/2014/main" id="{2D9047BC-DD66-3BD3-C6D8-641FC7787DE4}"/>
+          <p:cNvPr id="100" name="Textfeld 99">
+            <a:extLst>
+              <a:ext uri="{FF2B5EF4-FFF2-40B4-BE49-F238E27FC236}">
+                <a16:creationId xmlns:a16="http://schemas.microsoft.com/office/drawing/2014/main" id="{FDA02FC0-D25C-7DD7-1D10-09BF0CD82262}"/>
               </a:ext>
             </a:extLst>
           </p:cNvPr>
@@ -5851,8 +6551,8 @@
         </p:nvSpPr>
         <p:spPr>
           <a:xfrm>
-            <a:off x="5734949" y="593165"/>
-            <a:ext cx="1516269" cy="276999"/>
+            <a:off x="9156493" y="2750750"/>
+            <a:ext cx="1751220" cy="276999"/>
           </a:xfrm>
           <a:prstGeom prst="rect">
             <a:avLst/>
@@ -5866,390 +6566,34 @@
           <a:lstStyle/>
           <a:p>
             <a:r>
-              <a:rPr lang="de-DE" sz="1200" dirty="0"/>
-              <a:t>Zahl1_to_alu_a</a:t>
-            </a:r>
-          </a:p>
-        </p:txBody>
-      </p:sp>
-      <p:sp>
-        <p:nvSpPr>
-          <p:cNvPr id="3" name="Textfeld 2">
-            <a:extLst>
-              <a:ext uri="{FF2B5EF4-FFF2-40B4-BE49-F238E27FC236}">
-                <a16:creationId xmlns:a16="http://schemas.microsoft.com/office/drawing/2014/main" id="{23EE528B-8F72-E92F-2306-B8FD5A20B1BB}"/>
-              </a:ext>
-            </a:extLst>
-          </p:cNvPr>
-          <p:cNvSpPr txBox="1"/>
-          <p:nvPr/>
-        </p:nvSpPr>
-        <p:spPr>
-          <a:xfrm>
-            <a:off x="5734949" y="2352918"/>
-            <a:ext cx="1516269" cy="276999"/>
+              <a:rPr lang="de-DE" sz="1200" dirty="0" err="1"/>
+              <a:t>ALU_give_back_smaller</a:t>
+            </a:r>
+            <a:endParaRPr lang="de-DE" sz="1200" dirty="0"/>
+          </a:p>
+        </p:txBody>
+      </p:sp>
+      <p:sp>
+        <p:nvSpPr>
+          <p:cNvPr id="101" name="Rechteck 100">
+            <a:extLst>
+              <a:ext uri="{FF2B5EF4-FFF2-40B4-BE49-F238E27FC236}">
+                <a16:creationId xmlns:a16="http://schemas.microsoft.com/office/drawing/2014/main" id="{7256272D-B674-D34F-2EC8-13E531E34DE0}"/>
+              </a:ext>
+            </a:extLst>
+          </p:cNvPr>
+          <p:cNvSpPr/>
+          <p:nvPr/>
+        </p:nvSpPr>
+        <p:spPr>
+          <a:xfrm>
+            <a:off x="9196069" y="6634737"/>
+            <a:ext cx="1534750" cy="509241"/>
           </a:xfrm>
           <a:prstGeom prst="rect">
             <a:avLst/>
           </a:prstGeom>
           <a:noFill/>
-        </p:spPr>
-        <p:txBody>
-          <a:bodyPr wrap="square" rtlCol="0">
-            <a:spAutoFit/>
-          </a:bodyPr>
-          <a:lstStyle/>
-          <a:p>
-            <a:r>
-              <a:rPr lang="de-DE" sz="1200" dirty="0"/>
-              <a:t>Zahl1_to_alu_a</a:t>
-            </a:r>
-          </a:p>
-        </p:txBody>
-      </p:sp>
-      <p:sp>
-        <p:nvSpPr>
-          <p:cNvPr id="12" name="Textfeld 11">
-            <a:extLst>
-              <a:ext uri="{FF2B5EF4-FFF2-40B4-BE49-F238E27FC236}">
-                <a16:creationId xmlns:a16="http://schemas.microsoft.com/office/drawing/2014/main" id="{2AA94794-B13F-5AF8-8684-569A8810D3D5}"/>
-              </a:ext>
-            </a:extLst>
-          </p:cNvPr>
-          <p:cNvSpPr txBox="1"/>
-          <p:nvPr/>
-        </p:nvSpPr>
-        <p:spPr>
-          <a:xfrm>
-            <a:off x="5734948" y="5236600"/>
-            <a:ext cx="1516269" cy="276999"/>
-          </a:xfrm>
-          <a:prstGeom prst="rect">
-            <a:avLst/>
-          </a:prstGeom>
-          <a:noFill/>
-        </p:spPr>
-        <p:txBody>
-          <a:bodyPr wrap="square" rtlCol="0">
-            <a:spAutoFit/>
-          </a:bodyPr>
-          <a:lstStyle/>
-          <a:p>
-            <a:r>
-              <a:rPr lang="de-DE" sz="1200" dirty="0"/>
-              <a:t>Zahl1_to_alu_a</a:t>
-            </a:r>
-          </a:p>
-        </p:txBody>
-      </p:sp>
-      <p:sp>
-        <p:nvSpPr>
-          <p:cNvPr id="14" name="Textfeld 13">
-            <a:extLst>
-              <a:ext uri="{FF2B5EF4-FFF2-40B4-BE49-F238E27FC236}">
-                <a16:creationId xmlns:a16="http://schemas.microsoft.com/office/drawing/2014/main" id="{0B53E165-BA94-07B4-A60B-985313A396D4}"/>
-              </a:ext>
-            </a:extLst>
-          </p:cNvPr>
-          <p:cNvSpPr txBox="1"/>
-          <p:nvPr/>
-        </p:nvSpPr>
-        <p:spPr>
-          <a:xfrm>
-            <a:off x="5734948" y="966893"/>
-            <a:ext cx="1516269" cy="276999"/>
-          </a:xfrm>
-          <a:prstGeom prst="rect">
-            <a:avLst/>
-          </a:prstGeom>
-          <a:noFill/>
-        </p:spPr>
-        <p:txBody>
-          <a:bodyPr wrap="square" rtlCol="0">
-            <a:spAutoFit/>
-          </a:bodyPr>
-          <a:lstStyle/>
-          <a:p>
-            <a:r>
-              <a:rPr lang="de-DE" sz="1200" dirty="0"/>
-              <a:t>Zahl2_to_alu_b</a:t>
-            </a:r>
-          </a:p>
-        </p:txBody>
-      </p:sp>
-      <p:sp>
-        <p:nvSpPr>
-          <p:cNvPr id="21" name="Textfeld 20">
-            <a:extLst>
-              <a:ext uri="{FF2B5EF4-FFF2-40B4-BE49-F238E27FC236}">
-                <a16:creationId xmlns:a16="http://schemas.microsoft.com/office/drawing/2014/main" id="{A0170DF2-C3CE-ECD7-4290-34B4EEA5B160}"/>
-              </a:ext>
-            </a:extLst>
-          </p:cNvPr>
-          <p:cNvSpPr txBox="1"/>
-          <p:nvPr/>
-        </p:nvSpPr>
-        <p:spPr>
-          <a:xfrm>
-            <a:off x="5734948" y="2769673"/>
-            <a:ext cx="1516269" cy="276999"/>
-          </a:xfrm>
-          <a:prstGeom prst="rect">
-            <a:avLst/>
-          </a:prstGeom>
-          <a:noFill/>
-        </p:spPr>
-        <p:txBody>
-          <a:bodyPr wrap="square" rtlCol="0">
-            <a:spAutoFit/>
-          </a:bodyPr>
-          <a:lstStyle/>
-          <a:p>
-            <a:r>
-              <a:rPr lang="de-DE" sz="1200" dirty="0"/>
-              <a:t>Zahl2_to_alu_b</a:t>
-            </a:r>
-          </a:p>
-        </p:txBody>
-      </p:sp>
-      <p:sp>
-        <p:nvSpPr>
-          <p:cNvPr id="22" name="Textfeld 21">
-            <a:extLst>
-              <a:ext uri="{FF2B5EF4-FFF2-40B4-BE49-F238E27FC236}">
-                <a16:creationId xmlns:a16="http://schemas.microsoft.com/office/drawing/2014/main" id="{A7BC4504-DF41-7092-4D14-2FE4058FCC5A}"/>
-              </a:ext>
-            </a:extLst>
-          </p:cNvPr>
-          <p:cNvSpPr txBox="1"/>
-          <p:nvPr/>
-        </p:nvSpPr>
-        <p:spPr>
-          <a:xfrm>
-            <a:off x="5734947" y="5606990"/>
-            <a:ext cx="1516269" cy="276999"/>
-          </a:xfrm>
-          <a:prstGeom prst="rect">
-            <a:avLst/>
-          </a:prstGeom>
-          <a:noFill/>
-        </p:spPr>
-        <p:txBody>
-          <a:bodyPr wrap="square" rtlCol="0">
-            <a:spAutoFit/>
-          </a:bodyPr>
-          <a:lstStyle/>
-          <a:p>
-            <a:r>
-              <a:rPr lang="de-DE" sz="1200" dirty="0"/>
-              <a:t>Zahl2_to_alu_b</a:t>
-            </a:r>
-          </a:p>
-        </p:txBody>
-      </p:sp>
-      <p:sp>
-        <p:nvSpPr>
-          <p:cNvPr id="25" name="Textfeld 24">
-            <a:extLst>
-              <a:ext uri="{FF2B5EF4-FFF2-40B4-BE49-F238E27FC236}">
-                <a16:creationId xmlns:a16="http://schemas.microsoft.com/office/drawing/2014/main" id="{CDF051D4-97E4-0C78-772A-8F329FCA45D2}"/>
-              </a:ext>
-            </a:extLst>
-          </p:cNvPr>
-          <p:cNvSpPr txBox="1"/>
-          <p:nvPr/>
-        </p:nvSpPr>
-        <p:spPr>
-          <a:xfrm>
-            <a:off x="4118352" y="9073763"/>
-            <a:ext cx="1806033" cy="261610"/>
-          </a:xfrm>
-          <a:prstGeom prst="rect">
-            <a:avLst/>
-          </a:prstGeom>
-          <a:noFill/>
-        </p:spPr>
-        <p:txBody>
-          <a:bodyPr wrap="square" rtlCol="0">
-            <a:spAutoFit/>
-          </a:bodyPr>
-          <a:lstStyle/>
-          <a:p>
-            <a:r>
-              <a:rPr lang="de-DE" sz="1100" dirty="0" err="1"/>
-              <a:t>wren_to_new_numbers</a:t>
-            </a:r>
-            <a:endParaRPr lang="de-DE" sz="1100" dirty="0"/>
-          </a:p>
-        </p:txBody>
-      </p:sp>
-      <p:sp>
-        <p:nvSpPr>
-          <p:cNvPr id="26" name="Textfeld 25">
-            <a:extLst>
-              <a:ext uri="{FF2B5EF4-FFF2-40B4-BE49-F238E27FC236}">
-                <a16:creationId xmlns:a16="http://schemas.microsoft.com/office/drawing/2014/main" id="{AD22ED96-0F31-A9B7-9E08-5F1DDAC79C64}"/>
-              </a:ext>
-            </a:extLst>
-          </p:cNvPr>
-          <p:cNvSpPr txBox="1"/>
-          <p:nvPr/>
-        </p:nvSpPr>
-        <p:spPr>
-          <a:xfrm>
-            <a:off x="5594158" y="6365802"/>
-            <a:ext cx="1516269" cy="276999"/>
-          </a:xfrm>
-          <a:prstGeom prst="rect">
-            <a:avLst/>
-          </a:prstGeom>
-          <a:noFill/>
-        </p:spPr>
-        <p:txBody>
-          <a:bodyPr wrap="square" rtlCol="0">
-            <a:spAutoFit/>
-          </a:bodyPr>
-          <a:lstStyle/>
-          <a:p>
-            <a:r>
-              <a:rPr lang="de-DE" sz="1200" dirty="0" err="1"/>
-              <a:t>wren_erg_modulo</a:t>
-            </a:r>
-            <a:endParaRPr lang="de-DE" sz="1200" dirty="0"/>
-          </a:p>
-        </p:txBody>
-      </p:sp>
-      <p:sp>
-        <p:nvSpPr>
-          <p:cNvPr id="28" name="Textfeld 27">
-            <a:extLst>
-              <a:ext uri="{FF2B5EF4-FFF2-40B4-BE49-F238E27FC236}">
-                <a16:creationId xmlns:a16="http://schemas.microsoft.com/office/drawing/2014/main" id="{2CADE0CA-0AB2-5667-1BDD-F2CD538590B2}"/>
-              </a:ext>
-            </a:extLst>
-          </p:cNvPr>
-          <p:cNvSpPr txBox="1"/>
-          <p:nvPr/>
-        </p:nvSpPr>
-        <p:spPr>
-          <a:xfrm>
-            <a:off x="9006108" y="4341890"/>
-            <a:ext cx="1516269" cy="276999"/>
-          </a:xfrm>
-          <a:prstGeom prst="rect">
-            <a:avLst/>
-          </a:prstGeom>
-          <a:noFill/>
-        </p:spPr>
-        <p:txBody>
-          <a:bodyPr wrap="square" rtlCol="0">
-            <a:spAutoFit/>
-          </a:bodyPr>
-          <a:lstStyle/>
-          <a:p>
-            <a:r>
-              <a:rPr lang="de-DE" sz="1200" dirty="0" err="1"/>
-              <a:t>wren_zw_in_Zahlen</a:t>
-            </a:r>
-            <a:endParaRPr lang="de-DE" sz="1200" dirty="0"/>
-          </a:p>
-        </p:txBody>
-      </p:sp>
-      <p:sp>
-        <p:nvSpPr>
-          <p:cNvPr id="29" name="Textfeld 28">
-            <a:extLst>
-              <a:ext uri="{FF2B5EF4-FFF2-40B4-BE49-F238E27FC236}">
-                <a16:creationId xmlns:a16="http://schemas.microsoft.com/office/drawing/2014/main" id="{03F51187-88EA-B002-A28A-2747AEB0C853}"/>
-              </a:ext>
-            </a:extLst>
-          </p:cNvPr>
-          <p:cNvSpPr txBox="1"/>
-          <p:nvPr/>
-        </p:nvSpPr>
-        <p:spPr>
-          <a:xfrm>
-            <a:off x="7914030" y="1490252"/>
-            <a:ext cx="1516269" cy="276999"/>
-          </a:xfrm>
-          <a:prstGeom prst="rect">
-            <a:avLst/>
-          </a:prstGeom>
-          <a:noFill/>
-        </p:spPr>
-        <p:txBody>
-          <a:bodyPr wrap="square" rtlCol="0">
-            <a:spAutoFit/>
-          </a:bodyPr>
-          <a:lstStyle/>
-          <a:p>
-            <a:r>
-              <a:rPr lang="de-DE" sz="1200" dirty="0" err="1"/>
-              <a:t>wren_zw_groß</a:t>
-            </a:r>
-            <a:endParaRPr lang="de-DE" sz="1200" dirty="0"/>
-          </a:p>
-        </p:txBody>
-      </p:sp>
-      <p:sp>
-        <p:nvSpPr>
-          <p:cNvPr id="32" name="Textfeld 31">
-            <a:extLst>
-              <a:ext uri="{FF2B5EF4-FFF2-40B4-BE49-F238E27FC236}">
-                <a16:creationId xmlns:a16="http://schemas.microsoft.com/office/drawing/2014/main" id="{08285A18-5A51-56BA-D113-0C1553F76CA0}"/>
-              </a:ext>
-            </a:extLst>
-          </p:cNvPr>
-          <p:cNvSpPr txBox="1"/>
-          <p:nvPr/>
-        </p:nvSpPr>
-        <p:spPr>
-          <a:xfrm>
-            <a:off x="7914030" y="3293596"/>
-            <a:ext cx="1516269" cy="276999"/>
-          </a:xfrm>
-          <a:prstGeom prst="rect">
-            <a:avLst/>
-          </a:prstGeom>
-          <a:noFill/>
-        </p:spPr>
-        <p:txBody>
-          <a:bodyPr wrap="square" rtlCol="0">
-            <a:spAutoFit/>
-          </a:bodyPr>
-          <a:lstStyle/>
-          <a:p>
-            <a:r>
-              <a:rPr lang="de-DE" sz="1200" dirty="0" err="1"/>
-              <a:t>wren_zw_klein</a:t>
-            </a:r>
-            <a:endParaRPr lang="de-DE" sz="1200" dirty="0"/>
-          </a:p>
-        </p:txBody>
-      </p:sp>
-      <p:sp>
-        <p:nvSpPr>
-          <p:cNvPr id="33" name="Rechteck 32">
-            <a:extLst>
-              <a:ext uri="{FF2B5EF4-FFF2-40B4-BE49-F238E27FC236}">
-                <a16:creationId xmlns:a16="http://schemas.microsoft.com/office/drawing/2014/main" id="{846086FE-556C-E147-A01B-6DCF75B552AD}"/>
-              </a:ext>
-            </a:extLst>
-          </p:cNvPr>
-          <p:cNvSpPr/>
-          <p:nvPr/>
-        </p:nvSpPr>
-        <p:spPr>
-          <a:xfrm>
-            <a:off x="-6290" y="7608547"/>
-            <a:ext cx="10760392" cy="45719"/>
-          </a:xfrm>
-          <a:prstGeom prst="rect">
-            <a:avLst/>
-          </a:prstGeom>
-          <a:ln>
-            <a:noFill/>
-          </a:ln>
         </p:spPr>
         <p:style>
           <a:lnRef idx="2">
@@ -6272,16 +6616,28 @@
           <a:lstStyle/>
           <a:p>
             <a:pPr algn="ctr"/>
-            <a:endParaRPr lang="de-DE"/>
-          </a:p>
-        </p:txBody>
-      </p:sp>
-      <p:sp>
-        <p:nvSpPr>
-          <p:cNvPr id="36" name="Rechteck 35">
-            <a:extLst>
-              <a:ext uri="{FF2B5EF4-FFF2-40B4-BE49-F238E27FC236}">
-                <a16:creationId xmlns:a16="http://schemas.microsoft.com/office/drawing/2014/main" id="{8B5094C8-3EFE-5615-36EA-F577554D804E}"/>
+            <a:r>
+              <a:rPr lang="de-DE" sz="1400" dirty="0" err="1">
+                <a:solidFill>
+                  <a:schemeClr val="tx1"/>
+                </a:solidFill>
+              </a:rPr>
+              <a:t>write</a:t>
+            </a:r>
+            <a:endParaRPr lang="de-DE" dirty="0">
+              <a:solidFill>
+                <a:schemeClr val="tx1"/>
+              </a:solidFill>
+            </a:endParaRPr>
+          </a:p>
+        </p:txBody>
+      </p:sp>
+      <p:sp>
+        <p:nvSpPr>
+          <p:cNvPr id="102" name="Rechteck 101">
+            <a:extLst>
+              <a:ext uri="{FF2B5EF4-FFF2-40B4-BE49-F238E27FC236}">
+                <a16:creationId xmlns:a16="http://schemas.microsoft.com/office/drawing/2014/main" id="{463E59DF-D5E2-5065-2214-C2822A9C7874}"/>
               </a:ext>
             </a:extLst>
           </p:cNvPr>
@@ -6290,13 +6646,12 @@
         </p:nvSpPr>
         <p:spPr>
           <a:xfrm>
-            <a:off x="75684" y="6145086"/>
-            <a:ext cx="1468857" cy="465667"/>
+            <a:off x="-29573" y="3589065"/>
+            <a:ext cx="10914003" cy="45719"/>
           </a:xfrm>
           <a:prstGeom prst="rect">
             <a:avLst/>
           </a:prstGeom>
-          <a:noFill/>
           <a:ln>
             <a:noFill/>
           </a:ln>
@@ -6322,273 +6677,16 @@
           <a:lstStyle/>
           <a:p>
             <a:pPr algn="ctr"/>
-            <a:r>
-              <a:rPr lang="de-DE" sz="1400" dirty="0" err="1">
-                <a:solidFill>
-                  <a:schemeClr val="tx1"/>
-                </a:solidFill>
-              </a:rPr>
-              <a:t>Write_erg</a:t>
-            </a:r>
-            <a:endParaRPr lang="de-DE" sz="1400" dirty="0">
-              <a:solidFill>
-                <a:schemeClr val="tx1"/>
-              </a:solidFill>
-            </a:endParaRPr>
-          </a:p>
-        </p:txBody>
-      </p:sp>
-      <p:sp>
-        <p:nvSpPr>
-          <p:cNvPr id="44" name="Textfeld 43">
-            <a:extLst>
-              <a:ext uri="{FF2B5EF4-FFF2-40B4-BE49-F238E27FC236}">
-                <a16:creationId xmlns:a16="http://schemas.microsoft.com/office/drawing/2014/main" id="{26D344C2-E3E8-A9E9-D49D-90B24FBB01D5}"/>
-              </a:ext>
-            </a:extLst>
-          </p:cNvPr>
-          <p:cNvSpPr txBox="1"/>
-          <p:nvPr/>
-        </p:nvSpPr>
-        <p:spPr>
-          <a:xfrm>
-            <a:off x="971550" y="906525"/>
-            <a:ext cx="335377" cy="369332"/>
-          </a:xfrm>
-          <a:prstGeom prst="rect">
-            <a:avLst/>
-          </a:prstGeom>
-          <a:noFill/>
-        </p:spPr>
-        <p:txBody>
-          <a:bodyPr wrap="square" rtlCol="0">
-            <a:spAutoFit/>
-          </a:bodyPr>
-          <a:lstStyle/>
-          <a:p>
-            <a:r>
-              <a:rPr lang="de-DE" dirty="0"/>
-              <a:t>0</a:t>
-            </a:r>
-          </a:p>
-        </p:txBody>
-      </p:sp>
-      <p:sp>
-        <p:nvSpPr>
-          <p:cNvPr id="45" name="Textfeld 44">
-            <a:extLst>
-              <a:ext uri="{FF2B5EF4-FFF2-40B4-BE49-F238E27FC236}">
-                <a16:creationId xmlns:a16="http://schemas.microsoft.com/office/drawing/2014/main" id="{AA85E662-9897-D292-5A68-70E4A8A86E89}"/>
-              </a:ext>
-            </a:extLst>
-          </p:cNvPr>
-          <p:cNvSpPr txBox="1"/>
-          <p:nvPr/>
-        </p:nvSpPr>
-        <p:spPr>
-          <a:xfrm>
-            <a:off x="1285678" y="2735587"/>
-            <a:ext cx="335377" cy="369332"/>
-          </a:xfrm>
-          <a:prstGeom prst="rect">
-            <a:avLst/>
-          </a:prstGeom>
-          <a:noFill/>
-        </p:spPr>
-        <p:txBody>
-          <a:bodyPr wrap="square" rtlCol="0">
-            <a:spAutoFit/>
-          </a:bodyPr>
-          <a:lstStyle/>
-          <a:p>
-            <a:r>
-              <a:rPr lang="de-DE" dirty="0"/>
-              <a:t>1</a:t>
-            </a:r>
-          </a:p>
-        </p:txBody>
-      </p:sp>
-      <p:sp>
-        <p:nvSpPr>
-          <p:cNvPr id="49" name="Textfeld 48">
-            <a:extLst>
-              <a:ext uri="{FF2B5EF4-FFF2-40B4-BE49-F238E27FC236}">
-                <a16:creationId xmlns:a16="http://schemas.microsoft.com/office/drawing/2014/main" id="{15389084-F60B-B0F6-8C0C-651C73C6DFF0}"/>
-              </a:ext>
-            </a:extLst>
-          </p:cNvPr>
-          <p:cNvSpPr txBox="1"/>
-          <p:nvPr/>
-        </p:nvSpPr>
-        <p:spPr>
-          <a:xfrm>
-            <a:off x="1238299" y="3676515"/>
-            <a:ext cx="335377" cy="369332"/>
-          </a:xfrm>
-          <a:prstGeom prst="rect">
-            <a:avLst/>
-          </a:prstGeom>
-          <a:noFill/>
-        </p:spPr>
-        <p:txBody>
-          <a:bodyPr wrap="square" rtlCol="0">
-            <a:spAutoFit/>
-          </a:bodyPr>
-          <a:lstStyle/>
-          <a:p>
-            <a:r>
-              <a:rPr lang="de-DE" dirty="0"/>
-              <a:t>2</a:t>
-            </a:r>
-          </a:p>
-        </p:txBody>
-      </p:sp>
-      <p:sp>
-        <p:nvSpPr>
-          <p:cNvPr id="50" name="Textfeld 49">
-            <a:extLst>
-              <a:ext uri="{FF2B5EF4-FFF2-40B4-BE49-F238E27FC236}">
-                <a16:creationId xmlns:a16="http://schemas.microsoft.com/office/drawing/2014/main" id="{C61E35CE-F0F7-6FEB-A190-CECB064AA993}"/>
-              </a:ext>
-            </a:extLst>
-          </p:cNvPr>
-          <p:cNvSpPr txBox="1"/>
-          <p:nvPr/>
-        </p:nvSpPr>
-        <p:spPr>
-          <a:xfrm>
-            <a:off x="1333134" y="4472837"/>
-            <a:ext cx="335377" cy="369332"/>
-          </a:xfrm>
-          <a:prstGeom prst="rect">
-            <a:avLst/>
-          </a:prstGeom>
-          <a:noFill/>
-        </p:spPr>
-        <p:txBody>
-          <a:bodyPr wrap="square" rtlCol="0">
-            <a:spAutoFit/>
-          </a:bodyPr>
-          <a:lstStyle/>
-          <a:p>
-            <a:r>
-              <a:rPr lang="de-DE" dirty="0"/>
-              <a:t>3</a:t>
-            </a:r>
-          </a:p>
-        </p:txBody>
-      </p:sp>
-      <p:sp>
-        <p:nvSpPr>
-          <p:cNvPr id="53" name="Textfeld 52">
-            <a:extLst>
-              <a:ext uri="{FF2B5EF4-FFF2-40B4-BE49-F238E27FC236}">
-                <a16:creationId xmlns:a16="http://schemas.microsoft.com/office/drawing/2014/main" id="{56B23DAA-EBCD-A9B3-2848-4F8217521A14}"/>
-              </a:ext>
-            </a:extLst>
-          </p:cNvPr>
-          <p:cNvSpPr txBox="1"/>
-          <p:nvPr/>
-        </p:nvSpPr>
-        <p:spPr>
-          <a:xfrm>
-            <a:off x="1236917" y="5498198"/>
-            <a:ext cx="335377" cy="369332"/>
-          </a:xfrm>
-          <a:prstGeom prst="rect">
-            <a:avLst/>
-          </a:prstGeom>
-          <a:noFill/>
-        </p:spPr>
-        <p:txBody>
-          <a:bodyPr wrap="square" rtlCol="0">
-            <a:spAutoFit/>
-          </a:bodyPr>
-          <a:lstStyle/>
-          <a:p>
-            <a:r>
-              <a:rPr lang="de-DE" dirty="0"/>
-              <a:t>4</a:t>
-            </a:r>
-          </a:p>
-        </p:txBody>
-      </p:sp>
-      <p:sp>
-        <p:nvSpPr>
-          <p:cNvPr id="56" name="Textfeld 55">
-            <a:extLst>
-              <a:ext uri="{FF2B5EF4-FFF2-40B4-BE49-F238E27FC236}">
-                <a16:creationId xmlns:a16="http://schemas.microsoft.com/office/drawing/2014/main" id="{A97B150D-35E9-39AC-E08F-A1806A216287}"/>
-              </a:ext>
-            </a:extLst>
-          </p:cNvPr>
-          <p:cNvSpPr txBox="1"/>
-          <p:nvPr/>
-        </p:nvSpPr>
-        <p:spPr>
-          <a:xfrm>
-            <a:off x="1274229" y="6388458"/>
-            <a:ext cx="335377" cy="369332"/>
-          </a:xfrm>
-          <a:prstGeom prst="rect">
-            <a:avLst/>
-          </a:prstGeom>
-          <a:noFill/>
-        </p:spPr>
-        <p:txBody>
-          <a:bodyPr wrap="square" rtlCol="0">
-            <a:spAutoFit/>
-          </a:bodyPr>
-          <a:lstStyle/>
-          <a:p>
-            <a:r>
-              <a:rPr lang="de-DE" dirty="0"/>
-              <a:t>5</a:t>
-            </a:r>
-          </a:p>
-        </p:txBody>
-      </p:sp>
-      <p:sp>
-        <p:nvSpPr>
-          <p:cNvPr id="58" name="Textfeld 57">
-            <a:extLst>
-              <a:ext uri="{FF2B5EF4-FFF2-40B4-BE49-F238E27FC236}">
-                <a16:creationId xmlns:a16="http://schemas.microsoft.com/office/drawing/2014/main" id="{C04751A9-BF1C-7255-A01D-73BA0CFA5DCE}"/>
-              </a:ext>
-            </a:extLst>
-          </p:cNvPr>
-          <p:cNvSpPr txBox="1"/>
-          <p:nvPr/>
-        </p:nvSpPr>
-        <p:spPr>
-          <a:xfrm>
-            <a:off x="1278877" y="7161289"/>
-            <a:ext cx="335377" cy="369332"/>
-          </a:xfrm>
-          <a:prstGeom prst="rect">
-            <a:avLst/>
-          </a:prstGeom>
-          <a:noFill/>
-        </p:spPr>
-        <p:txBody>
-          <a:bodyPr wrap="square" rtlCol="0">
-            <a:spAutoFit/>
-          </a:bodyPr>
-          <a:lstStyle/>
-          <a:p>
-            <a:r>
-              <a:rPr lang="de-DE" dirty="0"/>
-              <a:t>6</a:t>
-            </a:r>
-          </a:p>
-        </p:txBody>
-      </p:sp>
-      <p:sp>
-        <p:nvSpPr>
-          <p:cNvPr id="66" name="Rechteck 65">
-            <a:extLst>
-              <a:ext uri="{FF2B5EF4-FFF2-40B4-BE49-F238E27FC236}">
-                <a16:creationId xmlns:a16="http://schemas.microsoft.com/office/drawing/2014/main" id="{8EC82604-4318-02C3-988F-FD5117D06A23}"/>
+            <a:endParaRPr lang="de-DE"/>
+          </a:p>
+        </p:txBody>
+      </p:sp>
+      <p:sp>
+        <p:nvSpPr>
+          <p:cNvPr id="103" name="Rechteck 102">
+            <a:extLst>
+              <a:ext uri="{FF2B5EF4-FFF2-40B4-BE49-F238E27FC236}">
+                <a16:creationId xmlns:a16="http://schemas.microsoft.com/office/drawing/2014/main" id="{3E92D8F9-DAAC-8A09-D24B-C94EE9CD4C61}"/>
               </a:ext>
             </a:extLst>
           </p:cNvPr>
@@ -6597,8 +6695,8 @@
         </p:nvSpPr>
         <p:spPr>
           <a:xfrm>
-            <a:off x="-6290" y="5033206"/>
-            <a:ext cx="10760392" cy="45719"/>
+            <a:off x="-11309" y="4451363"/>
+            <a:ext cx="10914003" cy="45719"/>
           </a:xfrm>
           <a:prstGeom prst="rect">
             <a:avLst/>
@@ -6634,10 +6732,10 @@
       </p:sp>
       <p:sp>
         <p:nvSpPr>
-          <p:cNvPr id="70" name="Rechteck 69">
-            <a:extLst>
-              <a:ext uri="{FF2B5EF4-FFF2-40B4-BE49-F238E27FC236}">
-                <a16:creationId xmlns:a16="http://schemas.microsoft.com/office/drawing/2014/main" id="{14E8E3F0-E000-01E8-987C-C4B302F21826}"/>
+          <p:cNvPr id="104" name="Rechteck 103">
+            <a:extLst>
+              <a:ext uri="{FF2B5EF4-FFF2-40B4-BE49-F238E27FC236}">
+                <a16:creationId xmlns:a16="http://schemas.microsoft.com/office/drawing/2014/main" id="{49FC84FA-BF97-7451-AE3E-47EF49D4591C}"/>
               </a:ext>
             </a:extLst>
           </p:cNvPr>
@@ -6646,13 +6744,12 @@
         </p:nvSpPr>
         <p:spPr>
           <a:xfrm>
-            <a:off x="86838" y="4212637"/>
-            <a:ext cx="1468857" cy="465667"/>
+            <a:off x="-29575" y="5544956"/>
+            <a:ext cx="10914003" cy="45719"/>
           </a:xfrm>
           <a:prstGeom prst="rect">
             <a:avLst/>
           </a:prstGeom>
-          <a:noFill/>
           <a:ln>
             <a:noFill/>
           </a:ln>
@@ -6678,28 +6775,16 @@
           <a:lstStyle/>
           <a:p>
             <a:pPr algn="ctr"/>
-            <a:r>
-              <a:rPr lang="de-DE" sz="1400" dirty="0" err="1">
-                <a:solidFill>
-                  <a:schemeClr val="tx1"/>
-                </a:solidFill>
-              </a:rPr>
-              <a:t>Write_zwischenspeicher</a:t>
-            </a:r>
-            <a:endParaRPr lang="de-DE" sz="1400" dirty="0">
-              <a:solidFill>
-                <a:schemeClr val="tx1"/>
-              </a:solidFill>
-            </a:endParaRPr>
-          </a:p>
-        </p:txBody>
-      </p:sp>
-      <p:sp>
-        <p:nvSpPr>
-          <p:cNvPr id="74" name="Textfeld 73">
-            <a:extLst>
-              <a:ext uri="{FF2B5EF4-FFF2-40B4-BE49-F238E27FC236}">
-                <a16:creationId xmlns:a16="http://schemas.microsoft.com/office/drawing/2014/main" id="{4E42E59A-2EFC-D959-743A-86E9D0017C71}"/>
+            <a:endParaRPr lang="de-DE"/>
+          </a:p>
+        </p:txBody>
+      </p:sp>
+      <p:sp>
+        <p:nvSpPr>
+          <p:cNvPr id="106" name="Textfeld 105">
+            <a:extLst>
+              <a:ext uri="{FF2B5EF4-FFF2-40B4-BE49-F238E27FC236}">
+                <a16:creationId xmlns:a16="http://schemas.microsoft.com/office/drawing/2014/main" id="{DEF2B947-DC31-1F8C-A671-B7C9EC381ED6}"/>
               </a:ext>
             </a:extLst>
           </p:cNvPr>
@@ -6708,8 +6793,8 @@
         </p:nvSpPr>
         <p:spPr>
           <a:xfrm>
-            <a:off x="1333888" y="7989068"/>
-            <a:ext cx="335377" cy="369332"/>
+            <a:off x="9407016" y="5582887"/>
+            <a:ext cx="1751220" cy="276999"/>
           </a:xfrm>
           <a:prstGeom prst="rect">
             <a:avLst/>
@@ -6723,18 +6808,19 @@
           <a:lstStyle/>
           <a:p>
             <a:r>
-              <a:rPr lang="de-DE" dirty="0"/>
-              <a:t>7</a:t>
-            </a:r>
-          </a:p>
-        </p:txBody>
-      </p:sp>
-      <p:sp>
-        <p:nvSpPr>
-          <p:cNvPr id="75" name="Rechteck 74">
-            <a:extLst>
-              <a:ext uri="{FF2B5EF4-FFF2-40B4-BE49-F238E27FC236}">
-                <a16:creationId xmlns:a16="http://schemas.microsoft.com/office/drawing/2014/main" id="{E4DDB8D4-6D68-63FA-00B4-83CCD55F6491}"/>
+              <a:rPr lang="de-DE" sz="1200" dirty="0" err="1"/>
+              <a:t>ALU_modulo</a:t>
+            </a:r>
+            <a:endParaRPr lang="de-DE" sz="1200" dirty="0"/>
+          </a:p>
+        </p:txBody>
+      </p:sp>
+      <p:sp>
+        <p:nvSpPr>
+          <p:cNvPr id="108" name="Rechteck 107">
+            <a:extLst>
+              <a:ext uri="{FF2B5EF4-FFF2-40B4-BE49-F238E27FC236}">
+                <a16:creationId xmlns:a16="http://schemas.microsoft.com/office/drawing/2014/main" id="{4E52CA75-142E-F725-C3FE-6FF70769E18F}"/>
               </a:ext>
             </a:extLst>
           </p:cNvPr>
@@ -6743,8 +6829,8 @@
         </p:nvSpPr>
         <p:spPr>
           <a:xfrm>
-            <a:off x="-6291" y="8357514"/>
-            <a:ext cx="10914003" cy="75283"/>
+            <a:off x="-29575" y="9875883"/>
+            <a:ext cx="10914003" cy="45719"/>
           </a:xfrm>
           <a:prstGeom prst="rect">
             <a:avLst/>
@@ -6780,10 +6866,10 @@
       </p:sp>
       <p:sp>
         <p:nvSpPr>
-          <p:cNvPr id="79" name="Rechteck 78">
-            <a:extLst>
-              <a:ext uri="{FF2B5EF4-FFF2-40B4-BE49-F238E27FC236}">
-                <a16:creationId xmlns:a16="http://schemas.microsoft.com/office/drawing/2014/main" id="{394957BF-4FB3-B74C-44A3-ABD1EE13C356}"/>
+          <p:cNvPr id="109" name="Rechteck 108">
+            <a:extLst>
+              <a:ext uri="{FF2B5EF4-FFF2-40B4-BE49-F238E27FC236}">
+                <a16:creationId xmlns:a16="http://schemas.microsoft.com/office/drawing/2014/main" id="{FDF40B0B-FCDD-373C-F3D5-EE257AE32FC7}"/>
               </a:ext>
             </a:extLst>
           </p:cNvPr>
@@ -6792,13 +6878,12 @@
         </p:nvSpPr>
         <p:spPr>
           <a:xfrm>
-            <a:off x="106773" y="8582326"/>
-            <a:ext cx="1468857" cy="465667"/>
+            <a:off x="-3969" y="6446537"/>
+            <a:ext cx="10914003" cy="45719"/>
           </a:xfrm>
           <a:prstGeom prst="rect">
             <a:avLst/>
           </a:prstGeom>
-          <a:noFill/>
           <a:ln>
             <a:noFill/>
           </a:ln>
@@ -6824,108 +6909,33 @@
           <a:lstStyle/>
           <a:p>
             <a:pPr algn="ctr"/>
-            <a:r>
-              <a:rPr lang="de-DE" sz="1400" dirty="0">
-                <a:solidFill>
-                  <a:schemeClr val="tx1"/>
-                </a:solidFill>
-              </a:rPr>
-              <a:t>Write_5</a:t>
-            </a:r>
-          </a:p>
-        </p:txBody>
-      </p:sp>
-      <p:sp>
-        <p:nvSpPr>
-          <p:cNvPr id="83" name="Textfeld 82">
-            <a:extLst>
-              <a:ext uri="{FF2B5EF4-FFF2-40B4-BE49-F238E27FC236}">
-                <a16:creationId xmlns:a16="http://schemas.microsoft.com/office/drawing/2014/main" id="{9422D1B2-9E28-F6D8-4FB8-E7A5D9555B3B}"/>
-              </a:ext>
-            </a:extLst>
-          </p:cNvPr>
-          <p:cNvSpPr txBox="1"/>
-          <p:nvPr/>
-        </p:nvSpPr>
-        <p:spPr>
-          <a:xfrm>
-            <a:off x="2507145" y="7647380"/>
-            <a:ext cx="1516269" cy="276999"/>
+            <a:endParaRPr lang="de-DE"/>
+          </a:p>
+        </p:txBody>
+      </p:sp>
+      <p:sp>
+        <p:nvSpPr>
+          <p:cNvPr id="110" name="Rechteck 109">
+            <a:extLst>
+              <a:ext uri="{FF2B5EF4-FFF2-40B4-BE49-F238E27FC236}">
+                <a16:creationId xmlns:a16="http://schemas.microsoft.com/office/drawing/2014/main" id="{4ABA715E-A68F-3380-FFC2-018EBEFD502A}"/>
+              </a:ext>
+            </a:extLst>
+          </p:cNvPr>
+          <p:cNvSpPr/>
+          <p:nvPr/>
+        </p:nvSpPr>
+        <p:spPr>
+          <a:xfrm>
+            <a:off x="-12022" y="7334834"/>
+            <a:ext cx="10914003" cy="45719"/>
           </a:xfrm>
           <a:prstGeom prst="rect">
             <a:avLst/>
           </a:prstGeom>
-          <a:noFill/>
-        </p:spPr>
-        <p:txBody>
-          <a:bodyPr wrap="square" rtlCol="0">
-            <a:spAutoFit/>
-          </a:bodyPr>
-          <a:lstStyle/>
-          <a:p>
-            <a:r>
-              <a:rPr lang="de-DE" sz="1200" dirty="0" err="1"/>
-              <a:t>wren_Zahl</a:t>
-            </a:r>
-            <a:endParaRPr lang="de-DE" sz="1200" dirty="0"/>
-          </a:p>
-        </p:txBody>
-      </p:sp>
-      <p:sp>
-        <p:nvSpPr>
-          <p:cNvPr id="86" name="Textfeld 85">
-            <a:extLst>
-              <a:ext uri="{FF2B5EF4-FFF2-40B4-BE49-F238E27FC236}">
-                <a16:creationId xmlns:a16="http://schemas.microsoft.com/office/drawing/2014/main" id="{F3BCC373-D340-63AF-CD27-FE58B89798AB}"/>
-              </a:ext>
-            </a:extLst>
-          </p:cNvPr>
-          <p:cNvSpPr txBox="1"/>
-          <p:nvPr/>
-        </p:nvSpPr>
-        <p:spPr>
-          <a:xfrm>
-            <a:off x="1346843" y="8656873"/>
-            <a:ext cx="335377" cy="369332"/>
-          </a:xfrm>
-          <a:prstGeom prst="rect">
-            <a:avLst/>
-          </a:prstGeom>
-          <a:noFill/>
-        </p:spPr>
-        <p:txBody>
-          <a:bodyPr wrap="square" rtlCol="0">
-            <a:spAutoFit/>
-          </a:bodyPr>
-          <a:lstStyle/>
-          <a:p>
-            <a:r>
-              <a:rPr lang="de-DE" dirty="0"/>
-              <a:t>8</a:t>
-            </a:r>
-          </a:p>
-        </p:txBody>
-      </p:sp>
-      <p:sp>
-        <p:nvSpPr>
-          <p:cNvPr id="87" name="Ellipse 86">
-            <a:extLst>
-              <a:ext uri="{FF2B5EF4-FFF2-40B4-BE49-F238E27FC236}">
-                <a16:creationId xmlns:a16="http://schemas.microsoft.com/office/drawing/2014/main" id="{1FB0B673-961B-A24C-BECE-5EA6505CFCB2}"/>
-              </a:ext>
-            </a:extLst>
-          </p:cNvPr>
-          <p:cNvSpPr/>
-          <p:nvPr/>
-        </p:nvSpPr>
-        <p:spPr>
-          <a:xfrm>
-            <a:off x="8283122" y="4655157"/>
-            <a:ext cx="118531" cy="120961"/>
-          </a:xfrm>
-          <a:prstGeom prst="ellipse">
-            <a:avLst/>
-          </a:prstGeom>
+          <a:ln>
+            <a:noFill/>
+          </a:ln>
         </p:spPr>
         <p:style>
           <a:lnRef idx="2">
@@ -6952,47 +6962,105 @@
           </a:p>
         </p:txBody>
       </p:sp>
-      <p:cxnSp>
-        <p:nvCxnSpPr>
-          <p:cNvPr id="89" name="Gerade Verbindung mit Pfeil 88">
-            <a:extLst>
-              <a:ext uri="{FF2B5EF4-FFF2-40B4-BE49-F238E27FC236}">
-                <a16:creationId xmlns:a16="http://schemas.microsoft.com/office/drawing/2014/main" id="{E7B742CF-840F-A47E-FEAE-2BF2A586BECB}"/>
-              </a:ext>
-            </a:extLst>
-          </p:cNvPr>
-          <p:cNvCxnSpPr>
-            <a:cxnSpLocks/>
-          </p:cNvCxnSpPr>
-          <p:nvPr/>
-        </p:nvCxnSpPr>
-        <p:spPr>
-          <a:xfrm flipH="1">
-            <a:off x="5630333" y="4715933"/>
-            <a:ext cx="2712054" cy="0"/>
-          </a:xfrm>
-          <a:prstGeom prst="straightConnector1">
+      <p:sp>
+        <p:nvSpPr>
+          <p:cNvPr id="111" name="Rechteck 110">
+            <a:extLst>
+              <a:ext uri="{FF2B5EF4-FFF2-40B4-BE49-F238E27FC236}">
+                <a16:creationId xmlns:a16="http://schemas.microsoft.com/office/drawing/2014/main" id="{893EF9F8-CA20-34FA-7B8C-DEB23C3611DC}"/>
+              </a:ext>
+            </a:extLst>
+          </p:cNvPr>
+          <p:cNvSpPr/>
+          <p:nvPr/>
+        </p:nvSpPr>
+        <p:spPr>
+          <a:xfrm>
+            <a:off x="-12022" y="8068942"/>
+            <a:ext cx="10914003" cy="45719"/>
+          </a:xfrm>
+          <a:prstGeom prst="rect">
             <a:avLst/>
           </a:prstGeom>
           <a:ln>
-            <a:tailEnd type="triangle"/>
+            <a:noFill/>
           </a:ln>
         </p:spPr>
         <p:style>
           <a:lnRef idx="2">
-            <a:schemeClr val="accent1"/>
+            <a:schemeClr val="accent1">
+              <a:shade val="15000"/>
+            </a:schemeClr>
           </a:lnRef>
-          <a:fillRef idx="0">
+          <a:fillRef idx="1">
             <a:schemeClr val="accent1"/>
           </a:fillRef>
-          <a:effectRef idx="1">
+          <a:effectRef idx="0">
             <a:schemeClr val="accent1"/>
           </a:effectRef>
           <a:fontRef idx="minor">
-            <a:schemeClr val="tx1"/>
+            <a:schemeClr val="lt1"/>
           </a:fontRef>
         </p:style>
-      </p:cxnSp>
+        <p:txBody>
+          <a:bodyPr rtlCol="0" anchor="ctr"/>
+          <a:lstStyle/>
+          <a:p>
+            <a:pPr algn="ctr"/>
+            <a:endParaRPr lang="de-DE"/>
+          </a:p>
+        </p:txBody>
+      </p:sp>
+      <p:sp>
+        <p:nvSpPr>
+          <p:cNvPr id="112" name="Rechteck 111">
+            <a:extLst>
+              <a:ext uri="{FF2B5EF4-FFF2-40B4-BE49-F238E27FC236}">
+                <a16:creationId xmlns:a16="http://schemas.microsoft.com/office/drawing/2014/main" id="{44552B16-F8DF-738A-1BB5-BFAE8984E2BD}"/>
+              </a:ext>
+            </a:extLst>
+          </p:cNvPr>
+          <p:cNvSpPr/>
+          <p:nvPr/>
+        </p:nvSpPr>
+        <p:spPr>
+          <a:xfrm>
+            <a:off x="350799" y="250890"/>
+            <a:ext cx="971933" cy="584775"/>
+          </a:xfrm>
+          <a:prstGeom prst="rect">
+            <a:avLst/>
+          </a:prstGeom>
+          <a:noFill/>
+        </p:spPr>
+        <p:txBody>
+          <a:bodyPr wrap="none" lIns="91440" tIns="45720" rIns="91440" bIns="45720">
+            <a:spAutoFit/>
+          </a:bodyPr>
+          <a:lstStyle/>
+          <a:p>
+            <a:pPr algn="ctr"/>
+            <a:r>
+              <a:rPr lang="de-DE" sz="3200" b="1" cap="none" spc="0" dirty="0">
+                <a:ln w="22225">
+                  <a:solidFill>
+                    <a:schemeClr val="accent2"/>
+                  </a:solidFill>
+                  <a:prstDash val="solid"/>
+                </a:ln>
+                <a:solidFill>
+                  <a:schemeClr val="accent2">
+                    <a:lumMod val="40000"/>
+                    <a:lumOff val="60000"/>
+                  </a:schemeClr>
+                </a:solidFill>
+                <a:effectLst/>
+              </a:rPr>
+              <a:t>GGT</a:t>
+            </a:r>
+          </a:p>
+        </p:txBody>
+      </p:sp>
     </p:spTree>
     <p:extLst>
       <p:ext uri="{BB962C8B-B14F-4D97-AF65-F5344CB8AC3E}">

</xml_diff>

<commit_message>
Update des Datapath erledigt. Umstellung der Schrittkette
</commit_message>
<xml_diff>
--- a/Datenflussgraph_GGT.pptx
+++ b/Datenflussgraph_GGT.pptx
@@ -243,7 +243,7 @@
           <a:p>
             <a:fld id="{AF4AC487-DE55-40C5-9A41-4653E1208946}" type="datetimeFigureOut">
               <a:rPr lang="de-DE" smtClean="0"/>
-              <a:t>07.03.2025</a:t>
+              <a:t>13.03.2025</a:t>
             </a:fld>
             <a:endParaRPr lang="de-DE"/>
           </a:p>
@@ -413,7 +413,7 @@
           <a:p>
             <a:fld id="{AF4AC487-DE55-40C5-9A41-4653E1208946}" type="datetimeFigureOut">
               <a:rPr lang="de-DE" smtClean="0"/>
-              <a:t>07.03.2025</a:t>
+              <a:t>13.03.2025</a:t>
             </a:fld>
             <a:endParaRPr lang="de-DE"/>
           </a:p>
@@ -593,7 +593,7 @@
           <a:p>
             <a:fld id="{AF4AC487-DE55-40C5-9A41-4653E1208946}" type="datetimeFigureOut">
               <a:rPr lang="de-DE" smtClean="0"/>
-              <a:t>07.03.2025</a:t>
+              <a:t>13.03.2025</a:t>
             </a:fld>
             <a:endParaRPr lang="de-DE"/>
           </a:p>
@@ -763,7 +763,7 @@
           <a:p>
             <a:fld id="{AF4AC487-DE55-40C5-9A41-4653E1208946}" type="datetimeFigureOut">
               <a:rPr lang="de-DE" smtClean="0"/>
-              <a:t>07.03.2025</a:t>
+              <a:t>13.03.2025</a:t>
             </a:fld>
             <a:endParaRPr lang="de-DE"/>
           </a:p>
@@ -1009,7 +1009,7 @@
           <a:p>
             <a:fld id="{AF4AC487-DE55-40C5-9A41-4653E1208946}" type="datetimeFigureOut">
               <a:rPr lang="de-DE" smtClean="0"/>
-              <a:t>07.03.2025</a:t>
+              <a:t>13.03.2025</a:t>
             </a:fld>
             <a:endParaRPr lang="de-DE"/>
           </a:p>
@@ -1241,7 +1241,7 @@
           <a:p>
             <a:fld id="{AF4AC487-DE55-40C5-9A41-4653E1208946}" type="datetimeFigureOut">
               <a:rPr lang="de-DE" smtClean="0"/>
-              <a:t>07.03.2025</a:t>
+              <a:t>13.03.2025</a:t>
             </a:fld>
             <a:endParaRPr lang="de-DE"/>
           </a:p>
@@ -1608,7 +1608,7 @@
           <a:p>
             <a:fld id="{AF4AC487-DE55-40C5-9A41-4653E1208946}" type="datetimeFigureOut">
               <a:rPr lang="de-DE" smtClean="0"/>
-              <a:t>07.03.2025</a:t>
+              <a:t>13.03.2025</a:t>
             </a:fld>
             <a:endParaRPr lang="de-DE"/>
           </a:p>
@@ -1726,7 +1726,7 @@
           <a:p>
             <a:fld id="{AF4AC487-DE55-40C5-9A41-4653E1208946}" type="datetimeFigureOut">
               <a:rPr lang="de-DE" smtClean="0"/>
-              <a:t>07.03.2025</a:t>
+              <a:t>13.03.2025</a:t>
             </a:fld>
             <a:endParaRPr lang="de-DE"/>
           </a:p>
@@ -1821,7 +1821,7 @@
           <a:p>
             <a:fld id="{AF4AC487-DE55-40C5-9A41-4653E1208946}" type="datetimeFigureOut">
               <a:rPr lang="de-DE" smtClean="0"/>
-              <a:t>07.03.2025</a:t>
+              <a:t>13.03.2025</a:t>
             </a:fld>
             <a:endParaRPr lang="de-DE"/>
           </a:p>
@@ -2098,7 +2098,7 @@
           <a:p>
             <a:fld id="{AF4AC487-DE55-40C5-9A41-4653E1208946}" type="datetimeFigureOut">
               <a:rPr lang="de-DE" smtClean="0"/>
-              <a:t>07.03.2025</a:t>
+              <a:t>13.03.2025</a:t>
             </a:fld>
             <a:endParaRPr lang="de-DE"/>
           </a:p>
@@ -2355,7 +2355,7 @@
           <a:p>
             <a:fld id="{AF4AC487-DE55-40C5-9A41-4653E1208946}" type="datetimeFigureOut">
               <a:rPr lang="de-DE" smtClean="0"/>
-              <a:t>07.03.2025</a:t>
+              <a:t>13.03.2025</a:t>
             </a:fld>
             <a:endParaRPr lang="de-DE"/>
           </a:p>
@@ -2568,7 +2568,7 @@
           <a:p>
             <a:fld id="{AF4AC487-DE55-40C5-9A41-4653E1208946}" type="datetimeFigureOut">
               <a:rPr lang="de-DE" smtClean="0"/>
-              <a:t>07.03.2025</a:t>
+              <a:t>13.03.2025</a:t>
             </a:fld>
             <a:endParaRPr lang="de-DE"/>
           </a:p>
@@ -2975,10 +2975,10 @@
       </p:grpSpPr>
       <p:sp>
         <p:nvSpPr>
-          <p:cNvPr id="4" name="Rechteck 3">
-            <a:extLst>
-              <a:ext uri="{FF2B5EF4-FFF2-40B4-BE49-F238E27FC236}">
-                <a16:creationId xmlns:a16="http://schemas.microsoft.com/office/drawing/2014/main" id="{88C6E61F-B473-289D-F3D7-AD1C2F4CAE77}"/>
+          <p:cNvPr id="5" name="Rechteck 4">
+            <a:extLst>
+              <a:ext uri="{FF2B5EF4-FFF2-40B4-BE49-F238E27FC236}">
+                <a16:creationId xmlns:a16="http://schemas.microsoft.com/office/drawing/2014/main" id="{EDB6D3ED-B487-BB95-32C7-8F3AD74ED0FB}"/>
               </a:ext>
             </a:extLst>
           </p:cNvPr>
@@ -2986,9 +2986,9 @@
           <p:nvPr/>
         </p:nvSpPr>
         <p:spPr>
-          <a:xfrm>
-            <a:off x="-23283" y="907393"/>
-            <a:ext cx="10760392" cy="45719"/>
+          <a:xfrm rot="5400000" flipV="1">
+            <a:off x="-3683236" y="5328667"/>
+            <a:ext cx="10746317" cy="88983"/>
           </a:xfrm>
           <a:prstGeom prst="rect">
             <a:avLst/>
@@ -3024,55 +3024,6 @@
       </p:sp>
       <p:sp>
         <p:nvSpPr>
-          <p:cNvPr id="5" name="Rechteck 4">
-            <a:extLst>
-              <a:ext uri="{FF2B5EF4-FFF2-40B4-BE49-F238E27FC236}">
-                <a16:creationId xmlns:a16="http://schemas.microsoft.com/office/drawing/2014/main" id="{EDB6D3ED-B487-BB95-32C7-8F3AD74ED0FB}"/>
-              </a:ext>
-            </a:extLst>
-          </p:cNvPr>
-          <p:cNvSpPr/>
-          <p:nvPr/>
-        </p:nvSpPr>
-        <p:spPr>
-          <a:xfrm rot="5400000" flipV="1">
-            <a:off x="-3266746" y="4930242"/>
-            <a:ext cx="9908117" cy="47633"/>
-          </a:xfrm>
-          <a:prstGeom prst="rect">
-            <a:avLst/>
-          </a:prstGeom>
-          <a:ln>
-            <a:noFill/>
-          </a:ln>
-        </p:spPr>
-        <p:style>
-          <a:lnRef idx="2">
-            <a:schemeClr val="accent1">
-              <a:shade val="15000"/>
-            </a:schemeClr>
-          </a:lnRef>
-          <a:fillRef idx="1">
-            <a:schemeClr val="accent1"/>
-          </a:fillRef>
-          <a:effectRef idx="0">
-            <a:schemeClr val="accent1"/>
-          </a:effectRef>
-          <a:fontRef idx="minor">
-            <a:schemeClr val="lt1"/>
-          </a:fontRef>
-        </p:style>
-        <p:txBody>
-          <a:bodyPr rtlCol="0" anchor="ctr"/>
-          <a:lstStyle/>
-          <a:p>
-            <a:pPr algn="ctr"/>
-            <a:endParaRPr lang="de-DE"/>
-          </a:p>
-        </p:txBody>
-      </p:sp>
-      <p:sp>
-        <p:nvSpPr>
           <p:cNvPr id="6" name="Textfeld 5">
             <a:extLst>
               <a:ext uri="{FF2B5EF4-FFF2-40B4-BE49-F238E27FC236}">
@@ -3085,7 +3036,7 @@
         </p:nvSpPr>
         <p:spPr>
           <a:xfrm>
-            <a:off x="1658937" y="495724"/>
+            <a:off x="1675933" y="301008"/>
             <a:ext cx="1087702" cy="369332"/>
           </a:xfrm>
           <a:prstGeom prst="rect">
@@ -3120,7 +3071,7 @@
         </p:nvSpPr>
         <p:spPr>
           <a:xfrm>
-            <a:off x="2562886" y="495724"/>
+            <a:off x="2579882" y="301008"/>
             <a:ext cx="1087702" cy="369332"/>
           </a:xfrm>
           <a:prstGeom prst="rect">
@@ -3155,7 +3106,7 @@
         </p:nvSpPr>
         <p:spPr>
           <a:xfrm>
-            <a:off x="3476016" y="505792"/>
+            <a:off x="3493012" y="311076"/>
             <a:ext cx="1509051" cy="369332"/>
           </a:xfrm>
           <a:prstGeom prst="rect">
@@ -3191,7 +3142,7 @@
         </p:nvSpPr>
         <p:spPr>
           <a:xfrm>
-            <a:off x="4985067" y="515860"/>
+            <a:off x="5002063" y="321144"/>
             <a:ext cx="1453198" cy="369332"/>
           </a:xfrm>
           <a:prstGeom prst="rect">
@@ -3227,7 +3178,7 @@
         </p:nvSpPr>
         <p:spPr>
           <a:xfrm>
-            <a:off x="6437549" y="264480"/>
+            <a:off x="6454545" y="69764"/>
             <a:ext cx="1292053" cy="646331"/>
           </a:xfrm>
           <a:prstGeom prst="rect">
@@ -3264,7 +3215,7 @@
         </p:nvSpPr>
         <p:spPr>
           <a:xfrm>
-            <a:off x="7673077" y="260181"/>
+            <a:off x="7690073" y="65465"/>
             <a:ext cx="1292053" cy="646331"/>
           </a:xfrm>
           <a:prstGeom prst="rect">
@@ -3303,8 +3254,8 @@
         </p:nvCxnSpPr>
         <p:spPr>
           <a:xfrm>
-            <a:off x="2008717" y="1043517"/>
-            <a:ext cx="0" cy="8864600"/>
+            <a:off x="2032001" y="758396"/>
+            <a:ext cx="1" cy="9987921"/>
           </a:xfrm>
           <a:prstGeom prst="line">
             <a:avLst/>
@@ -3344,8 +3295,8 @@
         </p:nvCxnSpPr>
         <p:spPr>
           <a:xfrm>
-            <a:off x="2940050" y="1043517"/>
-            <a:ext cx="0" cy="8864600"/>
+            <a:off x="2963335" y="758396"/>
+            <a:ext cx="0" cy="9987921"/>
           </a:xfrm>
           <a:prstGeom prst="line">
             <a:avLst/>
@@ -3385,8 +3336,8 @@
         </p:nvCxnSpPr>
         <p:spPr>
           <a:xfrm>
-            <a:off x="4150784" y="1043517"/>
-            <a:ext cx="0" cy="8864600"/>
+            <a:off x="4174069" y="711796"/>
+            <a:ext cx="0" cy="10034521"/>
           </a:xfrm>
           <a:prstGeom prst="line">
             <a:avLst/>
@@ -3426,8 +3377,8 @@
         </p:nvCxnSpPr>
         <p:spPr>
           <a:xfrm>
-            <a:off x="5607050" y="1043517"/>
-            <a:ext cx="0" cy="8864600"/>
+            <a:off x="5594160" y="758396"/>
+            <a:ext cx="36175" cy="9987921"/>
           </a:xfrm>
           <a:prstGeom prst="line">
             <a:avLst/>
@@ -3467,8 +3418,8 @@
         </p:nvCxnSpPr>
         <p:spPr>
           <a:xfrm>
-            <a:off x="7088795" y="1043517"/>
-            <a:ext cx="0" cy="8864600"/>
+            <a:off x="7110429" y="758396"/>
+            <a:ext cx="1651" cy="9987921"/>
           </a:xfrm>
           <a:prstGeom prst="line">
             <a:avLst/>
@@ -3503,13 +3454,14 @@
           </p:cNvPr>
           <p:cNvCxnSpPr>
             <a:cxnSpLocks/>
+            <a:stCxn id="11" idx="2"/>
           </p:cNvCxnSpPr>
           <p:nvPr/>
         </p:nvCxnSpPr>
         <p:spPr>
           <a:xfrm>
-            <a:off x="8319105" y="1043517"/>
-            <a:ext cx="0" cy="8864600"/>
+            <a:off x="8336100" y="711796"/>
+            <a:ext cx="6290" cy="10034521"/>
           </a:xfrm>
           <a:prstGeom prst="line">
             <a:avLst/>
@@ -3547,7 +3499,7 @@
         </p:nvSpPr>
         <p:spPr>
           <a:xfrm>
-            <a:off x="11868" y="1131912"/>
+            <a:off x="35153" y="1970112"/>
             <a:ext cx="1634612" cy="340737"/>
           </a:xfrm>
           <a:prstGeom prst="rect">
@@ -3611,7 +3563,7 @@
         </p:nvCxnSpPr>
         <p:spPr>
           <a:xfrm>
-            <a:off x="2008717" y="1280583"/>
+            <a:off x="2032002" y="2118783"/>
             <a:ext cx="7198586" cy="10273"/>
           </a:xfrm>
           <a:prstGeom prst="straightConnector1">
@@ -3652,7 +3604,7 @@
         </p:nvCxnSpPr>
         <p:spPr>
           <a:xfrm flipV="1">
-            <a:off x="2940050" y="1441450"/>
+            <a:off x="2963335" y="2279650"/>
             <a:ext cx="6263217" cy="1806"/>
           </a:xfrm>
           <a:prstGeom prst="straightConnector1">
@@ -3691,7 +3643,7 @@
         </p:nvSpPr>
         <p:spPr>
           <a:xfrm>
-            <a:off x="9208137" y="1200493"/>
+            <a:off x="9231422" y="2038693"/>
             <a:ext cx="1534750" cy="509241"/>
           </a:xfrm>
           <a:prstGeom prst="rect">
@@ -3750,7 +3702,7 @@
         </p:nvSpPr>
         <p:spPr>
           <a:xfrm>
-            <a:off x="2875971" y="1382775"/>
+            <a:off x="2899256" y="2220975"/>
             <a:ext cx="118531" cy="120961"/>
           </a:xfrm>
           <a:prstGeom prst="ellipse">
@@ -3796,7 +3748,7 @@
         </p:nvSpPr>
         <p:spPr>
           <a:xfrm>
-            <a:off x="1950436" y="1213885"/>
+            <a:off x="1973721" y="2052085"/>
             <a:ext cx="118531" cy="120961"/>
           </a:xfrm>
           <a:prstGeom prst="ellipse">
@@ -3845,7 +3797,7 @@
         </p:nvCxnSpPr>
         <p:spPr>
           <a:xfrm>
-            <a:off x="9975512" y="1709734"/>
+            <a:off x="9998797" y="2547934"/>
             <a:ext cx="0" cy="409942"/>
           </a:xfrm>
           <a:prstGeom prst="straightConnector1">
@@ -3886,7 +3838,7 @@
         </p:nvCxnSpPr>
         <p:spPr>
           <a:xfrm flipH="1" flipV="1">
-            <a:off x="7088795" y="2356623"/>
+            <a:off x="7112080" y="3194823"/>
             <a:ext cx="2160797" cy="1"/>
           </a:xfrm>
           <a:prstGeom prst="straightConnector1">
@@ -3925,7 +3877,7 @@
         </p:nvSpPr>
         <p:spPr>
           <a:xfrm>
-            <a:off x="-73202" y="1975057"/>
+            <a:off x="-49917" y="2813257"/>
             <a:ext cx="1742372" cy="340737"/>
           </a:xfrm>
           <a:prstGeom prst="rect">
@@ -3987,7 +3939,7 @@
         </p:nvSpPr>
         <p:spPr>
           <a:xfrm>
-            <a:off x="9249549" y="2989105"/>
+            <a:off x="9272834" y="3827305"/>
             <a:ext cx="1565109" cy="509241"/>
           </a:xfrm>
           <a:prstGeom prst="rect">
@@ -4048,7 +4000,7 @@
         </p:nvCxnSpPr>
         <p:spPr>
           <a:xfrm>
-            <a:off x="2026634" y="3061780"/>
+            <a:off x="2049919" y="3899980"/>
             <a:ext cx="7198586" cy="10273"/>
           </a:xfrm>
           <a:prstGeom prst="straightConnector1">
@@ -4087,7 +4039,7 @@
         </p:nvSpPr>
         <p:spPr>
           <a:xfrm>
-            <a:off x="1968353" y="2995082"/>
+            <a:off x="1991638" y="3833282"/>
             <a:ext cx="118531" cy="120961"/>
           </a:xfrm>
           <a:prstGeom prst="ellipse">
@@ -4135,7 +4087,7 @@
         </p:nvCxnSpPr>
         <p:spPr>
           <a:xfrm>
-            <a:off x="2938218" y="3244583"/>
+            <a:off x="2961503" y="4082783"/>
             <a:ext cx="6309499" cy="25667"/>
           </a:xfrm>
           <a:prstGeom prst="straightConnector1">
@@ -4174,7 +4126,7 @@
         </p:nvSpPr>
         <p:spPr>
           <a:xfrm>
-            <a:off x="2879937" y="3177885"/>
+            <a:off x="2903222" y="4016085"/>
             <a:ext cx="118531" cy="120961"/>
           </a:xfrm>
           <a:prstGeom prst="ellipse">
@@ -4220,7 +4172,7 @@
         </p:nvSpPr>
         <p:spPr>
           <a:xfrm>
-            <a:off x="9247717" y="3753557"/>
+            <a:off x="9271002" y="4591757"/>
             <a:ext cx="1534750" cy="509241"/>
           </a:xfrm>
           <a:prstGeom prst="rect">
@@ -4281,7 +4233,7 @@
         </p:nvCxnSpPr>
         <p:spPr>
           <a:xfrm>
-            <a:off x="9975512" y="3496442"/>
+            <a:off x="9998797" y="4334642"/>
             <a:ext cx="338" cy="255933"/>
           </a:xfrm>
           <a:prstGeom prst="straightConnector1">
@@ -4322,7 +4274,7 @@
         </p:nvCxnSpPr>
         <p:spPr>
           <a:xfrm flipH="1">
-            <a:off x="8319105" y="4010992"/>
+            <a:off x="8342390" y="4849192"/>
             <a:ext cx="930487" cy="0"/>
           </a:xfrm>
           <a:prstGeom prst="straightConnector1">
@@ -4361,7 +4313,7 @@
         </p:nvSpPr>
         <p:spPr>
           <a:xfrm>
-            <a:off x="5659" y="3736245"/>
+            <a:off x="28944" y="4574445"/>
             <a:ext cx="1598571" cy="465667"/>
           </a:xfrm>
           <a:prstGeom prst="rect">
@@ -4425,7 +4377,7 @@
         </p:nvCxnSpPr>
         <p:spPr>
           <a:xfrm flipH="1">
-            <a:off x="2026634" y="4772992"/>
+            <a:off x="2049919" y="5611192"/>
             <a:ext cx="5062161" cy="0"/>
           </a:xfrm>
           <a:prstGeom prst="straightConnector1">
@@ -4464,7 +4416,7 @@
         </p:nvSpPr>
         <p:spPr>
           <a:xfrm>
-            <a:off x="7028906" y="4702324"/>
+            <a:off x="7052191" y="5540524"/>
             <a:ext cx="118531" cy="120961"/>
           </a:xfrm>
           <a:prstGeom prst="ellipse">
@@ -4512,7 +4464,7 @@
         </p:nvCxnSpPr>
         <p:spPr>
           <a:xfrm flipH="1">
-            <a:off x="2935236" y="4942924"/>
+            <a:off x="2958521" y="5781124"/>
             <a:ext cx="5383869" cy="0"/>
           </a:xfrm>
           <a:prstGeom prst="straightConnector1">
@@ -4551,7 +4503,7 @@
         </p:nvSpPr>
         <p:spPr>
           <a:xfrm>
-            <a:off x="8259839" y="4882443"/>
+            <a:off x="8283124" y="5720643"/>
             <a:ext cx="118531" cy="120961"/>
           </a:xfrm>
           <a:prstGeom prst="ellipse">
@@ -4597,7 +4549,7 @@
         </p:nvSpPr>
         <p:spPr>
           <a:xfrm>
-            <a:off x="43979" y="5741615"/>
+            <a:off x="67264" y="6579815"/>
             <a:ext cx="1468857" cy="465667"/>
           </a:xfrm>
           <a:prstGeom prst="rect">
@@ -4659,7 +4611,7 @@
         </p:nvSpPr>
         <p:spPr>
           <a:xfrm>
-            <a:off x="9208137" y="5822452"/>
+            <a:off x="9231422" y="6660652"/>
             <a:ext cx="1534750" cy="509241"/>
           </a:xfrm>
           <a:prstGeom prst="rect">
@@ -4715,7 +4667,7 @@
         </p:nvCxnSpPr>
         <p:spPr>
           <a:xfrm>
-            <a:off x="2008716" y="5937243"/>
+            <a:off x="2032001" y="6775443"/>
             <a:ext cx="7198586" cy="10273"/>
           </a:xfrm>
           <a:prstGeom prst="straightConnector1">
@@ -4756,7 +4708,7 @@
         </p:nvCxnSpPr>
         <p:spPr>
           <a:xfrm flipV="1">
-            <a:off x="2940049" y="6098110"/>
+            <a:off x="2963334" y="6936310"/>
             <a:ext cx="6263217" cy="1806"/>
           </a:xfrm>
           <a:prstGeom prst="straightConnector1">
@@ -4795,7 +4747,7 @@
         </p:nvSpPr>
         <p:spPr>
           <a:xfrm>
-            <a:off x="2875970" y="6039435"/>
+            <a:off x="2899255" y="6877635"/>
             <a:ext cx="118531" cy="120961"/>
           </a:xfrm>
           <a:prstGeom prst="ellipse">
@@ -4841,7 +4793,7 @@
         </p:nvSpPr>
         <p:spPr>
           <a:xfrm>
-            <a:off x="1950435" y="5870545"/>
+            <a:off x="1973720" y="6708745"/>
             <a:ext cx="118531" cy="120961"/>
           </a:xfrm>
           <a:prstGeom prst="ellipse">
@@ -4889,7 +4841,7 @@
         </p:nvCxnSpPr>
         <p:spPr>
           <a:xfrm>
-            <a:off x="9975850" y="6351716"/>
+            <a:off x="9999135" y="7189916"/>
             <a:ext cx="0" cy="274347"/>
           </a:xfrm>
           <a:prstGeom prst="straightConnector1">
@@ -4930,7 +4882,7 @@
         </p:nvCxnSpPr>
         <p:spPr>
           <a:xfrm flipH="1">
-            <a:off x="4150784" y="6880684"/>
+            <a:off x="4174069" y="7718884"/>
             <a:ext cx="5038919" cy="0"/>
           </a:xfrm>
           <a:prstGeom prst="straightConnector1">
@@ -4969,7 +4921,7 @@
         </p:nvSpPr>
         <p:spPr>
           <a:xfrm>
-            <a:off x="52401" y="7437467"/>
+            <a:off x="75686" y="8275667"/>
             <a:ext cx="1468857" cy="465667"/>
           </a:xfrm>
           <a:prstGeom prst="rect">
@@ -5031,7 +4983,7 @@
         </p:nvSpPr>
         <p:spPr>
           <a:xfrm>
-            <a:off x="-12022" y="8130516"/>
+            <a:off x="11263" y="8968716"/>
             <a:ext cx="1616252" cy="465667"/>
           </a:xfrm>
           <a:prstGeom prst="rect">
@@ -5090,7 +5042,7 @@
         </p:nvCxnSpPr>
         <p:spPr>
           <a:xfrm flipH="1">
-            <a:off x="2008716" y="8467248"/>
+            <a:off x="2032001" y="9305448"/>
             <a:ext cx="926519" cy="0"/>
           </a:xfrm>
           <a:prstGeom prst="straightConnector1">
@@ -5129,7 +5081,7 @@
         </p:nvSpPr>
         <p:spPr>
           <a:xfrm>
-            <a:off x="2874985" y="8406767"/>
+            <a:off x="2898270" y="9244967"/>
             <a:ext cx="118531" cy="120961"/>
           </a:xfrm>
           <a:prstGeom prst="ellipse">
@@ -5177,7 +5129,7 @@
         </p:nvCxnSpPr>
         <p:spPr>
           <a:xfrm flipH="1">
-            <a:off x="2935235" y="9230930"/>
+            <a:off x="2958520" y="10069130"/>
             <a:ext cx="1214802" cy="0"/>
           </a:xfrm>
           <a:prstGeom prst="straightConnector1">
@@ -5216,7 +5168,7 @@
         </p:nvSpPr>
         <p:spPr>
           <a:xfrm>
-            <a:off x="4089787" y="9170449"/>
+            <a:off x="4113072" y="10008649"/>
             <a:ext cx="118531" cy="120961"/>
           </a:xfrm>
           <a:prstGeom prst="ellipse">
@@ -5264,7 +5216,7 @@
         </p:nvCxnSpPr>
         <p:spPr>
           <a:xfrm>
-            <a:off x="4173645" y="9509812"/>
+            <a:off x="4196930" y="10348012"/>
             <a:ext cx="1433405" cy="0"/>
           </a:xfrm>
           <a:prstGeom prst="straightConnector1">
@@ -5303,7 +5255,7 @@
         </p:nvSpPr>
         <p:spPr>
           <a:xfrm>
-            <a:off x="4112648" y="9449331"/>
+            <a:off x="4135933" y="10287531"/>
             <a:ext cx="118531" cy="120961"/>
           </a:xfrm>
           <a:prstGeom prst="ellipse">
@@ -5349,7 +5301,7 @@
         </p:nvSpPr>
         <p:spPr>
           <a:xfrm>
-            <a:off x="5711666" y="1069415"/>
+            <a:off x="5609097" y="824868"/>
             <a:ext cx="1516269" cy="276999"/>
           </a:xfrm>
           <a:prstGeom prst="rect">
@@ -5364,9 +5316,10 @@
           <a:lstStyle/>
           <a:p>
             <a:r>
-              <a:rPr lang="de-DE" sz="1200" dirty="0"/>
-              <a:t>Zahl1_to_alu_a</a:t>
-            </a:r>
+              <a:rPr lang="de-DE" sz="1200" dirty="0" err="1"/>
+              <a:t>wren_initial</a:t>
+            </a:r>
+            <a:endParaRPr lang="de-DE" sz="1200" dirty="0"/>
           </a:p>
         </p:txBody>
       </p:sp>
@@ -5384,7 +5337,7 @@
         </p:nvSpPr>
         <p:spPr>
           <a:xfrm>
-            <a:off x="5711666" y="2829168"/>
+            <a:off x="5734951" y="3667368"/>
             <a:ext cx="1516269" cy="276999"/>
           </a:xfrm>
           <a:prstGeom prst="rect">
@@ -5419,7 +5372,7 @@
         </p:nvSpPr>
         <p:spPr>
           <a:xfrm>
-            <a:off x="5711665" y="5712850"/>
+            <a:off x="5734950" y="6551050"/>
             <a:ext cx="1516269" cy="276999"/>
           </a:xfrm>
           <a:prstGeom prst="rect">
@@ -5454,7 +5407,7 @@
         </p:nvSpPr>
         <p:spPr>
           <a:xfrm>
-            <a:off x="5711665" y="1443143"/>
+            <a:off x="5734950" y="2281343"/>
             <a:ext cx="1516269" cy="276999"/>
           </a:xfrm>
           <a:prstGeom prst="rect">
@@ -5489,7 +5442,7 @@
         </p:nvSpPr>
         <p:spPr>
           <a:xfrm>
-            <a:off x="5711665" y="3245923"/>
+            <a:off x="5734950" y="4084123"/>
             <a:ext cx="1516269" cy="276999"/>
           </a:xfrm>
           <a:prstGeom prst="rect">
@@ -5524,7 +5477,7 @@
         </p:nvSpPr>
         <p:spPr>
           <a:xfrm>
-            <a:off x="5711664" y="6083240"/>
+            <a:off x="5734949" y="6921440"/>
             <a:ext cx="1516269" cy="276999"/>
           </a:xfrm>
           <a:prstGeom prst="rect">
@@ -5559,7 +5512,7 @@
         </p:nvSpPr>
         <p:spPr>
           <a:xfrm>
-            <a:off x="4610183" y="9503204"/>
+            <a:off x="4633468" y="10341404"/>
             <a:ext cx="1806033" cy="276999"/>
           </a:xfrm>
           <a:prstGeom prst="rect">
@@ -5595,7 +5548,7 @@
         </p:nvSpPr>
         <p:spPr>
           <a:xfrm>
-            <a:off x="5570875" y="6842052"/>
+            <a:off x="5594160" y="7680252"/>
             <a:ext cx="1516269" cy="276999"/>
           </a:xfrm>
           <a:prstGeom prst="rect">
@@ -5631,7 +5584,7 @@
         </p:nvSpPr>
         <p:spPr>
           <a:xfrm>
-            <a:off x="4132212" y="5159771"/>
+            <a:off x="4155497" y="5997971"/>
             <a:ext cx="1516269" cy="276999"/>
           </a:xfrm>
           <a:prstGeom prst="rect">
@@ -5667,7 +5620,7 @@
         </p:nvSpPr>
         <p:spPr>
           <a:xfrm>
-            <a:off x="7890747" y="2119676"/>
+            <a:off x="7914032" y="2957876"/>
             <a:ext cx="1516269" cy="276999"/>
           </a:xfrm>
           <a:prstGeom prst="rect">
@@ -5703,7 +5656,7 @@
         </p:nvSpPr>
         <p:spPr>
           <a:xfrm>
-            <a:off x="7890747" y="3769846"/>
+            <a:off x="7914032" y="4608046"/>
             <a:ext cx="1516269" cy="276999"/>
           </a:xfrm>
           <a:prstGeom prst="rect">
@@ -5739,7 +5692,7 @@
         </p:nvSpPr>
         <p:spPr>
           <a:xfrm>
-            <a:off x="52401" y="6621336"/>
+            <a:off x="75686" y="7459536"/>
             <a:ext cx="1468857" cy="465667"/>
           </a:xfrm>
           <a:prstGeom prst="rect">
@@ -5801,7 +5754,7 @@
         </p:nvSpPr>
         <p:spPr>
           <a:xfrm>
-            <a:off x="1225418" y="1395121"/>
+            <a:off x="1222835" y="1402036"/>
             <a:ext cx="335377" cy="369332"/>
           </a:xfrm>
           <a:prstGeom prst="rect">
@@ -5836,7 +5789,7 @@
         </p:nvSpPr>
         <p:spPr>
           <a:xfrm>
-            <a:off x="1225418" y="2384996"/>
+            <a:off x="1230957" y="2265191"/>
             <a:ext cx="335377" cy="369332"/>
           </a:xfrm>
           <a:prstGeom prst="rect">
@@ -5871,7 +5824,7 @@
         </p:nvSpPr>
         <p:spPr>
           <a:xfrm>
-            <a:off x="1225418" y="4075613"/>
+            <a:off x="1230956" y="3236116"/>
             <a:ext cx="335377" cy="369332"/>
           </a:xfrm>
           <a:prstGeom prst="rect">
@@ -5906,7 +5859,7 @@
         </p:nvSpPr>
         <p:spPr>
           <a:xfrm>
-            <a:off x="1222090" y="5216023"/>
+            <a:off x="1220320" y="4936750"/>
             <a:ext cx="335377" cy="369332"/>
           </a:xfrm>
           <a:prstGeom prst="rect">
@@ -5941,7 +5894,7 @@
         </p:nvSpPr>
         <p:spPr>
           <a:xfrm>
-            <a:off x="1249639" y="6051022"/>
+            <a:off x="1230955" y="6044486"/>
             <a:ext cx="335377" cy="369332"/>
           </a:xfrm>
           <a:prstGeom prst="rect">
@@ -5976,7 +5929,7 @@
         </p:nvSpPr>
         <p:spPr>
           <a:xfrm>
-            <a:off x="1225174" y="6952857"/>
+            <a:off x="1246064" y="6885462"/>
             <a:ext cx="335377" cy="369332"/>
           </a:xfrm>
           <a:prstGeom prst="rect">
@@ -6011,7 +5964,7 @@
         </p:nvSpPr>
         <p:spPr>
           <a:xfrm>
-            <a:off x="1219962" y="7727022"/>
+            <a:off x="1252303" y="7810438"/>
             <a:ext cx="335377" cy="369332"/>
           </a:xfrm>
           <a:prstGeom prst="rect">
@@ -6046,7 +5999,7 @@
         </p:nvSpPr>
         <p:spPr>
           <a:xfrm>
-            <a:off x="12179" y="4688887"/>
+            <a:off x="35464" y="5527087"/>
             <a:ext cx="1520233" cy="465667"/>
           </a:xfrm>
           <a:prstGeom prst="rect">
@@ -6108,7 +6061,7 @@
         </p:nvSpPr>
         <p:spPr>
           <a:xfrm>
-            <a:off x="1222090" y="8481076"/>
+            <a:off x="1244490" y="8557349"/>
             <a:ext cx="335377" cy="369332"/>
           </a:xfrm>
           <a:prstGeom prst="rect">
@@ -6143,7 +6096,7 @@
         </p:nvSpPr>
         <p:spPr>
           <a:xfrm>
-            <a:off x="-23283" y="8898029"/>
+            <a:off x="2" y="9736229"/>
             <a:ext cx="10914003" cy="45719"/>
           </a:xfrm>
           <a:prstGeom prst="rect">
@@ -6192,7 +6145,7 @@
         </p:nvSpPr>
         <p:spPr>
           <a:xfrm>
-            <a:off x="83490" y="9058576"/>
+            <a:off x="106775" y="9896776"/>
             <a:ext cx="1468857" cy="465667"/>
           </a:xfrm>
           <a:prstGeom prst="rect">
@@ -6249,7 +6202,7 @@
         </p:nvSpPr>
         <p:spPr>
           <a:xfrm>
-            <a:off x="2483862" y="8123630"/>
+            <a:off x="2507147" y="8961830"/>
             <a:ext cx="1516269" cy="276999"/>
           </a:xfrm>
           <a:prstGeom prst="rect">
@@ -6285,7 +6238,7 @@
         </p:nvSpPr>
         <p:spPr>
           <a:xfrm>
-            <a:off x="1221205" y="9365394"/>
+            <a:off x="1244490" y="9357461"/>
             <a:ext cx="335377" cy="369332"/>
           </a:xfrm>
           <a:prstGeom prst="rect">
@@ -6320,7 +6273,7 @@
         </p:nvSpPr>
         <p:spPr>
           <a:xfrm>
-            <a:off x="8259839" y="5131407"/>
+            <a:off x="8283124" y="5969607"/>
             <a:ext cx="118531" cy="120961"/>
           </a:xfrm>
           <a:prstGeom prst="ellipse">
@@ -6368,7 +6321,7 @@
         </p:nvCxnSpPr>
         <p:spPr>
           <a:xfrm flipH="1">
-            <a:off x="5607050" y="5192183"/>
+            <a:off x="5630335" y="6030383"/>
             <a:ext cx="2712054" cy="0"/>
           </a:xfrm>
           <a:prstGeom prst="straightConnector1">
@@ -6407,7 +6360,7 @@
         </p:nvSpPr>
         <p:spPr>
           <a:xfrm>
-            <a:off x="9264770" y="2129507"/>
+            <a:off x="9288055" y="2967707"/>
             <a:ext cx="1534750" cy="509241"/>
           </a:xfrm>
           <a:prstGeom prst="rect">
@@ -6466,7 +6419,7 @@
         </p:nvSpPr>
         <p:spPr>
           <a:xfrm>
-            <a:off x="9102972" y="970814"/>
+            <a:off x="9126257" y="1809014"/>
             <a:ext cx="1701399" cy="276999"/>
           </a:xfrm>
           <a:prstGeom prst="rect">
@@ -6502,7 +6455,7 @@
         </p:nvSpPr>
         <p:spPr>
           <a:xfrm>
-            <a:off x="-11309" y="1810594"/>
+            <a:off x="11976" y="2648794"/>
             <a:ext cx="10914003" cy="45719"/>
           </a:xfrm>
           <a:prstGeom prst="rect">
@@ -6551,7 +6504,7 @@
         </p:nvSpPr>
         <p:spPr>
           <a:xfrm>
-            <a:off x="9156493" y="2750750"/>
+            <a:off x="9179778" y="3588950"/>
             <a:ext cx="1751220" cy="276999"/>
           </a:xfrm>
           <a:prstGeom prst="rect">
@@ -6587,7 +6540,7 @@
         </p:nvSpPr>
         <p:spPr>
           <a:xfrm>
-            <a:off x="9196069" y="6634737"/>
+            <a:off x="9219354" y="7472937"/>
             <a:ext cx="1534750" cy="509241"/>
           </a:xfrm>
           <a:prstGeom prst="rect">
@@ -6646,7 +6599,7 @@
         </p:nvSpPr>
         <p:spPr>
           <a:xfrm>
-            <a:off x="-29573" y="3589065"/>
+            <a:off x="-6288" y="4427265"/>
             <a:ext cx="10914003" cy="45719"/>
           </a:xfrm>
           <a:prstGeom prst="rect">
@@ -6695,7 +6648,7 @@
         </p:nvSpPr>
         <p:spPr>
           <a:xfrm>
-            <a:off x="-11309" y="4451363"/>
+            <a:off x="11976" y="5289563"/>
             <a:ext cx="10914003" cy="45719"/>
           </a:xfrm>
           <a:prstGeom prst="rect">
@@ -6744,7 +6697,7 @@
         </p:nvSpPr>
         <p:spPr>
           <a:xfrm>
-            <a:off x="-29575" y="5544956"/>
+            <a:off x="-6290" y="6383156"/>
             <a:ext cx="10914003" cy="45719"/>
           </a:xfrm>
           <a:prstGeom prst="rect">
@@ -6793,7 +6746,7 @@
         </p:nvSpPr>
         <p:spPr>
           <a:xfrm>
-            <a:off x="9407016" y="5582887"/>
+            <a:off x="9430301" y="6421087"/>
             <a:ext cx="1751220" cy="276999"/>
           </a:xfrm>
           <a:prstGeom prst="rect">
@@ -6829,7 +6782,7 @@
         </p:nvSpPr>
         <p:spPr>
           <a:xfrm>
-            <a:off x="-29575" y="9875883"/>
+            <a:off x="-6290" y="10714083"/>
             <a:ext cx="10914003" cy="45719"/>
           </a:xfrm>
           <a:prstGeom prst="rect">
@@ -6878,7 +6831,7 @@
         </p:nvSpPr>
         <p:spPr>
           <a:xfrm>
-            <a:off x="-3969" y="6446537"/>
+            <a:off x="19316" y="7284737"/>
             <a:ext cx="10914003" cy="45719"/>
           </a:xfrm>
           <a:prstGeom prst="rect">
@@ -6927,7 +6880,7 @@
         </p:nvSpPr>
         <p:spPr>
           <a:xfrm>
-            <a:off x="-12022" y="7334834"/>
+            <a:off x="11263" y="8173034"/>
             <a:ext cx="10914003" cy="45719"/>
           </a:xfrm>
           <a:prstGeom prst="rect">
@@ -6976,7 +6929,7 @@
         </p:nvSpPr>
         <p:spPr>
           <a:xfrm>
-            <a:off x="-12022" y="8068942"/>
+            <a:off x="11263" y="8907142"/>
             <a:ext cx="10914003" cy="45719"/>
           </a:xfrm>
           <a:prstGeom prst="rect">
@@ -7025,7 +6978,7 @@
         </p:nvSpPr>
         <p:spPr>
           <a:xfrm>
-            <a:off x="350799" y="250890"/>
+            <a:off x="367795" y="56174"/>
             <a:ext cx="971933" cy="584775"/>
           </a:xfrm>
           <a:prstGeom prst="rect">
@@ -7057,6 +7010,366 @@
                 <a:effectLst/>
               </a:rPr>
               <a:t>GGT</a:t>
+            </a:r>
+          </a:p>
+        </p:txBody>
+      </p:sp>
+      <p:sp>
+        <p:nvSpPr>
+          <p:cNvPr id="76" name="Rechteck 75">
+            <a:extLst>
+              <a:ext uri="{FF2B5EF4-FFF2-40B4-BE49-F238E27FC236}">
+                <a16:creationId xmlns:a16="http://schemas.microsoft.com/office/drawing/2014/main" id="{F4A78AEE-FAB7-9EEF-4E39-784FF56F14AE}"/>
+              </a:ext>
+            </a:extLst>
+          </p:cNvPr>
+          <p:cNvSpPr/>
+          <p:nvPr/>
+        </p:nvSpPr>
+        <p:spPr>
+          <a:xfrm>
+            <a:off x="-6290" y="710775"/>
+            <a:ext cx="10914003" cy="45719"/>
+          </a:xfrm>
+          <a:prstGeom prst="rect">
+            <a:avLst/>
+          </a:prstGeom>
+          <a:ln>
+            <a:noFill/>
+          </a:ln>
+        </p:spPr>
+        <p:style>
+          <a:lnRef idx="2">
+            <a:schemeClr val="accent1">
+              <a:shade val="15000"/>
+            </a:schemeClr>
+          </a:lnRef>
+          <a:fillRef idx="1">
+            <a:schemeClr val="accent1"/>
+          </a:fillRef>
+          <a:effectRef idx="0">
+            <a:schemeClr val="accent1"/>
+          </a:effectRef>
+          <a:fontRef idx="minor">
+            <a:schemeClr val="lt1"/>
+          </a:fontRef>
+        </p:style>
+        <p:txBody>
+          <a:bodyPr rtlCol="0" anchor="ctr"/>
+          <a:lstStyle/>
+          <a:p>
+            <a:pPr algn="ctr"/>
+            <a:endParaRPr lang="de-DE"/>
+          </a:p>
+        </p:txBody>
+      </p:sp>
+      <p:sp>
+        <p:nvSpPr>
+          <p:cNvPr id="88" name="Rechteck 87">
+            <a:extLst>
+              <a:ext uri="{FF2B5EF4-FFF2-40B4-BE49-F238E27FC236}">
+                <a16:creationId xmlns:a16="http://schemas.microsoft.com/office/drawing/2014/main" id="{1FD09462-6CBA-EDD0-0906-8E7B55C73BBC}"/>
+              </a:ext>
+            </a:extLst>
+          </p:cNvPr>
+          <p:cNvSpPr/>
+          <p:nvPr/>
+        </p:nvSpPr>
+        <p:spPr>
+          <a:xfrm>
+            <a:off x="2299" y="1717366"/>
+            <a:ext cx="10914003" cy="45719"/>
+          </a:xfrm>
+          <a:prstGeom prst="rect">
+            <a:avLst/>
+          </a:prstGeom>
+          <a:ln>
+            <a:noFill/>
+          </a:ln>
+        </p:spPr>
+        <p:style>
+          <a:lnRef idx="2">
+            <a:schemeClr val="accent1">
+              <a:shade val="15000"/>
+            </a:schemeClr>
+          </a:lnRef>
+          <a:fillRef idx="1">
+            <a:schemeClr val="accent1"/>
+          </a:fillRef>
+          <a:effectRef idx="0">
+            <a:schemeClr val="accent1"/>
+          </a:effectRef>
+          <a:fontRef idx="minor">
+            <a:schemeClr val="lt1"/>
+          </a:fontRef>
+        </p:style>
+        <p:txBody>
+          <a:bodyPr rtlCol="0" anchor="ctr"/>
+          <a:lstStyle/>
+          <a:p>
+            <a:pPr algn="ctr"/>
+            <a:endParaRPr lang="de-DE"/>
+          </a:p>
+        </p:txBody>
+      </p:sp>
+      <p:sp>
+        <p:nvSpPr>
+          <p:cNvPr id="90" name="Rechteck 89">
+            <a:extLst>
+              <a:ext uri="{FF2B5EF4-FFF2-40B4-BE49-F238E27FC236}">
+                <a16:creationId xmlns:a16="http://schemas.microsoft.com/office/drawing/2014/main" id="{EA0BD411-AA86-69A7-4F76-860A50E9D66F}"/>
+              </a:ext>
+            </a:extLst>
+          </p:cNvPr>
+          <p:cNvSpPr/>
+          <p:nvPr/>
+        </p:nvSpPr>
+        <p:spPr>
+          <a:xfrm>
+            <a:off x="18959" y="1055021"/>
+            <a:ext cx="1634612" cy="340737"/>
+          </a:xfrm>
+          <a:prstGeom prst="rect">
+            <a:avLst/>
+          </a:prstGeom>
+          <a:noFill/>
+          <a:ln>
+            <a:noFill/>
+          </a:ln>
+        </p:spPr>
+        <p:style>
+          <a:lnRef idx="2">
+            <a:schemeClr val="accent1">
+              <a:shade val="15000"/>
+            </a:schemeClr>
+          </a:lnRef>
+          <a:fillRef idx="1">
+            <a:schemeClr val="accent1"/>
+          </a:fillRef>
+          <a:effectRef idx="0">
+            <a:schemeClr val="accent1"/>
+          </a:effectRef>
+          <a:fontRef idx="minor">
+            <a:schemeClr val="lt1"/>
+          </a:fontRef>
+        </p:style>
+        <p:txBody>
+          <a:bodyPr rtlCol="0" anchor="ctr"/>
+          <a:lstStyle/>
+          <a:p>
+            <a:pPr algn="ctr"/>
+            <a:r>
+              <a:rPr lang="de-DE" sz="1400" dirty="0" err="1">
+                <a:solidFill>
+                  <a:schemeClr val="tx1"/>
+                </a:solidFill>
+              </a:rPr>
+              <a:t>STATE_initial_write</a:t>
+            </a:r>
+            <a:endParaRPr lang="de-DE" sz="1400" dirty="0">
+              <a:solidFill>
+                <a:schemeClr val="tx1"/>
+              </a:solidFill>
+            </a:endParaRPr>
+          </a:p>
+        </p:txBody>
+      </p:sp>
+      <p:sp>
+        <p:nvSpPr>
+          <p:cNvPr id="93" name="Textfeld 92">
+            <a:extLst>
+              <a:ext uri="{FF2B5EF4-FFF2-40B4-BE49-F238E27FC236}">
+                <a16:creationId xmlns:a16="http://schemas.microsoft.com/office/drawing/2014/main" id="{50C45785-C894-815F-40D5-5A0ADC481CCE}"/>
+              </a:ext>
+            </a:extLst>
+          </p:cNvPr>
+          <p:cNvSpPr txBox="1"/>
+          <p:nvPr/>
+        </p:nvSpPr>
+        <p:spPr>
+          <a:xfrm>
+            <a:off x="1244490" y="10306661"/>
+            <a:ext cx="335377" cy="369332"/>
+          </a:xfrm>
+          <a:prstGeom prst="rect">
+            <a:avLst/>
+          </a:prstGeom>
+          <a:noFill/>
+        </p:spPr>
+        <p:txBody>
+          <a:bodyPr wrap="square" rtlCol="0">
+            <a:spAutoFit/>
+          </a:bodyPr>
+          <a:lstStyle/>
+          <a:p>
+            <a:r>
+              <a:rPr lang="de-DE" dirty="0"/>
+              <a:t>9</a:t>
+            </a:r>
+          </a:p>
+        </p:txBody>
+      </p:sp>
+      <p:cxnSp>
+        <p:nvCxnSpPr>
+          <p:cNvPr id="96" name="Gerade Verbindung mit Pfeil 95">
+            <a:extLst>
+              <a:ext uri="{FF2B5EF4-FFF2-40B4-BE49-F238E27FC236}">
+                <a16:creationId xmlns:a16="http://schemas.microsoft.com/office/drawing/2014/main" id="{49C8A0A8-FD53-46C1-4915-A64AFA50996B}"/>
+              </a:ext>
+            </a:extLst>
+          </p:cNvPr>
+          <p:cNvCxnSpPr>
+            <a:cxnSpLocks/>
+          </p:cNvCxnSpPr>
+          <p:nvPr/>
+        </p:nvCxnSpPr>
+        <p:spPr>
+          <a:xfrm flipH="1">
+            <a:off x="2048268" y="1047660"/>
+            <a:ext cx="7164720" cy="0"/>
+          </a:xfrm>
+          <a:prstGeom prst="straightConnector1">
+            <a:avLst/>
+          </a:prstGeom>
+          <a:ln>
+            <a:tailEnd type="triangle"/>
+          </a:ln>
+        </p:spPr>
+        <p:style>
+          <a:lnRef idx="2">
+            <a:schemeClr val="accent1"/>
+          </a:lnRef>
+          <a:fillRef idx="0">
+            <a:schemeClr val="accent1"/>
+          </a:fillRef>
+          <a:effectRef idx="1">
+            <a:schemeClr val="accent1"/>
+          </a:effectRef>
+          <a:fontRef idx="minor">
+            <a:schemeClr val="tx1"/>
+          </a:fontRef>
+        </p:style>
+      </p:cxnSp>
+      <p:cxnSp>
+        <p:nvCxnSpPr>
+          <p:cNvPr id="98" name="Gerade Verbindung mit Pfeil 97">
+            <a:extLst>
+              <a:ext uri="{FF2B5EF4-FFF2-40B4-BE49-F238E27FC236}">
+                <a16:creationId xmlns:a16="http://schemas.microsoft.com/office/drawing/2014/main" id="{4E43DD9B-5A77-68CE-036F-EFF276E2695E}"/>
+              </a:ext>
+            </a:extLst>
+          </p:cNvPr>
+          <p:cNvCxnSpPr>
+            <a:cxnSpLocks/>
+          </p:cNvCxnSpPr>
+          <p:nvPr/>
+        </p:nvCxnSpPr>
+        <p:spPr>
+          <a:xfrm flipH="1">
+            <a:off x="2956755" y="1244104"/>
+            <a:ext cx="6269796" cy="0"/>
+          </a:xfrm>
+          <a:prstGeom prst="straightConnector1">
+            <a:avLst/>
+          </a:prstGeom>
+          <a:ln>
+            <a:tailEnd type="triangle"/>
+          </a:ln>
+        </p:spPr>
+        <p:style>
+          <a:lnRef idx="2">
+            <a:schemeClr val="accent1"/>
+          </a:lnRef>
+          <a:fillRef idx="0">
+            <a:schemeClr val="accent1"/>
+          </a:fillRef>
+          <a:effectRef idx="1">
+            <a:schemeClr val="accent1"/>
+          </a:effectRef>
+          <a:fontRef idx="minor">
+            <a:schemeClr val="tx1"/>
+          </a:fontRef>
+        </p:style>
+      </p:cxnSp>
+      <p:sp>
+        <p:nvSpPr>
+          <p:cNvPr id="114" name="Textfeld 113">
+            <a:extLst>
+              <a:ext uri="{FF2B5EF4-FFF2-40B4-BE49-F238E27FC236}">
+                <a16:creationId xmlns:a16="http://schemas.microsoft.com/office/drawing/2014/main" id="{1A00390C-74AB-0682-E200-05A8F6DBDB8C}"/>
+              </a:ext>
+            </a:extLst>
+          </p:cNvPr>
+          <p:cNvSpPr txBox="1"/>
+          <p:nvPr/>
+        </p:nvSpPr>
+        <p:spPr>
+          <a:xfrm>
+            <a:off x="9169361" y="817458"/>
+            <a:ext cx="1393169" cy="784830"/>
+          </a:xfrm>
+          <a:prstGeom prst="rect">
+            <a:avLst/>
+          </a:prstGeom>
+        </p:spPr>
+        <p:style>
+          <a:lnRef idx="2">
+            <a:schemeClr val="dk1"/>
+          </a:lnRef>
+          <a:fillRef idx="1">
+            <a:schemeClr val="lt1"/>
+          </a:fillRef>
+          <a:effectRef idx="0">
+            <a:schemeClr val="dk1"/>
+          </a:effectRef>
+          <a:fontRef idx="minor">
+            <a:schemeClr val="dk1"/>
+          </a:fontRef>
+        </p:style>
+        <p:txBody>
+          <a:bodyPr wrap="square" rtlCol="0">
+            <a:spAutoFit/>
+          </a:bodyPr>
+          <a:lstStyle/>
+          <a:p>
+            <a:r>
+              <a:rPr lang="de-DE" sz="900" dirty="0"/>
+              <a:t>Registern der Eingänge mittels  Zahl1_temp und Zahl2_temp und einmaliges Schreiben in Zahl1_r und Zahl2_r</a:t>
+            </a:r>
+          </a:p>
+        </p:txBody>
+      </p:sp>
+      <p:sp>
+        <p:nvSpPr>
+          <p:cNvPr id="115" name="Textfeld 114">
+            <a:extLst>
+              <a:ext uri="{FF2B5EF4-FFF2-40B4-BE49-F238E27FC236}">
+                <a16:creationId xmlns:a16="http://schemas.microsoft.com/office/drawing/2014/main" id="{33DD91E7-0A58-32B5-9A0B-80879BE57ADE}"/>
+              </a:ext>
+            </a:extLst>
+          </p:cNvPr>
+          <p:cNvSpPr txBox="1"/>
+          <p:nvPr/>
+        </p:nvSpPr>
+        <p:spPr>
+          <a:xfrm>
+            <a:off x="5887351" y="2060015"/>
+            <a:ext cx="1516269" cy="276999"/>
+          </a:xfrm>
+          <a:prstGeom prst="rect">
+            <a:avLst/>
+          </a:prstGeom>
+          <a:noFill/>
+        </p:spPr>
+        <p:txBody>
+          <a:bodyPr wrap="square" rtlCol="0">
+            <a:spAutoFit/>
+          </a:bodyPr>
+          <a:lstStyle/>
+          <a:p>
+            <a:r>
+              <a:rPr lang="de-DE" sz="1200" dirty="0"/>
+              <a:t>Zahl1_to_alu_a</a:t>
             </a:r>
           </a:p>
         </p:txBody>

</xml_diff>